<commit_message>
Updated slides for prezzy.
</commit_message>
<xml_diff>
--- a/YelpForTravelHelp.pptx
+++ b/YelpForTravelHelp.pptx
@@ -138,6 +138,7 @@
 <p1510:revInfo xmlns:a="http://schemas.openxmlformats.org/drawingml/2006/main" xmlns:r="http://schemas.openxmlformats.org/officeDocument/2006/relationships" xmlns:p1510="http://schemas.microsoft.com/office/powerpoint/2015/10/main">
   <p1510:revLst>
     <p1510:client id="{9BD4B7DE-F438-4D69-91FE-30D9F4395912}" v="25" dt="2023-10-05T01:39:33.153"/>
+    <p1510:client id="{BF658A42-85CA-4FCE-9751-D84327CF6E22}" v="6" dt="2023-10-06T00:13:32.326"/>
   </p1510:revLst>
 </p1510:revInfo>
 </file>
@@ -253,6 +254,301 @@
             <pc:docMk/>
             <pc:sldMk cId="2176088558" sldId="270"/>
             <ac:spMk id="2" creationId="{00000000-0000-0000-0000-000000000000}"/>
+          </ac:spMkLst>
+        </pc:spChg>
+      </pc:sldChg>
+    </pc:docChg>
+  </pc:docChgLst>
+  <pc:docChgLst>
+    <pc:chgData name="Jeremy Magee" userId="54b62a32ee7be8e2" providerId="LiveId" clId="{BF658A42-85CA-4FCE-9751-D84327CF6E22}"/>
+    <pc:docChg chg="custSel modSld">
+      <pc:chgData name="Jeremy Magee" userId="54b62a32ee7be8e2" providerId="LiveId" clId="{BF658A42-85CA-4FCE-9751-D84327CF6E22}" dt="2023-10-06T00:14:21.844" v="1688" actId="20577"/>
+      <pc:docMkLst>
+        <pc:docMk/>
+      </pc:docMkLst>
+      <pc:sldChg chg="modSp mod">
+        <pc:chgData name="Jeremy Magee" userId="54b62a32ee7be8e2" providerId="LiveId" clId="{BF658A42-85CA-4FCE-9751-D84327CF6E22}" dt="2023-10-05T22:58:51.795" v="325" actId="20577"/>
+        <pc:sldMkLst>
+          <pc:docMk/>
+          <pc:sldMk cId="1783796071" sldId="261"/>
+        </pc:sldMkLst>
+        <pc:spChg chg="mod">
+          <ac:chgData name="Jeremy Magee" userId="54b62a32ee7be8e2" providerId="LiveId" clId="{BF658A42-85CA-4FCE-9751-D84327CF6E22}" dt="2023-10-05T22:58:51.795" v="325" actId="20577"/>
+          <ac:spMkLst>
+            <pc:docMk/>
+            <pc:sldMk cId="1783796071" sldId="261"/>
+            <ac:spMk id="3" creationId="{00000000-0000-0000-0000-000000000000}"/>
+          </ac:spMkLst>
+        </pc:spChg>
+      </pc:sldChg>
+      <pc:sldChg chg="addSp delSp modSp mod">
+        <pc:chgData name="Jeremy Magee" userId="54b62a32ee7be8e2" providerId="LiveId" clId="{BF658A42-85CA-4FCE-9751-D84327CF6E22}" dt="2023-10-05T23:17:18.874" v="505" actId="20577"/>
+        <pc:sldMkLst>
+          <pc:docMk/>
+          <pc:sldMk cId="3387061768" sldId="262"/>
+        </pc:sldMkLst>
+        <pc:spChg chg="mod">
+          <ac:chgData name="Jeremy Magee" userId="54b62a32ee7be8e2" providerId="LiveId" clId="{BF658A42-85CA-4FCE-9751-D84327CF6E22}" dt="2023-10-05T23:01:36.907" v="340" actId="20577"/>
+          <ac:spMkLst>
+            <pc:docMk/>
+            <pc:sldMk cId="3387061768" sldId="262"/>
+            <ac:spMk id="2" creationId="{00000000-0000-0000-0000-000000000000}"/>
+          </ac:spMkLst>
+        </pc:spChg>
+        <pc:spChg chg="del mod">
+          <ac:chgData name="Jeremy Magee" userId="54b62a32ee7be8e2" providerId="LiveId" clId="{BF658A42-85CA-4FCE-9751-D84327CF6E22}" dt="2023-10-05T23:15:50.877" v="426" actId="478"/>
+          <ac:spMkLst>
+            <pc:docMk/>
+            <pc:sldMk cId="3387061768" sldId="262"/>
+            <ac:spMk id="3" creationId="{00000000-0000-0000-0000-000000000000}"/>
+          </ac:spMkLst>
+        </pc:spChg>
+        <pc:spChg chg="mod">
+          <ac:chgData name="Jeremy Magee" userId="54b62a32ee7be8e2" providerId="LiveId" clId="{BF658A42-85CA-4FCE-9751-D84327CF6E22}" dt="2023-10-05T23:17:18.874" v="505" actId="20577"/>
+          <ac:spMkLst>
+            <pc:docMk/>
+            <pc:sldMk cId="3387061768" sldId="262"/>
+            <ac:spMk id="4" creationId="{00000000-0000-0000-0000-000000000000}"/>
+          </ac:spMkLst>
+        </pc:spChg>
+        <pc:picChg chg="add mod">
+          <ac:chgData name="Jeremy Magee" userId="54b62a32ee7be8e2" providerId="LiveId" clId="{BF658A42-85CA-4FCE-9751-D84327CF6E22}" dt="2023-10-05T23:16:57.669" v="491" actId="14100"/>
+          <ac:picMkLst>
+            <pc:docMk/>
+            <pc:sldMk cId="3387061768" sldId="262"/>
+            <ac:picMk id="8" creationId="{C440E7C0-E374-8FC2-72AF-E889B2DFEF23}"/>
+          </ac:picMkLst>
+        </pc:picChg>
+      </pc:sldChg>
+      <pc:sldChg chg="addSp delSp modSp mod modClrScheme chgLayout">
+        <pc:chgData name="Jeremy Magee" userId="54b62a32ee7be8e2" providerId="LiveId" clId="{BF658A42-85CA-4FCE-9751-D84327CF6E22}" dt="2023-10-05T23:46:02.242" v="845" actId="1076"/>
+        <pc:sldMkLst>
+          <pc:docMk/>
+          <pc:sldMk cId="3440500440" sldId="263"/>
+        </pc:sldMkLst>
+        <pc:spChg chg="mod">
+          <ac:chgData name="Jeremy Magee" userId="54b62a32ee7be8e2" providerId="LiveId" clId="{BF658A42-85CA-4FCE-9751-D84327CF6E22}" dt="2023-10-05T23:19:17.704" v="512" actId="26606"/>
+          <ac:spMkLst>
+            <pc:docMk/>
+            <pc:sldMk cId="3440500440" sldId="263"/>
+            <ac:spMk id="2" creationId="{00000000-0000-0000-0000-000000000000}"/>
+          </ac:spMkLst>
+        </pc:spChg>
+        <pc:spChg chg="add del mod">
+          <ac:chgData name="Jeremy Magee" userId="54b62a32ee7be8e2" providerId="LiveId" clId="{BF658A42-85CA-4FCE-9751-D84327CF6E22}" dt="2023-10-05T23:21:06.422" v="516"/>
+          <ac:spMkLst>
+            <pc:docMk/>
+            <pc:sldMk cId="3440500440" sldId="263"/>
+            <ac:spMk id="5" creationId="{DE70B395-DFBA-DC40-6AB4-22E189A997DA}"/>
+          </ac:spMkLst>
+        </pc:spChg>
+        <pc:spChg chg="add mod">
+          <ac:chgData name="Jeremy Magee" userId="54b62a32ee7be8e2" providerId="LiveId" clId="{BF658A42-85CA-4FCE-9751-D84327CF6E22}" dt="2023-10-05T23:45:49.225" v="843" actId="207"/>
+          <ac:spMkLst>
+            <pc:docMk/>
+            <pc:sldMk cId="3440500440" sldId="263"/>
+            <ac:spMk id="9" creationId="{758428B9-2839-5EE1-B05A-D685236437B9}"/>
+          </ac:spMkLst>
+        </pc:spChg>
+        <pc:picChg chg="add del mod">
+          <ac:chgData name="Jeremy Magee" userId="54b62a32ee7be8e2" providerId="LiveId" clId="{BF658A42-85CA-4FCE-9751-D84327CF6E22}" dt="2023-10-05T23:21:06.413" v="514" actId="478"/>
+          <ac:picMkLst>
+            <pc:docMk/>
+            <pc:sldMk cId="3440500440" sldId="263"/>
+            <ac:picMk id="4" creationId="{6B794CEB-12A0-789D-A601-CE8CB7D2705B}"/>
+          </ac:picMkLst>
+        </pc:picChg>
+        <pc:picChg chg="add mod ord">
+          <ac:chgData name="Jeremy Magee" userId="54b62a32ee7be8e2" providerId="LiveId" clId="{BF658A42-85CA-4FCE-9751-D84327CF6E22}" dt="2023-10-05T23:46:02.242" v="845" actId="1076"/>
+          <ac:picMkLst>
+            <pc:docMk/>
+            <pc:sldMk cId="3440500440" sldId="263"/>
+            <ac:picMk id="7" creationId="{1EEE7DD6-EB47-00BA-E135-1A8FDECC681F}"/>
+          </ac:picMkLst>
+        </pc:picChg>
+      </pc:sldChg>
+      <pc:sldChg chg="addSp modSp mod modClrScheme chgLayout">
+        <pc:chgData name="Jeremy Magee" userId="54b62a32ee7be8e2" providerId="LiveId" clId="{BF658A42-85CA-4FCE-9751-D84327CF6E22}" dt="2023-10-06T00:00:04.453" v="1340" actId="1076"/>
+        <pc:sldMkLst>
+          <pc:docMk/>
+          <pc:sldMk cId="4129439513" sldId="264"/>
+        </pc:sldMkLst>
+        <pc:spChg chg="add mod">
+          <ac:chgData name="Jeremy Magee" userId="54b62a32ee7be8e2" providerId="LiveId" clId="{BF658A42-85CA-4FCE-9751-D84327CF6E22}" dt="2023-10-05T23:50:57.225" v="1268" actId="1076"/>
+          <ac:spMkLst>
+            <pc:docMk/>
+            <pc:sldMk cId="4129439513" sldId="264"/>
+            <ac:spMk id="2" creationId="{2FF7DE22-D74B-A6D5-E142-43A78059FBF0}"/>
+          </ac:spMkLst>
+        </pc:spChg>
+        <pc:spChg chg="add mod">
+          <ac:chgData name="Jeremy Magee" userId="54b62a32ee7be8e2" providerId="LiveId" clId="{BF658A42-85CA-4FCE-9751-D84327CF6E22}" dt="2023-10-05T23:47:26.614" v="846" actId="700"/>
+          <ac:spMkLst>
+            <pc:docMk/>
+            <pc:sldMk cId="4129439513" sldId="264"/>
+            <ac:spMk id="3" creationId="{58DD2207-1A9E-CD3E-3CFE-457A129427E4}"/>
+          </ac:spMkLst>
+        </pc:spChg>
+        <pc:spChg chg="add mod">
+          <ac:chgData name="Jeremy Magee" userId="54b62a32ee7be8e2" providerId="LiveId" clId="{BF658A42-85CA-4FCE-9751-D84327CF6E22}" dt="2023-10-05T23:57:56.024" v="1320" actId="20577"/>
+          <ac:spMkLst>
+            <pc:docMk/>
+            <pc:sldMk cId="4129439513" sldId="264"/>
+            <ac:spMk id="4" creationId="{AD4FB6AD-FEFE-4C66-E36D-C5D67670F48A}"/>
+          </ac:spMkLst>
+        </pc:spChg>
+        <pc:picChg chg="add mod">
+          <ac:chgData name="Jeremy Magee" userId="54b62a32ee7be8e2" providerId="LiveId" clId="{BF658A42-85CA-4FCE-9751-D84327CF6E22}" dt="2023-10-05T23:59:59.270" v="1339" actId="14100"/>
+          <ac:picMkLst>
+            <pc:docMk/>
+            <pc:sldMk cId="4129439513" sldId="264"/>
+            <ac:picMk id="6" creationId="{8C4031F9-CDE5-2130-C53F-F1C06F5268A4}"/>
+          </ac:picMkLst>
+        </pc:picChg>
+        <pc:picChg chg="add mod">
+          <ac:chgData name="Jeremy Magee" userId="54b62a32ee7be8e2" providerId="LiveId" clId="{BF658A42-85CA-4FCE-9751-D84327CF6E22}" dt="2023-10-06T00:00:04.453" v="1340" actId="1076"/>
+          <ac:picMkLst>
+            <pc:docMk/>
+            <pc:sldMk cId="4129439513" sldId="264"/>
+            <ac:picMk id="8" creationId="{7A0EAE92-298C-FD9E-471B-B039082DF861}"/>
+          </ac:picMkLst>
+        </pc:picChg>
+        <pc:picChg chg="add mod">
+          <ac:chgData name="Jeremy Magee" userId="54b62a32ee7be8e2" providerId="LiveId" clId="{BF658A42-85CA-4FCE-9751-D84327CF6E22}" dt="2023-10-05T23:58:26.619" v="1328" actId="1076"/>
+          <ac:picMkLst>
+            <pc:docMk/>
+            <pc:sldMk cId="4129439513" sldId="264"/>
+            <ac:picMk id="10" creationId="{BB9EC2E2-0FD9-6AC2-F05D-3118BD743DCA}"/>
+          </ac:picMkLst>
+        </pc:picChg>
+        <pc:picChg chg="add mod">
+          <ac:chgData name="Jeremy Magee" userId="54b62a32ee7be8e2" providerId="LiveId" clId="{BF658A42-85CA-4FCE-9751-D84327CF6E22}" dt="2023-10-05T23:59:10.342" v="1336" actId="14100"/>
+          <ac:picMkLst>
+            <pc:docMk/>
+            <pc:sldMk cId="4129439513" sldId="264"/>
+            <ac:picMk id="12" creationId="{D4EA0708-4299-C7AF-96F4-3C5AD8A322B2}"/>
+          </ac:picMkLst>
+        </pc:picChg>
+      </pc:sldChg>
+      <pc:sldChg chg="modSp mod">
+        <pc:chgData name="Jeremy Magee" userId="54b62a32ee7be8e2" providerId="LiveId" clId="{BF658A42-85CA-4FCE-9751-D84327CF6E22}" dt="2023-10-06T00:02:23.165" v="1540" actId="20577"/>
+        <pc:sldMkLst>
+          <pc:docMk/>
+          <pc:sldMk cId="1827431122" sldId="265"/>
+        </pc:sldMkLst>
+        <pc:spChg chg="mod">
+          <ac:chgData name="Jeremy Magee" userId="54b62a32ee7be8e2" providerId="LiveId" clId="{BF658A42-85CA-4FCE-9751-D84327CF6E22}" dt="2023-10-06T00:00:15.016" v="1347" actId="20577"/>
+          <ac:spMkLst>
+            <pc:docMk/>
+            <pc:sldMk cId="1827431122" sldId="265"/>
+            <ac:spMk id="2" creationId="{00000000-0000-0000-0000-000000000000}"/>
+          </ac:spMkLst>
+        </pc:spChg>
+        <pc:spChg chg="mod">
+          <ac:chgData name="Jeremy Magee" userId="54b62a32ee7be8e2" providerId="LiveId" clId="{BF658A42-85CA-4FCE-9751-D84327CF6E22}" dt="2023-10-06T00:02:23.165" v="1540" actId="20577"/>
+          <ac:spMkLst>
+            <pc:docMk/>
+            <pc:sldMk cId="1827431122" sldId="265"/>
+            <ac:spMk id="4" creationId="{00000000-0000-0000-0000-000000000000}"/>
+          </ac:spMkLst>
+        </pc:spChg>
+      </pc:sldChg>
+      <pc:sldChg chg="addSp modSp mod modAnim">
+        <pc:chgData name="Jeremy Magee" userId="54b62a32ee7be8e2" providerId="LiveId" clId="{BF658A42-85CA-4FCE-9751-D84327CF6E22}" dt="2023-10-06T00:13:32.326" v="1687"/>
+        <pc:sldMkLst>
+          <pc:docMk/>
+          <pc:sldMk cId="2521986180" sldId="266"/>
+        </pc:sldMkLst>
+        <pc:spChg chg="mod">
+          <ac:chgData name="Jeremy Magee" userId="54b62a32ee7be8e2" providerId="LiveId" clId="{BF658A42-85CA-4FCE-9751-D84327CF6E22}" dt="2023-10-06T00:12:43.687" v="1666" actId="1076"/>
+          <ac:spMkLst>
+            <pc:docMk/>
+            <pc:sldMk cId="2521986180" sldId="266"/>
+            <ac:spMk id="2" creationId="{00000000-0000-0000-0000-000000000000}"/>
+          </ac:spMkLst>
+        </pc:spChg>
+        <pc:spChg chg="mod">
+          <ac:chgData name="Jeremy Magee" userId="54b62a32ee7be8e2" providerId="LiveId" clId="{BF658A42-85CA-4FCE-9751-D84327CF6E22}" dt="2023-10-06T00:12:36.898" v="1665" actId="20577"/>
+          <ac:spMkLst>
+            <pc:docMk/>
+            <pc:sldMk cId="2521986180" sldId="266"/>
+            <ac:spMk id="3" creationId="{00000000-0000-0000-0000-000000000000}"/>
+          </ac:spMkLst>
+        </pc:spChg>
+        <pc:spChg chg="mod">
+          <ac:chgData name="Jeremy Magee" userId="54b62a32ee7be8e2" providerId="LiveId" clId="{BF658A42-85CA-4FCE-9751-D84327CF6E22}" dt="2023-10-06T00:12:49.136" v="1685" actId="20577"/>
+          <ac:spMkLst>
+            <pc:docMk/>
+            <pc:sldMk cId="2521986180" sldId="266"/>
+            <ac:spMk id="4" creationId="{00000000-0000-0000-0000-000000000000}"/>
+          </ac:spMkLst>
+        </pc:spChg>
+        <pc:picChg chg="add mod">
+          <ac:chgData name="Jeremy Magee" userId="54b62a32ee7be8e2" providerId="LiveId" clId="{BF658A42-85CA-4FCE-9751-D84327CF6E22}" dt="2023-10-06T00:08:52.535" v="1616" actId="1076"/>
+          <ac:picMkLst>
+            <pc:docMk/>
+            <pc:sldMk cId="2521986180" sldId="266"/>
+            <ac:picMk id="5" creationId="{F2544FD6-02F6-1CEA-4415-0E4B6181EEEC}"/>
+          </ac:picMkLst>
+        </pc:picChg>
+      </pc:sldChg>
+      <pc:sldChg chg="modSp mod">
+        <pc:chgData name="Jeremy Magee" userId="54b62a32ee7be8e2" providerId="LiveId" clId="{BF658A42-85CA-4FCE-9751-D84327CF6E22}" dt="2023-10-05T22:55:35.595" v="130" actId="20577"/>
+        <pc:sldMkLst>
+          <pc:docMk/>
+          <pc:sldMk cId="1407246764" sldId="267"/>
+        </pc:sldMkLst>
+        <pc:spChg chg="mod">
+          <ac:chgData name="Jeremy Magee" userId="54b62a32ee7be8e2" providerId="LiveId" clId="{BF658A42-85CA-4FCE-9751-D84327CF6E22}" dt="2023-10-05T22:55:35.595" v="130" actId="20577"/>
+          <ac:spMkLst>
+            <pc:docMk/>
+            <pc:sldMk cId="1407246764" sldId="267"/>
+            <ac:spMk id="3" creationId="{00000000-0000-0000-0000-000000000000}"/>
+          </ac:spMkLst>
+        </pc:spChg>
+      </pc:sldChg>
+      <pc:sldChg chg="modSp mod">
+        <pc:chgData name="Jeremy Magee" userId="54b62a32ee7be8e2" providerId="LiveId" clId="{BF658A42-85CA-4FCE-9751-D84327CF6E22}" dt="2023-10-05T22:55:07.102" v="57" actId="20577"/>
+        <pc:sldMkLst>
+          <pc:docMk/>
+          <pc:sldMk cId="2038093716" sldId="268"/>
+        </pc:sldMkLst>
+        <pc:spChg chg="mod">
+          <ac:chgData name="Jeremy Magee" userId="54b62a32ee7be8e2" providerId="LiveId" clId="{BF658A42-85CA-4FCE-9751-D84327CF6E22}" dt="2023-10-05T22:55:07.102" v="57" actId="20577"/>
+          <ac:spMkLst>
+            <pc:docMk/>
+            <pc:sldMk cId="2038093716" sldId="268"/>
+            <ac:spMk id="3" creationId="{00000000-0000-0000-0000-000000000000}"/>
+          </ac:spMkLst>
+        </pc:spChg>
+      </pc:sldChg>
+      <pc:sldChg chg="modSp mod">
+        <pc:chgData name="Jeremy Magee" userId="54b62a32ee7be8e2" providerId="LiveId" clId="{BF658A42-85CA-4FCE-9751-D84327CF6E22}" dt="2023-10-05T22:55:53.779" v="170" actId="20577"/>
+        <pc:sldMkLst>
+          <pc:docMk/>
+          <pc:sldMk cId="3863911453" sldId="269"/>
+        </pc:sldMkLst>
+        <pc:spChg chg="mod">
+          <ac:chgData name="Jeremy Magee" userId="54b62a32ee7be8e2" providerId="LiveId" clId="{BF658A42-85CA-4FCE-9751-D84327CF6E22}" dt="2023-10-05T22:55:53.779" v="170" actId="20577"/>
+          <ac:spMkLst>
+            <pc:docMk/>
+            <pc:sldMk cId="3863911453" sldId="269"/>
+            <ac:spMk id="3" creationId="{00000000-0000-0000-0000-000000000000}"/>
+          </ac:spMkLst>
+        </pc:spChg>
+      </pc:sldChg>
+      <pc:sldChg chg="modSp mod">
+        <pc:chgData name="Jeremy Magee" userId="54b62a32ee7be8e2" providerId="LiveId" clId="{BF658A42-85CA-4FCE-9751-D84327CF6E22}" dt="2023-10-06T00:14:21.844" v="1688" actId="20577"/>
+        <pc:sldMkLst>
+          <pc:docMk/>
+          <pc:sldMk cId="2176088558" sldId="270"/>
+        </pc:sldMkLst>
+        <pc:spChg chg="mod">
+          <ac:chgData name="Jeremy Magee" userId="54b62a32ee7be8e2" providerId="LiveId" clId="{BF658A42-85CA-4FCE-9751-D84327CF6E22}" dt="2023-10-06T00:14:21.844" v="1688" actId="20577"/>
+          <ac:spMkLst>
+            <pc:docMk/>
+            <pc:sldMk cId="2176088558" sldId="270"/>
+            <ac:spMk id="3" creationId="{00000000-0000-0000-0000-000000000000}"/>
           </ac:spMkLst>
         </pc:spChg>
       </pc:sldChg>
@@ -3200,7 +3496,7 @@
           <a:p>
             <a:fld id="{061C5132-FFA3-4B02-9F09-22FCF40EFA74}" type="datetimeFigureOut">
               <a:rPr lang="en-US" smtClean="0"/>
-              <a:t>10/4/2023</a:t>
+              <a:t>10/5/2023</a:t>
             </a:fld>
             <a:endParaRPr lang="en-US"/>
           </a:p>
@@ -3365,7 +3661,7 @@
           <a:p>
             <a:fld id="{0B6E42C9-243F-4DC5-AFF6-9D56B5FA9D63}" type="datetimeFigureOut">
               <a:rPr lang="en-US" smtClean="0"/>
-              <a:t>10/4/2023</a:t>
+              <a:t>10/5/2023</a:t>
             </a:fld>
             <a:endParaRPr lang="en-US"/>
           </a:p>
@@ -4053,7 +4349,7 @@
           <a:p>
             <a:fld id="{B0FE2824-C2A0-4931-BB32-60B24BDBB3CC}" type="datetimeFigureOut">
               <a:rPr lang="en-US" smtClean="0"/>
-              <a:t>10/4/2023</a:t>
+              <a:t>10/5/2023</a:t>
             </a:fld>
             <a:endParaRPr lang="en-US"/>
           </a:p>
@@ -4248,7 +4544,7 @@
           <a:p>
             <a:fld id="{B0FE2824-C2A0-4931-BB32-60B24BDBB3CC}" type="datetimeFigureOut">
               <a:rPr lang="en-US" smtClean="0"/>
-              <a:t>10/4/2023</a:t>
+              <a:t>10/5/2023</a:t>
             </a:fld>
             <a:endParaRPr lang="en-US"/>
           </a:p>
@@ -4428,7 +4724,7 @@
           <a:p>
             <a:fld id="{B0FE2824-C2A0-4931-BB32-60B24BDBB3CC}" type="datetimeFigureOut">
               <a:rPr lang="en-US" smtClean="0"/>
-              <a:t>10/4/2023</a:t>
+              <a:t>10/5/2023</a:t>
             </a:fld>
             <a:endParaRPr lang="en-US"/>
           </a:p>
@@ -4948,7 +5244,7 @@
           <a:p>
             <a:fld id="{B0FE2824-C2A0-4931-BB32-60B24BDBB3CC}" type="datetimeFigureOut">
               <a:rPr lang="en-US" smtClean="0"/>
-              <a:t>10/4/2023</a:t>
+              <a:t>10/5/2023</a:t>
             </a:fld>
             <a:endParaRPr lang="en-US"/>
           </a:p>
@@ -5390,7 +5686,7 @@
           <a:p>
             <a:fld id="{B0FE2824-C2A0-4931-BB32-60B24BDBB3CC}" type="datetimeFigureOut">
               <a:rPr lang="en-US" smtClean="0"/>
-              <a:t>10/4/2023</a:t>
+              <a:t>10/5/2023</a:t>
             </a:fld>
             <a:endParaRPr lang="en-US"/>
           </a:p>
@@ -5519,7 +5815,7 @@
           <a:p>
             <a:fld id="{B0FE2824-C2A0-4931-BB32-60B24BDBB3CC}" type="datetimeFigureOut">
               <a:rPr lang="en-US" smtClean="0"/>
-              <a:t>10/4/2023</a:t>
+              <a:t>10/5/2023</a:t>
             </a:fld>
             <a:endParaRPr lang="en-US"/>
           </a:p>
@@ -5626,7 +5922,7 @@
           <a:p>
             <a:fld id="{B0FE2824-C2A0-4931-BB32-60B24BDBB3CC}" type="datetimeFigureOut">
               <a:rPr lang="en-US" smtClean="0"/>
-              <a:t>10/4/2023</a:t>
+              <a:t>10/5/2023</a:t>
             </a:fld>
             <a:endParaRPr lang="en-US"/>
           </a:p>
@@ -5922,7 +6218,7 @@
           <a:p>
             <a:fld id="{B0FE2824-C2A0-4931-BB32-60B24BDBB3CC}" type="datetimeFigureOut">
               <a:rPr lang="en-US" smtClean="0"/>
-              <a:t>10/4/2023</a:t>
+              <a:t>10/5/2023</a:t>
             </a:fld>
             <a:endParaRPr lang="en-US"/>
           </a:p>
@@ -6195,7 +6491,7 @@
           <a:p>
             <a:fld id="{B0FE2824-C2A0-4931-BB32-60B24BDBB3CC}" type="datetimeFigureOut">
               <a:rPr lang="en-US" smtClean="0"/>
-              <a:t>10/4/2023</a:t>
+              <a:t>10/5/2023</a:t>
             </a:fld>
             <a:endParaRPr lang="en-US"/>
           </a:p>
@@ -6489,7 +6785,7 @@
             <a:fld id="{B0FE2824-C2A0-4931-BB32-60B24BDBB3CC}" type="datetimeFigureOut">
               <a:rPr lang="en-US" smtClean="0"/>
               <a:pPr/>
-              <a:t>10/4/2023</a:t>
+              <a:t>10/5/2023</a:t>
             </a:fld>
             <a:endParaRPr lang="en-US"/>
           </a:p>
@@ -7000,6 +7296,243 @@
           <a:chExt cx="0" cy="0"/>
         </a:xfrm>
       </p:grpSpPr>
+      <p:sp>
+        <p:nvSpPr>
+          <p:cNvPr id="2" name="Title 1">
+            <a:extLst>
+              <a:ext uri="{FF2B5EF4-FFF2-40B4-BE49-F238E27FC236}">
+                <a16:creationId xmlns:a16="http://schemas.microsoft.com/office/drawing/2014/main" id="{2FF7DE22-D74B-A6D5-E142-43A78059FBF0}"/>
+              </a:ext>
+            </a:extLst>
+          </p:cNvPr>
+          <p:cNvSpPr>
+            <a:spLocks noGrp="1"/>
+          </p:cNvSpPr>
+          <p:nvPr>
+            <p:ph type="title"/>
+          </p:nvPr>
+        </p:nvSpPr>
+        <p:spPr>
+          <a:xfrm>
+            <a:off x="7924800" y="838200"/>
+            <a:ext cx="3429000" cy="609600"/>
+          </a:xfrm>
+        </p:spPr>
+        <p:txBody>
+          <a:bodyPr/>
+          <a:lstStyle/>
+          <a:p>
+            <a:r>
+              <a:rPr lang="en-US" dirty="0"/>
+              <a:t>HTML, CSS, JS</a:t>
+            </a:r>
+          </a:p>
+        </p:txBody>
+      </p:sp>
+      <p:sp>
+        <p:nvSpPr>
+          <p:cNvPr id="3" name="Content Placeholder 2">
+            <a:extLst>
+              <a:ext uri="{FF2B5EF4-FFF2-40B4-BE49-F238E27FC236}">
+                <a16:creationId xmlns:a16="http://schemas.microsoft.com/office/drawing/2014/main" id="{58DD2207-1A9E-CD3E-3CFE-457A129427E4}"/>
+              </a:ext>
+            </a:extLst>
+          </p:cNvPr>
+          <p:cNvSpPr>
+            <a:spLocks noGrp="1"/>
+          </p:cNvSpPr>
+          <p:nvPr>
+            <p:ph idx="1"/>
+          </p:nvPr>
+        </p:nvSpPr>
+        <p:spPr/>
+        <p:txBody>
+          <a:bodyPr/>
+          <a:lstStyle/>
+          <a:p>
+            <a:endParaRPr lang="en-US" dirty="0"/>
+          </a:p>
+        </p:txBody>
+      </p:sp>
+      <p:sp>
+        <p:nvSpPr>
+          <p:cNvPr id="4" name="Text Placeholder 3">
+            <a:extLst>
+              <a:ext uri="{FF2B5EF4-FFF2-40B4-BE49-F238E27FC236}">
+                <a16:creationId xmlns:a16="http://schemas.microsoft.com/office/drawing/2014/main" id="{AD4FB6AD-FEFE-4C66-E36D-C5D67670F48A}"/>
+              </a:ext>
+            </a:extLst>
+          </p:cNvPr>
+          <p:cNvSpPr>
+            <a:spLocks noGrp="1"/>
+          </p:cNvSpPr>
+          <p:nvPr>
+            <p:ph type="body" sz="half" idx="2"/>
+          </p:nvPr>
+        </p:nvSpPr>
+        <p:spPr>
+          <a:xfrm>
+            <a:off x="7924800" y="1905000"/>
+            <a:ext cx="3429000" cy="3429000"/>
+          </a:xfrm>
+        </p:spPr>
+        <p:txBody>
+          <a:bodyPr>
+            <a:normAutofit/>
+          </a:bodyPr>
+          <a:lstStyle/>
+          <a:p>
+            <a:r>
+              <a:rPr lang="en-US" dirty="0"/>
+              <a:t>We utilized several files to create our web visualizations.</a:t>
+            </a:r>
+          </a:p>
+          <a:p>
+            <a:r>
+              <a:rPr lang="en-US" dirty="0"/>
+              <a:t>1. An index.html file, as our core web document and source location</a:t>
+            </a:r>
+          </a:p>
+          <a:p>
+            <a:r>
+              <a:rPr lang="en-US" dirty="0"/>
+              <a:t>2. A CSS file for formatting </a:t>
+            </a:r>
+          </a:p>
+          <a:p>
+            <a:r>
+              <a:rPr lang="en-US" dirty="0"/>
+              <a:t>3. An HTML map file for populating our window map.</a:t>
+            </a:r>
+          </a:p>
+          <a:p>
+            <a:r>
+              <a:rPr lang="en-US" dirty="0"/>
+              <a:t>4. A JavaScript script file to allow user control of the visualizations and data.</a:t>
+            </a:r>
+          </a:p>
+        </p:txBody>
+      </p:sp>
+      <p:pic>
+        <p:nvPicPr>
+          <p:cNvPr id="6" name="Picture 5">
+            <a:extLst>
+              <a:ext uri="{FF2B5EF4-FFF2-40B4-BE49-F238E27FC236}">
+                <a16:creationId xmlns:a16="http://schemas.microsoft.com/office/drawing/2014/main" id="{8C4031F9-CDE5-2130-C53F-F1C06F5268A4}"/>
+              </a:ext>
+            </a:extLst>
+          </p:cNvPr>
+          <p:cNvPicPr>
+            <a:picLocks noChangeAspect="1"/>
+          </p:cNvPicPr>
+          <p:nvPr/>
+        </p:nvPicPr>
+        <p:blipFill>
+          <a:blip r:embed="rId2"/>
+          <a:stretch>
+            <a:fillRect/>
+          </a:stretch>
+        </p:blipFill>
+        <p:spPr>
+          <a:xfrm>
+            <a:off x="702108" y="838201"/>
+            <a:ext cx="3091752" cy="2205506"/>
+          </a:xfrm>
+          <a:prstGeom prst="rect">
+            <a:avLst/>
+          </a:prstGeom>
+        </p:spPr>
+      </p:pic>
+      <p:pic>
+        <p:nvPicPr>
+          <p:cNvPr id="8" name="Picture 7">
+            <a:extLst>
+              <a:ext uri="{FF2B5EF4-FFF2-40B4-BE49-F238E27FC236}">
+                <a16:creationId xmlns:a16="http://schemas.microsoft.com/office/drawing/2014/main" id="{7A0EAE92-298C-FD9E-471B-B039082DF861}"/>
+              </a:ext>
+            </a:extLst>
+          </p:cNvPr>
+          <p:cNvPicPr>
+            <a:picLocks noChangeAspect="1"/>
+          </p:cNvPicPr>
+          <p:nvPr/>
+        </p:nvPicPr>
+        <p:blipFill>
+          <a:blip r:embed="rId3"/>
+          <a:stretch>
+            <a:fillRect/>
+          </a:stretch>
+        </p:blipFill>
+        <p:spPr>
+          <a:xfrm>
+            <a:off x="615629" y="3215362"/>
+            <a:ext cx="3200400" cy="2516151"/>
+          </a:xfrm>
+          <a:prstGeom prst="rect">
+            <a:avLst/>
+          </a:prstGeom>
+        </p:spPr>
+      </p:pic>
+      <p:pic>
+        <p:nvPicPr>
+          <p:cNvPr id="10" name="Picture 9">
+            <a:extLst>
+              <a:ext uri="{FF2B5EF4-FFF2-40B4-BE49-F238E27FC236}">
+                <a16:creationId xmlns:a16="http://schemas.microsoft.com/office/drawing/2014/main" id="{BB9EC2E2-0FD9-6AC2-F05D-3118BD743DCA}"/>
+              </a:ext>
+            </a:extLst>
+          </p:cNvPr>
+          <p:cNvPicPr>
+            <a:picLocks noChangeAspect="1"/>
+          </p:cNvPicPr>
+          <p:nvPr/>
+        </p:nvPicPr>
+        <p:blipFill>
+          <a:blip r:embed="rId4"/>
+          <a:stretch>
+            <a:fillRect/>
+          </a:stretch>
+        </p:blipFill>
+        <p:spPr>
+          <a:xfrm>
+            <a:off x="4038600" y="3135980"/>
+            <a:ext cx="3422971" cy="2539917"/>
+          </a:xfrm>
+          <a:prstGeom prst="rect">
+            <a:avLst/>
+          </a:prstGeom>
+        </p:spPr>
+      </p:pic>
+      <p:pic>
+        <p:nvPicPr>
+          <p:cNvPr id="12" name="Picture 11">
+            <a:extLst>
+              <a:ext uri="{FF2B5EF4-FFF2-40B4-BE49-F238E27FC236}">
+                <a16:creationId xmlns:a16="http://schemas.microsoft.com/office/drawing/2014/main" id="{D4EA0708-4299-C7AF-96F4-3C5AD8A322B2}"/>
+              </a:ext>
+            </a:extLst>
+          </p:cNvPr>
+          <p:cNvPicPr>
+            <a:picLocks noChangeAspect="1"/>
+          </p:cNvPicPr>
+          <p:nvPr/>
+        </p:nvPicPr>
+        <p:blipFill>
+          <a:blip r:embed="rId5"/>
+          <a:stretch>
+            <a:fillRect/>
+          </a:stretch>
+        </p:blipFill>
+        <p:spPr>
+          <a:xfrm>
+            <a:off x="4038600" y="838200"/>
+            <a:ext cx="3326967" cy="2205507"/>
+          </a:xfrm>
+          <a:prstGeom prst="rect">
+            <a:avLst/>
+          </a:prstGeom>
+        </p:spPr>
+      </p:pic>
     </p:spTree>
     <p:extLst>
       <p:ext uri="{BB962C8B-B14F-4D97-AF65-F5344CB8AC3E}">
@@ -7079,7 +7612,10 @@
           <a:bodyPr/>
           <a:lstStyle/>
           <a:p>
-            <a:endParaRPr lang="en-US" dirty="0"/>
+            <a:r>
+              <a:rPr lang="en-US" dirty="0"/>
+              <a:t>You like maps? We put maps IN your maps!</a:t>
+            </a:r>
           </a:p>
         </p:txBody>
       </p:sp>
@@ -7142,7 +7678,7 @@
           <a:p>
             <a:r>
               <a:rPr lang="en-US" dirty="0"/>
-              <a:t>Add a Slide Title - 4</a:t>
+              <a:t>Leaflet</a:t>
             </a:r>
           </a:p>
         </p:txBody>
@@ -7181,7 +7717,10 @@
           <a:bodyPr/>
           <a:lstStyle/>
           <a:p>
-            <a:endParaRPr lang="en-US"/>
+            <a:r>
+              <a:rPr lang="en-US" dirty="0"/>
+              <a:t>Leaflet gave us the power to create markers for our desired locations and bind pop-up messages to each marker, based on user-directed data.</a:t>
+            </a:r>
           </a:p>
         </p:txBody>
       </p:sp>
@@ -7320,14 +7859,19 @@
             <p:ph type="title"/>
           </p:nvPr>
         </p:nvSpPr>
-        <p:spPr/>
+        <p:spPr>
+          <a:xfrm>
+            <a:off x="2438399" y="1371600"/>
+            <a:ext cx="3429000" cy="627062"/>
+          </a:xfrm>
+        </p:spPr>
         <p:txBody>
           <a:bodyPr/>
           <a:lstStyle/>
           <a:p>
             <a:r>
-              <a:rPr lang="en-US" dirty="0"/>
-              <a:t>Add a Slide Title - 5</a:t>
+              <a:rPr lang="en-US" b="1" dirty="0"/>
+              <a:t>Yelp, for Help!</a:t>
             </a:r>
           </a:p>
         </p:txBody>
@@ -7347,7 +7891,7 @@
           <a:bodyPr/>
           <a:lstStyle/>
           <a:p>
-            <a:endParaRPr lang="en-US"/>
+            <a:endParaRPr lang="en-US" dirty="0"/>
           </a:p>
         </p:txBody>
       </p:sp>
@@ -7366,10 +7910,51 @@
           <a:bodyPr/>
           <a:lstStyle/>
           <a:p>
-            <a:endParaRPr lang="en-US"/>
-          </a:p>
-        </p:txBody>
-      </p:sp>
+            <a:r>
+              <a:rPr lang="en-US" dirty="0"/>
+              <a:t>Let’s take a look!</a:t>
+            </a:r>
+          </a:p>
+        </p:txBody>
+      </p:sp>
+      <p:pic>
+        <p:nvPicPr>
+          <p:cNvPr id="5" name="jim-carrey">
+            <a:hlinkClick r:id="" action="ppaction://media"/>
+            <a:extLst>
+              <a:ext uri="{FF2B5EF4-FFF2-40B4-BE49-F238E27FC236}">
+                <a16:creationId xmlns:a16="http://schemas.microsoft.com/office/drawing/2014/main" id="{F2544FD6-02F6-1CEA-4415-0E4B6181EEEC}"/>
+              </a:ext>
+            </a:extLst>
+          </p:cNvPr>
+          <p:cNvPicPr>
+            <a:picLocks noChangeAspect="1"/>
+          </p:cNvPicPr>
+          <p:nvPr>
+            <a:videoFile r:link="rId2"/>
+            <p:extLst>
+              <p:ext uri="{DAA4B4D4-6D71-4841-9C94-3DE7FCFB9230}">
+                <p14:media xmlns:p14="http://schemas.microsoft.com/office/powerpoint/2010/main" r:embed="rId1"/>
+              </p:ext>
+            </p:extLst>
+          </p:nvPr>
+        </p:nvPicPr>
+        <p:blipFill>
+          <a:blip r:embed="rId4"/>
+          <a:stretch>
+            <a:fillRect/>
+          </a:stretch>
+        </p:blipFill>
+        <p:spPr>
+          <a:xfrm>
+            <a:off x="1600198" y="2217737"/>
+            <a:ext cx="4876800" cy="2727325"/>
+          </a:xfrm>
+          <a:prstGeom prst="rect">
+            <a:avLst/>
+          </a:prstGeom>
+        </p:spPr>
+      </p:pic>
     </p:spTree>
     <p:extLst>
       <p:ext uri="{BB962C8B-B14F-4D97-AF65-F5344CB8AC3E}">
@@ -7392,6 +7977,144 @@
       </p:transition>
     </mc:Fallback>
   </mc:AlternateContent>
+  <p:timing>
+    <p:tnLst>
+      <p:par>
+        <p:cTn id="1" dur="indefinite" restart="never" nodeType="tmRoot">
+          <p:childTnLst>
+            <p:seq concurrent="1" nextAc="seek">
+              <p:cTn id="2" dur="indefinite" nodeType="mainSeq">
+                <p:childTnLst>
+                  <p:par>
+                    <p:cTn id="3" fill="hold">
+                      <p:stCondLst>
+                        <p:cond delay="indefinite"/>
+                        <p:cond evt="onBegin" delay="0">
+                          <p:tn val="2"/>
+                        </p:cond>
+                      </p:stCondLst>
+                      <p:childTnLst>
+                        <p:par>
+                          <p:cTn id="4" fill="hold">
+                            <p:stCondLst>
+                              <p:cond delay="0"/>
+                            </p:stCondLst>
+                            <p:childTnLst>
+                              <p:par>
+                                <p:cTn id="5" presetID="1" presetClass="mediacall" presetSubtype="0" fill="hold" nodeType="afterEffect">
+                                  <p:stCondLst>
+                                    <p:cond delay="0"/>
+                                  </p:stCondLst>
+                                  <p:childTnLst>
+                                    <p:cmd type="call" cmd="playFrom(0.0)">
+                                      <p:cBhvr>
+                                        <p:cTn id="6" dur="5040" fill="hold"/>
+                                        <p:tgtEl>
+                                          <p:spTgt spid="5"/>
+                                        </p:tgtEl>
+                                      </p:cBhvr>
+                                    </p:cmd>
+                                  </p:childTnLst>
+                                </p:cTn>
+                              </p:par>
+                            </p:childTnLst>
+                          </p:cTn>
+                        </p:par>
+                      </p:childTnLst>
+                    </p:cTn>
+                  </p:par>
+                </p:childTnLst>
+              </p:cTn>
+              <p:prevCondLst>
+                <p:cond evt="onPrev" delay="0">
+                  <p:tgtEl>
+                    <p:sldTgt/>
+                  </p:tgtEl>
+                </p:cond>
+              </p:prevCondLst>
+              <p:nextCondLst>
+                <p:cond evt="onNext" delay="0">
+                  <p:tgtEl>
+                    <p:sldTgt/>
+                  </p:tgtEl>
+                </p:cond>
+              </p:nextCondLst>
+            </p:seq>
+            <p:video>
+              <p:cMediaNode vol="80000">
+                <p:cTn id="7" repeatCount="indefinite" fill="hold" display="0">
+                  <p:stCondLst>
+                    <p:cond delay="indefinite"/>
+                  </p:stCondLst>
+                </p:cTn>
+                <p:tgtEl>
+                  <p:spTgt spid="5"/>
+                </p:tgtEl>
+              </p:cMediaNode>
+            </p:video>
+            <p:seq concurrent="1" nextAc="seek">
+              <p:cTn id="8" restart="whenNotActive" fill="hold" evtFilter="cancelBubble" nodeType="interactiveSeq">
+                <p:stCondLst>
+                  <p:cond evt="onClick" delay="0">
+                    <p:tgtEl>
+                      <p:spTgt spid="5"/>
+                    </p:tgtEl>
+                  </p:cond>
+                </p:stCondLst>
+                <p:endSync evt="end" delay="0">
+                  <p:rtn val="all"/>
+                </p:endSync>
+                <p:childTnLst>
+                  <p:par>
+                    <p:cTn id="9" fill="hold">
+                      <p:stCondLst>
+                        <p:cond delay="0"/>
+                      </p:stCondLst>
+                      <p:childTnLst>
+                        <p:par>
+                          <p:cTn id="10" fill="hold">
+                            <p:stCondLst>
+                              <p:cond delay="0"/>
+                            </p:stCondLst>
+                            <p:childTnLst>
+                              <p:par>
+                                <p:cTn id="11" presetID="2" presetClass="mediacall" presetSubtype="0" fill="hold" nodeType="clickEffect">
+                                  <p:stCondLst>
+                                    <p:cond delay="0"/>
+                                  </p:stCondLst>
+                                  <p:childTnLst>
+                                    <p:cmd type="call" cmd="togglePause">
+                                      <p:cBhvr>
+                                        <p:cTn id="12" dur="1" fill="hold"/>
+                                        <p:tgtEl>
+                                          <p:spTgt spid="5"/>
+                                        </p:tgtEl>
+                                      </p:cBhvr>
+                                    </p:cmd>
+                                  </p:childTnLst>
+                                </p:cTn>
+                              </p:par>
+                            </p:childTnLst>
+                          </p:cTn>
+                        </p:par>
+                      </p:childTnLst>
+                    </p:cTn>
+                  </p:par>
+                </p:childTnLst>
+              </p:cTn>
+              <p:nextCondLst>
+                <p:cond evt="onClick" delay="0">
+                  <p:tgtEl>
+                    <p:spTgt spid="5"/>
+                  </p:tgtEl>
+                </p:cond>
+              </p:nextCondLst>
+            </p:seq>
+          </p:childTnLst>
+        </p:cTn>
+      </p:par>
+    </p:tnLst>
+  </p:timing>
 </p:sld>
 </file>
 
@@ -8137,7 +8860,10 @@
           <a:bodyPr/>
           <a:lstStyle/>
           <a:p>
-            <a:endParaRPr lang="en-US" dirty="0"/>
+            <a:r>
+              <a:rPr lang="en-US" dirty="0"/>
+              <a:t>Convenient &amp; free!</a:t>
+            </a:r>
           </a:p>
         </p:txBody>
       </p:sp>
@@ -8200,27 +8926,8 @@
           <a:p>
             <a:r>
               <a:rPr lang="en-US" dirty="0"/>
-              <a:t>Add a Slide Title - 2</a:t>
-            </a:r>
-          </a:p>
-        </p:txBody>
-      </p:sp>
-      <p:sp>
-        <p:nvSpPr>
-          <p:cNvPr id="3" name="Text Placeholder 2"/>
-          <p:cNvSpPr>
-            <a:spLocks noGrp="1"/>
-          </p:cNvSpPr>
-          <p:nvPr>
-            <p:ph type="body" idx="1"/>
-          </p:nvPr>
-        </p:nvSpPr>
-        <p:spPr/>
-        <p:txBody>
-          <a:bodyPr/>
-          <a:lstStyle/>
-          <a:p>
-            <a:endParaRPr lang="en-US"/>
+              <a:t>Yelp Fusion API</a:t>
+            </a:r>
           </a:p>
         </p:txBody>
       </p:sp>
@@ -8234,12 +8941,40 @@
             <p:ph sz="half" idx="2"/>
           </p:nvPr>
         </p:nvSpPr>
-        <p:spPr/>
-        <p:txBody>
-          <a:bodyPr/>
+        <p:spPr>
+          <a:xfrm>
+            <a:off x="0" y="2167035"/>
+            <a:ext cx="4191000" cy="3090765"/>
+          </a:xfrm>
+        </p:spPr>
+        <p:txBody>
+          <a:bodyPr>
+            <a:normAutofit/>
+          </a:bodyPr>
           <a:lstStyle/>
           <a:p>
-            <a:endParaRPr lang="en-US"/>
+            <a:r>
+              <a:rPr lang="en-US" sz="2400" dirty="0"/>
+              <a:t>Sample code for a quick start</a:t>
+            </a:r>
+          </a:p>
+          <a:p>
+            <a:endParaRPr lang="en-US" sz="2400" dirty="0"/>
+          </a:p>
+          <a:p>
+            <a:r>
+              <a:rPr lang="en-US" sz="2400" dirty="0"/>
+              <a:t>API request history</a:t>
+            </a:r>
+          </a:p>
+          <a:p>
+            <a:endParaRPr lang="en-US" sz="2400" dirty="0"/>
+          </a:p>
+          <a:p>
+            <a:r>
+              <a:rPr lang="en-US" sz="2400" dirty="0"/>
+              <a:t>Legend for error responses</a:t>
+            </a:r>
           </a:p>
         </p:txBody>
       </p:sp>
@@ -8281,6 +9016,36 @@
           </a:p>
         </p:txBody>
       </p:sp>
+      <p:pic>
+        <p:nvPicPr>
+          <p:cNvPr id="8" name="Picture 7">
+            <a:extLst>
+              <a:ext uri="{FF2B5EF4-FFF2-40B4-BE49-F238E27FC236}">
+                <a16:creationId xmlns:a16="http://schemas.microsoft.com/office/drawing/2014/main" id="{C440E7C0-E374-8FC2-72AF-E889B2DFEF23}"/>
+              </a:ext>
+            </a:extLst>
+          </p:cNvPr>
+          <p:cNvPicPr>
+            <a:picLocks noChangeAspect="1"/>
+          </p:cNvPicPr>
+          <p:nvPr/>
+        </p:nvPicPr>
+        <p:blipFill>
+          <a:blip r:embed="rId2"/>
+          <a:stretch>
+            <a:fillRect/>
+          </a:stretch>
+        </p:blipFill>
+        <p:spPr>
+          <a:xfrm>
+            <a:off x="4419600" y="1842796"/>
+            <a:ext cx="7278301" cy="4488457"/>
+          </a:xfrm>
+          <a:prstGeom prst="rect">
+            <a:avLst/>
+          </a:prstGeom>
+        </p:spPr>
+      </p:pic>
     </p:spTree>
     <p:extLst>
       <p:ext uri="{BB962C8B-B14F-4D97-AF65-F5344CB8AC3E}">
@@ -8360,7 +9125,10 @@
           <a:bodyPr/>
           <a:lstStyle/>
           <a:p>
-            <a:endParaRPr lang="en-US" dirty="0"/>
+            <a:r>
+              <a:rPr lang="en-US" dirty="0"/>
+              <a:t>Totally functional and easy-to-use</a:t>
+            </a:r>
           </a:p>
         </p:txBody>
       </p:sp>
@@ -8406,6 +9174,39 @@
           <a:chExt cx="0" cy="0"/>
         </a:xfrm>
       </p:grpSpPr>
+      <p:pic>
+        <p:nvPicPr>
+          <p:cNvPr id="7" name="Picture 6">
+            <a:extLst>
+              <a:ext uri="{FF2B5EF4-FFF2-40B4-BE49-F238E27FC236}">
+                <a16:creationId xmlns:a16="http://schemas.microsoft.com/office/drawing/2014/main" id="{1EEE7DD6-EB47-00BA-E135-1A8FDECC681F}"/>
+              </a:ext>
+            </a:extLst>
+          </p:cNvPr>
+          <p:cNvPicPr>
+            <a:picLocks noChangeAspect="1"/>
+          </p:cNvPicPr>
+          <p:nvPr/>
+        </p:nvPicPr>
+        <p:blipFill>
+          <a:blip r:embed="rId2"/>
+          <a:stretch>
+            <a:fillRect/>
+          </a:stretch>
+        </p:blipFill>
+        <p:spPr>
+          <a:xfrm>
+            <a:off x="2438400" y="685800"/>
+            <a:ext cx="6248400" cy="5356334"/>
+          </a:xfrm>
+          <a:prstGeom prst="rect">
+            <a:avLst/>
+          </a:prstGeom>
+          <a:effectLst>
+            <a:softEdge rad="88900"/>
+          </a:effectLst>
+        </p:spPr>
+      </p:pic>
       <p:sp>
         <p:nvSpPr>
           <p:cNvPr id="2" name="Title 1"/>
@@ -8416,15 +9217,153 @@
             <p:ph type="title"/>
           </p:nvPr>
         </p:nvSpPr>
-        <p:spPr/>
-        <p:txBody>
-          <a:bodyPr/>
+        <p:spPr>
+          <a:xfrm>
+            <a:off x="838200" y="365126"/>
+            <a:ext cx="10515600" cy="1145224"/>
+          </a:xfrm>
+        </p:spPr>
+        <p:txBody>
+          <a:bodyPr anchor="b">
+            <a:normAutofit/>
+          </a:bodyPr>
           <a:lstStyle/>
           <a:p>
             <a:r>
               <a:rPr lang="en-US" dirty="0"/>
-              <a:t>Add a Slide Title - 3</a:t>
-            </a:r>
+              <a:t>Flask</a:t>
+            </a:r>
+          </a:p>
+        </p:txBody>
+      </p:sp>
+      <p:sp>
+        <p:nvSpPr>
+          <p:cNvPr id="9" name="Content Placeholder 3">
+            <a:extLst>
+              <a:ext uri="{FF2B5EF4-FFF2-40B4-BE49-F238E27FC236}">
+                <a16:creationId xmlns:a16="http://schemas.microsoft.com/office/drawing/2014/main" id="{758428B9-2839-5EE1-B05A-D685236437B9}"/>
+              </a:ext>
+            </a:extLst>
+          </p:cNvPr>
+          <p:cNvSpPr>
+            <a:spLocks noGrp="1"/>
+          </p:cNvSpPr>
+          <p:nvPr>
+            <p:ph sz="half" idx="2"/>
+          </p:nvPr>
+        </p:nvSpPr>
+        <p:spPr>
+          <a:xfrm>
+            <a:off x="7010400" y="4267200"/>
+            <a:ext cx="5029200" cy="2136775"/>
+          </a:xfrm>
+          <a:gradFill flip="none" rotWithShape="1">
+            <a:gsLst>
+              <a:gs pos="0">
+                <a:schemeClr val="accent2">
+                  <a:lumMod val="67000"/>
+                </a:schemeClr>
+              </a:gs>
+              <a:gs pos="48000">
+                <a:schemeClr val="accent2">
+                  <a:lumMod val="97000"/>
+                  <a:lumOff val="3000"/>
+                </a:schemeClr>
+              </a:gs>
+              <a:gs pos="100000">
+                <a:schemeClr val="accent2">
+                  <a:lumMod val="60000"/>
+                  <a:lumOff val="40000"/>
+                </a:schemeClr>
+              </a:gs>
+            </a:gsLst>
+            <a:lin ang="16200000" scaled="1"/>
+            <a:tileRect/>
+          </a:gradFill>
+        </p:spPr>
+        <p:txBody>
+          <a:bodyPr>
+            <a:normAutofit/>
+          </a:bodyPr>
+          <a:lstStyle/>
+          <a:p>
+            <a:pPr marL="0" indent="0">
+              <a:buNone/>
+            </a:pPr>
+            <a:r>
+              <a:rPr lang="en-US" sz="1800" dirty="0">
+                <a:solidFill>
+                  <a:schemeClr val="bg2"/>
+                </a:solidFill>
+              </a:rPr>
+              <a:t>Our backend and workhorse for our project </a:t>
+            </a:r>
+            <a:r>
+              <a:rPr lang="en-US" sz="1800" dirty="0">
+                <a:solidFill>
+                  <a:schemeClr val="bg2"/>
+                </a:solidFill>
+                <a:effectLst>
+                  <a:outerShdw blurRad="50800" dist="38100" dir="2700000" algn="tl" rotWithShape="0">
+                    <a:prstClr val="black">
+                      <a:alpha val="40000"/>
+                    </a:prstClr>
+                  </a:outerShdw>
+                </a:effectLst>
+              </a:rPr>
+              <a:t>was</a:t>
+            </a:r>
+            <a:r>
+              <a:rPr lang="en-US" sz="1800" dirty="0">
+                <a:solidFill>
+                  <a:schemeClr val="bg2"/>
+                </a:solidFill>
+              </a:rPr>
+              <a:t> Flask.</a:t>
+            </a:r>
+          </a:p>
+          <a:p>
+            <a:pPr marL="0" indent="0">
+              <a:buNone/>
+            </a:pPr>
+            <a:endParaRPr lang="en-US" sz="1800" dirty="0">
+              <a:solidFill>
+                <a:schemeClr val="bg2"/>
+              </a:solidFill>
+            </a:endParaRPr>
+          </a:p>
+          <a:p>
+            <a:pPr marL="0" indent="0">
+              <a:buNone/>
+            </a:pPr>
+            <a:r>
+              <a:rPr lang="en-US" sz="1800" dirty="0">
+                <a:solidFill>
+                  <a:schemeClr val="bg2"/>
+                </a:solidFill>
+              </a:rPr>
+              <a:t>Flask made requests from our API and grabbed the data for our JavaScript to use and make our displays.</a:t>
+            </a:r>
+          </a:p>
+          <a:p>
+            <a:pPr marL="0" indent="0">
+              <a:buNone/>
+            </a:pPr>
+            <a:endParaRPr lang="en-US" sz="1800" dirty="0">
+              <a:solidFill>
+                <a:schemeClr val="bg2"/>
+              </a:solidFill>
+            </a:endParaRPr>
+          </a:p>
+          <a:p>
+            <a:pPr marL="0" indent="0">
+              <a:buNone/>
+            </a:pPr>
+            <a:endParaRPr lang="en-US" sz="1800" dirty="0">
+              <a:solidFill>
+                <a:schemeClr val="bg2"/>
+              </a:solidFill>
+            </a:endParaRPr>
           </a:p>
         </p:txBody>
       </p:sp>
@@ -8507,7 +9446,10 @@
           <a:bodyPr/>
           <a:lstStyle/>
           <a:p>
-            <a:endParaRPr lang="en-US" dirty="0"/>
+            <a:r>
+              <a:rPr lang="en-US" dirty="0"/>
+              <a:t>Like peanut butter and jelly….or chocolate….or....</a:t>
+            </a:r>
           </a:p>
         </p:txBody>
       </p:sp>

</xml_diff>

<commit_message>
Further edits to ppt.
</commit_message>
<xml_diff>
--- a/YelpForTravelHelp.pptx
+++ b/YelpForTravelHelp.pptx
@@ -5,10 +5,10 @@
     <p:sldMasterId id="2147483648" r:id="rId1"/>
   </p:sldMasterIdLst>
   <p:notesMasterIdLst>
-    <p:notesMasterId r:id="rId16"/>
+    <p:notesMasterId r:id="rId17"/>
   </p:notesMasterIdLst>
   <p:handoutMasterIdLst>
-    <p:handoutMasterId r:id="rId17"/>
+    <p:handoutMasterId r:id="rId18"/>
   </p:handoutMasterIdLst>
   <p:sldIdLst>
     <p:sldId id="256" r:id="rId2"/>
@@ -18,13 +18,14 @@
     <p:sldId id="261" r:id="rId6"/>
     <p:sldId id="262" r:id="rId7"/>
     <p:sldId id="268" r:id="rId8"/>
-    <p:sldId id="263" r:id="rId9"/>
-    <p:sldId id="267" r:id="rId10"/>
-    <p:sldId id="264" r:id="rId11"/>
-    <p:sldId id="269" r:id="rId12"/>
-    <p:sldId id="265" r:id="rId13"/>
-    <p:sldId id="270" r:id="rId14"/>
-    <p:sldId id="266" r:id="rId15"/>
+    <p:sldId id="271" r:id="rId9"/>
+    <p:sldId id="263" r:id="rId10"/>
+    <p:sldId id="267" r:id="rId11"/>
+    <p:sldId id="264" r:id="rId12"/>
+    <p:sldId id="269" r:id="rId13"/>
+    <p:sldId id="265" r:id="rId14"/>
+    <p:sldId id="270" r:id="rId15"/>
+    <p:sldId id="266" r:id="rId16"/>
   </p:sldIdLst>
   <p:sldSz cx="12192000" cy="6858000"/>
   <p:notesSz cx="6858000" cy="9144000"/>
@@ -137,6 +138,7 @@
 <file path=ppt/revisionInfo.xml><?xml version="1.0" encoding="utf-8"?>
 <p1510:revInfo xmlns:a="http://schemas.openxmlformats.org/drawingml/2006/main" xmlns:r="http://schemas.openxmlformats.org/officeDocument/2006/relationships" xmlns:p1510="http://schemas.microsoft.com/office/powerpoint/2015/10/main">
   <p1510:revLst>
+    <p1510:client id="{98F166EF-7EB6-4E95-A5E5-94C510AD2A89}" v="5" dt="2023-10-06T00:58:19.725"/>
     <p1510:client id="{9BD4B7DE-F438-4D69-91FE-30D9F4395912}" v="25" dt="2023-10-05T01:39:33.153"/>
     <p1510:client id="{BF658A42-85CA-4FCE-9751-D84327CF6E22}" v="6" dt="2023-10-06T00:13:32.326"/>
   </p1510:revLst>
@@ -145,6 +147,106 @@
 
 <file path=ppt/changesInfos/changesInfo1.xml><?xml version="1.0" encoding="utf-8"?>
 <pc:chgInfo xmlns:a="http://schemas.openxmlformats.org/drawingml/2006/main" xmlns:r="http://schemas.openxmlformats.org/officeDocument/2006/relationships" xmlns:ac="http://schemas.microsoft.com/office/drawing/2013/main/command" xmlns:pc="http://schemas.microsoft.com/office/powerpoint/2013/main/command">
+  <pc:docChgLst>
+    <pc:chgData name="Jeremy Magee" userId="54b62a32ee7be8e2" providerId="LiveId" clId="{98F166EF-7EB6-4E95-A5E5-94C510AD2A89}"/>
+    <pc:docChg chg="undo redo custSel addSld delSld modSld">
+      <pc:chgData name="Jeremy Magee" userId="54b62a32ee7be8e2" providerId="LiveId" clId="{98F166EF-7EB6-4E95-A5E5-94C510AD2A89}" dt="2023-10-06T00:58:19.721" v="64" actId="20577"/>
+      <pc:docMkLst>
+        <pc:docMk/>
+      </pc:docMkLst>
+      <pc:sldChg chg="modSp mod">
+        <pc:chgData name="Jeremy Magee" userId="54b62a32ee7be8e2" providerId="LiveId" clId="{98F166EF-7EB6-4E95-A5E5-94C510AD2A89}" dt="2023-10-06T00:43:27.769" v="62" actId="2711"/>
+        <pc:sldMkLst>
+          <pc:docMk/>
+          <pc:sldMk cId="682195269" sldId="257"/>
+        </pc:sldMkLst>
+        <pc:spChg chg="mod">
+          <ac:chgData name="Jeremy Magee" userId="54b62a32ee7be8e2" providerId="LiveId" clId="{98F166EF-7EB6-4E95-A5E5-94C510AD2A89}" dt="2023-10-06T00:43:27.769" v="62" actId="2711"/>
+          <ac:spMkLst>
+            <pc:docMk/>
+            <pc:sldMk cId="682195269" sldId="257"/>
+            <ac:spMk id="3" creationId="{00000000-0000-0000-0000-000000000000}"/>
+          </ac:spMkLst>
+        </pc:spChg>
+      </pc:sldChg>
+      <pc:sldChg chg="modSp">
+        <pc:chgData name="Jeremy Magee" userId="54b62a32ee7be8e2" providerId="LiveId" clId="{98F166EF-7EB6-4E95-A5E5-94C510AD2A89}" dt="2023-10-06T00:58:19.721" v="64" actId="20577"/>
+        <pc:sldMkLst>
+          <pc:docMk/>
+          <pc:sldMk cId="2426022026" sldId="260"/>
+        </pc:sldMkLst>
+        <pc:graphicFrameChg chg="mod">
+          <ac:chgData name="Jeremy Magee" userId="54b62a32ee7be8e2" providerId="LiveId" clId="{98F166EF-7EB6-4E95-A5E5-94C510AD2A89}" dt="2023-10-06T00:58:19.721" v="64" actId="20577"/>
+          <ac:graphicFrameMkLst>
+            <pc:docMk/>
+            <pc:sldMk cId="2426022026" sldId="260"/>
+            <ac:graphicFrameMk id="6" creationId="{00000000-0000-0000-0000-000000000000}"/>
+          </ac:graphicFrameMkLst>
+        </pc:graphicFrameChg>
+      </pc:sldChg>
+      <pc:sldChg chg="delSp modSp mod">
+        <pc:chgData name="Jeremy Magee" userId="54b62a32ee7be8e2" providerId="LiveId" clId="{98F166EF-7EB6-4E95-A5E5-94C510AD2A89}" dt="2023-10-06T00:40:59.931" v="56" actId="6549"/>
+        <pc:sldMkLst>
+          <pc:docMk/>
+          <pc:sldMk cId="2521986180" sldId="266"/>
+        </pc:sldMkLst>
+        <pc:spChg chg="mod">
+          <ac:chgData name="Jeremy Magee" userId="54b62a32ee7be8e2" providerId="LiveId" clId="{98F166EF-7EB6-4E95-A5E5-94C510AD2A89}" dt="2023-10-06T00:40:35.219" v="50" actId="1076"/>
+          <ac:spMkLst>
+            <pc:docMk/>
+            <pc:sldMk cId="2521986180" sldId="266"/>
+            <ac:spMk id="2" creationId="{00000000-0000-0000-0000-000000000000}"/>
+          </ac:spMkLst>
+        </pc:spChg>
+        <pc:spChg chg="del mod">
+          <ac:chgData name="Jeremy Magee" userId="54b62a32ee7be8e2" providerId="LiveId" clId="{98F166EF-7EB6-4E95-A5E5-94C510AD2A89}" dt="2023-10-06T00:40:38.078" v="51" actId="478"/>
+          <ac:spMkLst>
+            <pc:docMk/>
+            <pc:sldMk cId="2521986180" sldId="266"/>
+            <ac:spMk id="3" creationId="{00000000-0000-0000-0000-000000000000}"/>
+          </ac:spMkLst>
+        </pc:spChg>
+        <pc:spChg chg="mod">
+          <ac:chgData name="Jeremy Magee" userId="54b62a32ee7be8e2" providerId="LiveId" clId="{98F166EF-7EB6-4E95-A5E5-94C510AD2A89}" dt="2023-10-06T00:40:59.931" v="56" actId="6549"/>
+          <ac:spMkLst>
+            <pc:docMk/>
+            <pc:sldMk cId="2521986180" sldId="266"/>
+            <ac:spMk id="4" creationId="{00000000-0000-0000-0000-000000000000}"/>
+          </ac:spMkLst>
+        </pc:spChg>
+      </pc:sldChg>
+      <pc:sldChg chg="modSp add mod">
+        <pc:chgData name="Jeremy Magee" userId="54b62a32ee7be8e2" providerId="LiveId" clId="{98F166EF-7EB6-4E95-A5E5-94C510AD2A89}" dt="2023-10-06T00:41:21.564" v="60" actId="1076"/>
+        <pc:sldMkLst>
+          <pc:docMk/>
+          <pc:sldMk cId="372948772" sldId="271"/>
+        </pc:sldMkLst>
+        <pc:spChg chg="mod">
+          <ac:chgData name="Jeremy Magee" userId="54b62a32ee7be8e2" providerId="LiveId" clId="{98F166EF-7EB6-4E95-A5E5-94C510AD2A89}" dt="2023-10-06T00:41:21.564" v="60" actId="1076"/>
+          <ac:spMkLst>
+            <pc:docMk/>
+            <pc:sldMk cId="372948772" sldId="271"/>
+            <ac:spMk id="2" creationId="{00000000-0000-0000-0000-000000000000}"/>
+          </ac:spMkLst>
+        </pc:spChg>
+        <pc:picChg chg="mod">
+          <ac:chgData name="Jeremy Magee" userId="54b62a32ee7be8e2" providerId="LiveId" clId="{98F166EF-7EB6-4E95-A5E5-94C510AD2A89}" dt="2023-10-06T00:41:14.901" v="59" actId="1076"/>
+          <ac:picMkLst>
+            <pc:docMk/>
+            <pc:sldMk cId="372948772" sldId="271"/>
+            <ac:picMk id="5" creationId="{F2544FD6-02F6-1CEA-4415-0E4B6181EEEC}"/>
+          </ac:picMkLst>
+        </pc:picChg>
+      </pc:sldChg>
+      <pc:sldChg chg="add del">
+        <pc:chgData name="Jeremy Magee" userId="54b62a32ee7be8e2" providerId="LiveId" clId="{98F166EF-7EB6-4E95-A5E5-94C510AD2A89}" dt="2023-10-06T00:40:54.342" v="54"/>
+        <pc:sldMkLst>
+          <pc:docMk/>
+          <pc:sldMk cId="4241436107" sldId="271"/>
+        </pc:sldMkLst>
+      </pc:sldChg>
+    </pc:docChg>
+  </pc:docChgLst>
   <pc:docChgLst>
     <pc:chgData name="Jeremy Magee" userId="54b62a32ee7be8e2" providerId="LiveId" clId="{9BD4B7DE-F438-4D69-91FE-30D9F4395912}"/>
     <pc:docChg chg="addSld modSld sldOrd">
@@ -1459,13 +1561,8 @@
         <a:p>
           <a:r>
             <a:rPr lang="en-US" dirty="0"/>
-            <a:t>Step 3 </a:t>
+            <a:t>Step 3 JavaScript</a:t>
           </a:r>
-          <a:r>
-            <a:rPr lang="en-US" dirty="0" err="1"/>
-            <a:t>Javascript</a:t>
-          </a:r>
-          <a:endParaRPr lang="en-US" dirty="0"/>
         </a:p>
       </dgm:t>
     </dgm:pt>
@@ -1811,13 +1908,8 @@
           </a:pPr>
           <a:r>
             <a:rPr lang="en-US" sz="2700" kern="1200" dirty="0"/>
-            <a:t>Step 3 </a:t>
+            <a:t>Step 3 JavaScript</a:t>
           </a:r>
-          <a:r>
-            <a:rPr lang="en-US" sz="2700" kern="1200" dirty="0" err="1"/>
-            <a:t>Javascript</a:t>
-          </a:r>
-          <a:endParaRPr lang="en-US" sz="2700" kern="1200" dirty="0"/>
         </a:p>
       </dsp:txBody>
       <dsp:txXfrm rot="10800000">
@@ -7298,6 +7390,92 @@
       </p:grpSpPr>
       <p:sp>
         <p:nvSpPr>
+          <p:cNvPr id="2" name="Title 1"/>
+          <p:cNvSpPr>
+            <a:spLocks noGrp="1"/>
+          </p:cNvSpPr>
+          <p:nvPr>
+            <p:ph type="title"/>
+          </p:nvPr>
+        </p:nvSpPr>
+        <p:spPr/>
+        <p:txBody>
+          <a:bodyPr/>
+          <a:lstStyle/>
+          <a:p>
+            <a:r>
+              <a:rPr lang="en-US" dirty="0"/>
+              <a:t>Html/JS</a:t>
+            </a:r>
+          </a:p>
+        </p:txBody>
+      </p:sp>
+      <p:sp>
+        <p:nvSpPr>
+          <p:cNvPr id="3" name="Text Placeholder 2"/>
+          <p:cNvSpPr>
+            <a:spLocks noGrp="1"/>
+          </p:cNvSpPr>
+          <p:nvPr>
+            <p:ph type="body" idx="1"/>
+          </p:nvPr>
+        </p:nvSpPr>
+        <p:spPr/>
+        <p:txBody>
+          <a:bodyPr/>
+          <a:lstStyle/>
+          <a:p>
+            <a:r>
+              <a:rPr lang="en-US" dirty="0"/>
+              <a:t>Like peanut butter and jelly….or chocolate….or....</a:t>
+            </a:r>
+          </a:p>
+        </p:txBody>
+      </p:sp>
+    </p:spTree>
+    <p:extLst>
+      <p:ext uri="{BB962C8B-B14F-4D97-AF65-F5344CB8AC3E}">
+        <p14:creationId xmlns:p14="http://schemas.microsoft.com/office/powerpoint/2010/main" val="1407246764"/>
+      </p:ext>
+    </p:extLst>
+  </p:cSld>
+  <p:clrMapOvr>
+    <a:masterClrMapping/>
+  </p:clrMapOvr>
+  <mc:AlternateContent xmlns:mc="http://schemas.openxmlformats.org/markup-compatibility/2006" xmlns:p14="http://schemas.microsoft.com/office/powerpoint/2010/main">
+    <mc:Choice Requires="p14">
+      <p:transition spd="med" p14:dur="700">
+        <p:fade/>
+      </p:transition>
+    </mc:Choice>
+    <mc:Fallback xmlns="">
+      <p:transition spd="med">
+        <p:fade/>
+      </p:transition>
+    </mc:Fallback>
+  </mc:AlternateContent>
+</p:sld>
+</file>
+
+<file path=ppt/slides/slide11.xml><?xml version="1.0" encoding="utf-8"?>
+<p:sld xmlns:a="http://schemas.openxmlformats.org/drawingml/2006/main" xmlns:r="http://schemas.openxmlformats.org/officeDocument/2006/relationships" xmlns:p="http://schemas.openxmlformats.org/presentationml/2006/main">
+  <p:cSld>
+    <p:spTree>
+      <p:nvGrpSpPr>
+        <p:cNvPr id="1" name=""/>
+        <p:cNvGrpSpPr/>
+        <p:nvPr/>
+      </p:nvGrpSpPr>
+      <p:grpSpPr>
+        <a:xfrm>
+          <a:off x="0" y="0"/>
+          <a:ext cx="0" cy="0"/>
+          <a:chOff x="0" y="0"/>
+          <a:chExt cx="0" cy="0"/>
+        </a:xfrm>
+      </p:grpSpPr>
+      <p:sp>
+        <p:nvSpPr>
           <p:cNvPr id="2" name="Title 1">
             <a:extLst>
               <a:ext uri="{FF2B5EF4-FFF2-40B4-BE49-F238E27FC236}">
@@ -7558,92 +7736,6 @@
 </p:sld>
 </file>
 
-<file path=ppt/slides/slide11.xml><?xml version="1.0" encoding="utf-8"?>
-<p:sld xmlns:a="http://schemas.openxmlformats.org/drawingml/2006/main" xmlns:r="http://schemas.openxmlformats.org/officeDocument/2006/relationships" xmlns:p="http://schemas.openxmlformats.org/presentationml/2006/main">
-  <p:cSld>
-    <p:spTree>
-      <p:nvGrpSpPr>
-        <p:cNvPr id="1" name=""/>
-        <p:cNvGrpSpPr/>
-        <p:nvPr/>
-      </p:nvGrpSpPr>
-      <p:grpSpPr>
-        <a:xfrm>
-          <a:off x="0" y="0"/>
-          <a:ext cx="0" cy="0"/>
-          <a:chOff x="0" y="0"/>
-          <a:chExt cx="0" cy="0"/>
-        </a:xfrm>
-      </p:grpSpPr>
-      <p:sp>
-        <p:nvSpPr>
-          <p:cNvPr id="2" name="Title 1"/>
-          <p:cNvSpPr>
-            <a:spLocks noGrp="1"/>
-          </p:cNvSpPr>
-          <p:nvPr>
-            <p:ph type="title"/>
-          </p:nvPr>
-        </p:nvSpPr>
-        <p:spPr/>
-        <p:txBody>
-          <a:bodyPr/>
-          <a:lstStyle/>
-          <a:p>
-            <a:r>
-              <a:rPr lang="en-US" dirty="0"/>
-              <a:t>Leaflet</a:t>
-            </a:r>
-          </a:p>
-        </p:txBody>
-      </p:sp>
-      <p:sp>
-        <p:nvSpPr>
-          <p:cNvPr id="3" name="Text Placeholder 2"/>
-          <p:cNvSpPr>
-            <a:spLocks noGrp="1"/>
-          </p:cNvSpPr>
-          <p:nvPr>
-            <p:ph type="body" idx="1"/>
-          </p:nvPr>
-        </p:nvSpPr>
-        <p:spPr/>
-        <p:txBody>
-          <a:bodyPr/>
-          <a:lstStyle/>
-          <a:p>
-            <a:r>
-              <a:rPr lang="en-US" dirty="0"/>
-              <a:t>You like maps? We put maps IN your maps!</a:t>
-            </a:r>
-          </a:p>
-        </p:txBody>
-      </p:sp>
-    </p:spTree>
-    <p:extLst>
-      <p:ext uri="{BB962C8B-B14F-4D97-AF65-F5344CB8AC3E}">
-        <p14:creationId xmlns:p14="http://schemas.microsoft.com/office/powerpoint/2010/main" val="3863911453"/>
-      </p:ext>
-    </p:extLst>
-  </p:cSld>
-  <p:clrMapOvr>
-    <a:masterClrMapping/>
-  </p:clrMapOvr>
-  <mc:AlternateContent xmlns:mc="http://schemas.openxmlformats.org/markup-compatibility/2006" xmlns:p14="http://schemas.microsoft.com/office/powerpoint/2010/main">
-    <mc:Choice Requires="p14">
-      <p:transition spd="med" p14:dur="700">
-        <p:fade/>
-      </p:transition>
-    </mc:Choice>
-    <mc:Fallback xmlns="">
-      <p:transition spd="med">
-        <p:fade/>
-      </p:transition>
-    </mc:Fallback>
-  </mc:AlternateContent>
-</p:sld>
-</file>
-
 <file path=ppt/slides/slide12.xml><?xml version="1.0" encoding="utf-8"?>
 <p:sld xmlns:a="http://schemas.openxmlformats.org/drawingml/2006/main" xmlns:r="http://schemas.openxmlformats.org/officeDocument/2006/relationships" xmlns:p="http://schemas.openxmlformats.org/presentationml/2006/main">
   <p:cSld>
@@ -7685,12 +7777,12 @@
       </p:sp>
       <p:sp>
         <p:nvSpPr>
-          <p:cNvPr id="3" name="Content Placeholder 2"/>
+          <p:cNvPr id="3" name="Text Placeholder 2"/>
           <p:cNvSpPr>
             <a:spLocks noGrp="1"/>
           </p:cNvSpPr>
           <p:nvPr>
-            <p:ph idx="1"/>
+            <p:ph type="body" idx="1"/>
           </p:nvPr>
         </p:nvSpPr>
         <p:spPr/>
@@ -7698,28 +7790,9 @@
           <a:bodyPr/>
           <a:lstStyle/>
           <a:p>
-            <a:endParaRPr lang="en-US"/>
-          </a:p>
-        </p:txBody>
-      </p:sp>
-      <p:sp>
-        <p:nvSpPr>
-          <p:cNvPr id="4" name="Text Placeholder 3"/>
-          <p:cNvSpPr>
-            <a:spLocks noGrp="1"/>
-          </p:cNvSpPr>
-          <p:nvPr>
-            <p:ph type="body" sz="half" idx="2"/>
-          </p:nvPr>
-        </p:nvSpPr>
-        <p:spPr/>
-        <p:txBody>
-          <a:bodyPr/>
-          <a:lstStyle/>
-          <a:p>
             <a:r>
               <a:rPr lang="en-US" dirty="0"/>
-              <a:t>Leaflet gave us the power to create markers for our desired locations and bind pop-up messages to each marker, based on user-directed data.</a:t>
+              <a:t>You like maps? We put maps IN your maps!</a:t>
             </a:r>
           </a:p>
         </p:txBody>
@@ -7727,7 +7800,7 @@
     </p:spTree>
     <p:extLst>
       <p:ext uri="{BB962C8B-B14F-4D97-AF65-F5344CB8AC3E}">
-        <p14:creationId xmlns:p14="http://schemas.microsoft.com/office/powerpoint/2010/main" val="1827431122"/>
+        <p14:creationId xmlns:p14="http://schemas.microsoft.com/office/powerpoint/2010/main" val="3863911453"/>
       </p:ext>
     </p:extLst>
   </p:cSld>
@@ -7783,19 +7856,19 @@
           <a:p>
             <a:r>
               <a:rPr lang="en-US" dirty="0"/>
-              <a:t>The Finished Project</a:t>
-            </a:r>
-          </a:p>
-        </p:txBody>
-      </p:sp>
-      <p:sp>
-        <p:nvSpPr>
-          <p:cNvPr id="3" name="Text Placeholder 2"/>
+              <a:t>Leaflet</a:t>
+            </a:r>
+          </a:p>
+        </p:txBody>
+      </p:sp>
+      <p:sp>
+        <p:nvSpPr>
+          <p:cNvPr id="3" name="Content Placeholder 2"/>
           <p:cNvSpPr>
             <a:spLocks noGrp="1"/>
           </p:cNvSpPr>
           <p:nvPr>
-            <p:ph type="body" idx="1"/>
+            <p:ph idx="1"/>
           </p:nvPr>
         </p:nvSpPr>
         <p:spPr/>
@@ -7803,14 +7876,36 @@
           <a:bodyPr/>
           <a:lstStyle/>
           <a:p>
-            <a:endParaRPr lang="en-US" dirty="0"/>
+            <a:endParaRPr lang="en-US"/>
+          </a:p>
+        </p:txBody>
+      </p:sp>
+      <p:sp>
+        <p:nvSpPr>
+          <p:cNvPr id="4" name="Text Placeholder 3"/>
+          <p:cNvSpPr>
+            <a:spLocks noGrp="1"/>
+          </p:cNvSpPr>
+          <p:nvPr>
+            <p:ph type="body" sz="half" idx="2"/>
+          </p:nvPr>
+        </p:nvSpPr>
+        <p:spPr/>
+        <p:txBody>
+          <a:bodyPr/>
+          <a:lstStyle/>
+          <a:p>
+            <a:r>
+              <a:rPr lang="en-US" dirty="0"/>
+              <a:t>Leaflet gave us the power to create markers for our desired locations and bind pop-up messages to each marker, based on user-directed data.</a:t>
+            </a:r>
           </a:p>
         </p:txBody>
       </p:sp>
     </p:spTree>
     <p:extLst>
       <p:ext uri="{BB962C8B-B14F-4D97-AF65-F5344CB8AC3E}">
-        <p14:creationId xmlns:p14="http://schemas.microsoft.com/office/powerpoint/2010/main" val="2176088558"/>
+        <p14:creationId xmlns:p14="http://schemas.microsoft.com/office/powerpoint/2010/main" val="1827431122"/>
       </p:ext>
     </p:extLst>
   </p:cSld>
@@ -7859,9 +7954,92 @@
             <p:ph type="title"/>
           </p:nvPr>
         </p:nvSpPr>
+        <p:spPr/>
+        <p:txBody>
+          <a:bodyPr/>
+          <a:lstStyle/>
+          <a:p>
+            <a:r>
+              <a:rPr lang="en-US" dirty="0"/>
+              <a:t>The Finished Project</a:t>
+            </a:r>
+          </a:p>
+        </p:txBody>
+      </p:sp>
+      <p:sp>
+        <p:nvSpPr>
+          <p:cNvPr id="3" name="Text Placeholder 2"/>
+          <p:cNvSpPr>
+            <a:spLocks noGrp="1"/>
+          </p:cNvSpPr>
+          <p:nvPr>
+            <p:ph type="body" idx="1"/>
+          </p:nvPr>
+        </p:nvSpPr>
+        <p:spPr/>
+        <p:txBody>
+          <a:bodyPr/>
+          <a:lstStyle/>
+          <a:p>
+            <a:endParaRPr lang="en-US" dirty="0"/>
+          </a:p>
+        </p:txBody>
+      </p:sp>
+    </p:spTree>
+    <p:extLst>
+      <p:ext uri="{BB962C8B-B14F-4D97-AF65-F5344CB8AC3E}">
+        <p14:creationId xmlns:p14="http://schemas.microsoft.com/office/powerpoint/2010/main" val="2176088558"/>
+      </p:ext>
+    </p:extLst>
+  </p:cSld>
+  <p:clrMapOvr>
+    <a:masterClrMapping/>
+  </p:clrMapOvr>
+  <mc:AlternateContent xmlns:mc="http://schemas.openxmlformats.org/markup-compatibility/2006" xmlns:p14="http://schemas.microsoft.com/office/powerpoint/2010/main">
+    <mc:Choice Requires="p14">
+      <p:transition spd="med" p14:dur="700">
+        <p:fade/>
+      </p:transition>
+    </mc:Choice>
+    <mc:Fallback xmlns="">
+      <p:transition spd="med">
+        <p:fade/>
+      </p:transition>
+    </mc:Fallback>
+  </mc:AlternateContent>
+</p:sld>
+</file>
+
+<file path=ppt/slides/slide15.xml><?xml version="1.0" encoding="utf-8"?>
+<p:sld xmlns:a="http://schemas.openxmlformats.org/drawingml/2006/main" xmlns:r="http://schemas.openxmlformats.org/officeDocument/2006/relationships" xmlns:p="http://schemas.openxmlformats.org/presentationml/2006/main">
+  <p:cSld>
+    <p:spTree>
+      <p:nvGrpSpPr>
+        <p:cNvPr id="1" name=""/>
+        <p:cNvGrpSpPr/>
+        <p:nvPr/>
+      </p:nvGrpSpPr>
+      <p:grpSpPr>
+        <a:xfrm>
+          <a:off x="0" y="0"/>
+          <a:ext cx="0" cy="0"/>
+          <a:chOff x="0" y="0"/>
+          <a:chExt cx="0" cy="0"/>
+        </a:xfrm>
+      </p:grpSpPr>
+      <p:sp>
+        <p:nvSpPr>
+          <p:cNvPr id="2" name="Title 1"/>
+          <p:cNvSpPr>
+            <a:spLocks noGrp="1"/>
+          </p:cNvSpPr>
+          <p:nvPr>
+            <p:ph type="title"/>
+          </p:nvPr>
+        </p:nvSpPr>
         <p:spPr>
           <a:xfrm>
-            <a:off x="2438399" y="1371600"/>
+            <a:off x="2514600" y="990600"/>
             <a:ext cx="3429000" cy="627062"/>
           </a:xfrm>
         </p:spPr>
@@ -7871,27 +8049,8 @@
           <a:p>
             <a:r>
               <a:rPr lang="en-US" b="1" dirty="0"/>
-              <a:t>Yelp, for Help!</a:t>
-            </a:r>
-          </a:p>
-        </p:txBody>
-      </p:sp>
-      <p:sp>
-        <p:nvSpPr>
-          <p:cNvPr id="3" name="Picture Placeholder 2" descr="An empty placeholder to add an image. Click on the placeholder and select the image that you wish to add"/>
-          <p:cNvSpPr>
-            <a:spLocks noGrp="1"/>
-          </p:cNvSpPr>
-          <p:nvPr>
-            <p:ph type="pic" idx="1"/>
-          </p:nvPr>
-        </p:nvSpPr>
-        <p:spPr/>
-        <p:txBody>
-          <a:bodyPr/>
-          <a:lstStyle/>
-          <a:p>
-            <a:endParaRPr lang="en-US" dirty="0"/>
+              <a:t>Flask…</a:t>
+            </a:r>
           </a:p>
         </p:txBody>
       </p:sp>
@@ -7910,10 +8069,7 @@
           <a:bodyPr/>
           <a:lstStyle/>
           <a:p>
-            <a:r>
-              <a:rPr lang="en-US" dirty="0"/>
-              <a:t>Let’s take a look!</a:t>
-            </a:r>
+            <a:endParaRPr lang="en-US" dirty="0"/>
           </a:p>
         </p:txBody>
       </p:sp>
@@ -8179,7 +8335,6 @@
                   <a:srgbClr val="D1D2D3"/>
                 </a:solidFill>
                 <a:effectLst/>
-                <a:latin typeface="Slack-Lato"/>
               </a:rPr>
               <a:t>When planning your next trip, it’s easy to know where you want to go! The hardest part is knowing that all your necessities are covered when you get there. With this in mind (and </a:t>
             </a:r>
@@ -8188,7 +8343,6 @@
                 <a:solidFill>
                   <a:srgbClr val="D1D2D3"/>
                 </a:solidFill>
-                <a:latin typeface="Slack-Lato"/>
               </a:rPr>
               <a:t>a very helpful API from Yelp), w</a:t>
             </a:r>
@@ -8198,7 +8352,6 @@
                   <a:srgbClr val="D1D2D3"/>
                 </a:solidFill>
                 <a:effectLst/>
-                <a:latin typeface="Slack-Lato"/>
               </a:rPr>
               <a:t>e made a travel guide to assist in your decisions on hotels and restaurants. The map and graph visualizations are customizable and easy for users of any skill level.</a:t>
             </a:r>
@@ -8242,7 +8395,6 @@
                   <a:srgbClr val="D1D2D3"/>
                 </a:solidFill>
                 <a:effectLst/>
-                <a:latin typeface="Slack-Lato"/>
               </a:rPr>
               <a:t>The maps and graphs show the top-rated hotels and restaurants for the areas you plan to visit</a:t>
             </a:r>
@@ -8258,7 +8410,6 @@
                   <a:srgbClr val="D1D2D3"/>
                 </a:solidFill>
                 <a:effectLst/>
-                <a:latin typeface="Slack-Lato"/>
               </a:rPr>
               <a:t>You can easily filter down to the category and city you’re looking for.</a:t>
             </a:r>
@@ -8274,7 +8425,6 @@
                   <a:srgbClr val="D1D2D3"/>
                 </a:solidFill>
                 <a:effectLst/>
-                <a:latin typeface="Slack-Lato"/>
               </a:rPr>
               <a:t>See the locations of each marker on the maps so you know exactly where you’ll be!</a:t>
             </a:r>
@@ -8766,7 +8916,7 @@
             <p:ph sz="half" idx="2"/>
             <p:extLst>
               <p:ext uri="{D42A27DB-BD31-4B8C-83A1-F6EECF244321}">
-                <p14:modId xmlns:p14="http://schemas.microsoft.com/office/powerpoint/2010/main" val="2478499498"/>
+                <p14:modId xmlns:p14="http://schemas.microsoft.com/office/powerpoint/2010/main" val="152962071"/>
               </p:ext>
             </p:extLst>
           </p:nvPr>
@@ -9174,6 +9324,270 @@
           <a:chExt cx="0" cy="0"/>
         </a:xfrm>
       </p:grpSpPr>
+      <p:sp>
+        <p:nvSpPr>
+          <p:cNvPr id="2" name="Title 1"/>
+          <p:cNvSpPr>
+            <a:spLocks noGrp="1"/>
+          </p:cNvSpPr>
+          <p:nvPr>
+            <p:ph type="title"/>
+          </p:nvPr>
+        </p:nvSpPr>
+        <p:spPr>
+          <a:xfrm>
+            <a:off x="4800600" y="1212024"/>
+            <a:ext cx="3429000" cy="627062"/>
+          </a:xfrm>
+        </p:spPr>
+        <p:txBody>
+          <a:bodyPr/>
+          <a:lstStyle/>
+          <a:p>
+            <a:r>
+              <a:rPr lang="en-US" b="1" dirty="0"/>
+              <a:t>Flask…</a:t>
+            </a:r>
+          </a:p>
+        </p:txBody>
+      </p:sp>
+      <p:sp>
+        <p:nvSpPr>
+          <p:cNvPr id="4" name="Text Placeholder 3"/>
+          <p:cNvSpPr>
+            <a:spLocks noGrp="1"/>
+          </p:cNvSpPr>
+          <p:nvPr>
+            <p:ph type="body" sz="half" idx="2"/>
+          </p:nvPr>
+        </p:nvSpPr>
+        <p:spPr/>
+        <p:txBody>
+          <a:bodyPr/>
+          <a:lstStyle/>
+          <a:p>
+            <a:endParaRPr lang="en-US" dirty="0"/>
+          </a:p>
+        </p:txBody>
+      </p:sp>
+      <p:pic>
+        <p:nvPicPr>
+          <p:cNvPr id="5" name="jim-carrey">
+            <a:hlinkClick r:id="" action="ppaction://media"/>
+            <a:extLst>
+              <a:ext uri="{FF2B5EF4-FFF2-40B4-BE49-F238E27FC236}">
+                <a16:creationId xmlns:a16="http://schemas.microsoft.com/office/drawing/2014/main" id="{F2544FD6-02F6-1CEA-4415-0E4B6181EEEC}"/>
+              </a:ext>
+            </a:extLst>
+          </p:cNvPr>
+          <p:cNvPicPr>
+            <a:picLocks noChangeAspect="1"/>
+          </p:cNvPicPr>
+          <p:nvPr>
+            <a:videoFile r:link="rId2"/>
+            <p:extLst>
+              <p:ext uri="{DAA4B4D4-6D71-4841-9C94-3DE7FCFB9230}">
+                <p14:media xmlns:p14="http://schemas.microsoft.com/office/powerpoint/2010/main" r:embed="rId1"/>
+              </p:ext>
+            </p:extLst>
+          </p:nvPr>
+        </p:nvPicPr>
+        <p:blipFill>
+          <a:blip r:embed="rId4"/>
+          <a:stretch>
+            <a:fillRect/>
+          </a:stretch>
+        </p:blipFill>
+        <p:spPr>
+          <a:xfrm>
+            <a:off x="2819400" y="2209800"/>
+            <a:ext cx="6934820" cy="3878262"/>
+          </a:xfrm>
+          <a:prstGeom prst="rect">
+            <a:avLst/>
+          </a:prstGeom>
+        </p:spPr>
+      </p:pic>
+    </p:spTree>
+    <p:extLst>
+      <p:ext uri="{BB962C8B-B14F-4D97-AF65-F5344CB8AC3E}">
+        <p14:creationId xmlns:p14="http://schemas.microsoft.com/office/powerpoint/2010/main" val="372948772"/>
+      </p:ext>
+    </p:extLst>
+  </p:cSld>
+  <p:clrMapOvr>
+    <a:masterClrMapping/>
+  </p:clrMapOvr>
+  <mc:AlternateContent xmlns:mc="http://schemas.openxmlformats.org/markup-compatibility/2006" xmlns:p14="http://schemas.microsoft.com/office/powerpoint/2010/main">
+    <mc:Choice Requires="p14">
+      <p:transition spd="med" p14:dur="700">
+        <p:fade/>
+      </p:transition>
+    </mc:Choice>
+    <mc:Fallback xmlns="">
+      <p:transition spd="med">
+        <p:fade/>
+      </p:transition>
+    </mc:Fallback>
+  </mc:AlternateContent>
+  <p:timing>
+    <p:tnLst>
+      <p:par>
+        <p:cTn id="1" dur="indefinite" restart="never" nodeType="tmRoot">
+          <p:childTnLst>
+            <p:seq concurrent="1" nextAc="seek">
+              <p:cTn id="2" dur="indefinite" nodeType="mainSeq">
+                <p:childTnLst>
+                  <p:par>
+                    <p:cTn id="3" fill="hold">
+                      <p:stCondLst>
+                        <p:cond delay="indefinite"/>
+                        <p:cond evt="onBegin" delay="0">
+                          <p:tn val="2"/>
+                        </p:cond>
+                      </p:stCondLst>
+                      <p:childTnLst>
+                        <p:par>
+                          <p:cTn id="4" fill="hold">
+                            <p:stCondLst>
+                              <p:cond delay="0"/>
+                            </p:stCondLst>
+                            <p:childTnLst>
+                              <p:par>
+                                <p:cTn id="5" presetID="1" presetClass="mediacall" presetSubtype="0" fill="hold" nodeType="afterEffect">
+                                  <p:stCondLst>
+                                    <p:cond delay="0"/>
+                                  </p:stCondLst>
+                                  <p:childTnLst>
+                                    <p:cmd type="call" cmd="playFrom(0.0)">
+                                      <p:cBhvr>
+                                        <p:cTn id="6" dur="5040" fill="hold"/>
+                                        <p:tgtEl>
+                                          <p:spTgt spid="5"/>
+                                        </p:tgtEl>
+                                      </p:cBhvr>
+                                    </p:cmd>
+                                  </p:childTnLst>
+                                </p:cTn>
+                              </p:par>
+                            </p:childTnLst>
+                          </p:cTn>
+                        </p:par>
+                      </p:childTnLst>
+                    </p:cTn>
+                  </p:par>
+                </p:childTnLst>
+              </p:cTn>
+              <p:prevCondLst>
+                <p:cond evt="onPrev" delay="0">
+                  <p:tgtEl>
+                    <p:sldTgt/>
+                  </p:tgtEl>
+                </p:cond>
+              </p:prevCondLst>
+              <p:nextCondLst>
+                <p:cond evt="onNext" delay="0">
+                  <p:tgtEl>
+                    <p:sldTgt/>
+                  </p:tgtEl>
+                </p:cond>
+              </p:nextCondLst>
+            </p:seq>
+            <p:video>
+              <p:cMediaNode vol="80000">
+                <p:cTn id="7" repeatCount="indefinite" fill="hold" display="0">
+                  <p:stCondLst>
+                    <p:cond delay="indefinite"/>
+                  </p:stCondLst>
+                </p:cTn>
+                <p:tgtEl>
+                  <p:spTgt spid="5"/>
+                </p:tgtEl>
+              </p:cMediaNode>
+            </p:video>
+            <p:seq concurrent="1" nextAc="seek">
+              <p:cTn id="8" restart="whenNotActive" fill="hold" evtFilter="cancelBubble" nodeType="interactiveSeq">
+                <p:stCondLst>
+                  <p:cond evt="onClick" delay="0">
+                    <p:tgtEl>
+                      <p:spTgt spid="5"/>
+                    </p:tgtEl>
+                  </p:cond>
+                </p:stCondLst>
+                <p:endSync evt="end" delay="0">
+                  <p:rtn val="all"/>
+                </p:endSync>
+                <p:childTnLst>
+                  <p:par>
+                    <p:cTn id="9" fill="hold">
+                      <p:stCondLst>
+                        <p:cond delay="0"/>
+                      </p:stCondLst>
+                      <p:childTnLst>
+                        <p:par>
+                          <p:cTn id="10" fill="hold">
+                            <p:stCondLst>
+                              <p:cond delay="0"/>
+                            </p:stCondLst>
+                            <p:childTnLst>
+                              <p:par>
+                                <p:cTn id="11" presetID="2" presetClass="mediacall" presetSubtype="0" fill="hold" nodeType="clickEffect">
+                                  <p:stCondLst>
+                                    <p:cond delay="0"/>
+                                  </p:stCondLst>
+                                  <p:childTnLst>
+                                    <p:cmd type="call" cmd="togglePause">
+                                      <p:cBhvr>
+                                        <p:cTn id="12" dur="1" fill="hold"/>
+                                        <p:tgtEl>
+                                          <p:spTgt spid="5"/>
+                                        </p:tgtEl>
+                                      </p:cBhvr>
+                                    </p:cmd>
+                                  </p:childTnLst>
+                                </p:cTn>
+                              </p:par>
+                            </p:childTnLst>
+                          </p:cTn>
+                        </p:par>
+                      </p:childTnLst>
+                    </p:cTn>
+                  </p:par>
+                </p:childTnLst>
+              </p:cTn>
+              <p:nextCondLst>
+                <p:cond evt="onClick" delay="0">
+                  <p:tgtEl>
+                    <p:spTgt spid="5"/>
+                  </p:tgtEl>
+                </p:cond>
+              </p:nextCondLst>
+            </p:seq>
+          </p:childTnLst>
+        </p:cTn>
+      </p:par>
+    </p:tnLst>
+  </p:timing>
+</p:sld>
+</file>
+
+<file path=ppt/slides/slide9.xml><?xml version="1.0" encoding="utf-8"?>
+<p:sld xmlns:a="http://schemas.openxmlformats.org/drawingml/2006/main" xmlns:r="http://schemas.openxmlformats.org/officeDocument/2006/relationships" xmlns:p="http://schemas.openxmlformats.org/presentationml/2006/main">
+  <p:cSld>
+    <p:spTree>
+      <p:nvGrpSpPr>
+        <p:cNvPr id="1" name=""/>
+        <p:cNvGrpSpPr/>
+        <p:nvPr/>
+      </p:nvGrpSpPr>
+      <p:grpSpPr>
+        <a:xfrm>
+          <a:off x="0" y="0"/>
+          <a:ext cx="0" cy="0"/>
+          <a:chOff x="0" y="0"/>
+          <a:chExt cx="0" cy="0"/>
+        </a:xfrm>
+      </p:grpSpPr>
       <p:pic>
         <p:nvPicPr>
           <p:cNvPr id="7" name="Picture 6">
@@ -9371,92 +9785,6 @@
     <p:extLst>
       <p:ext uri="{BB962C8B-B14F-4D97-AF65-F5344CB8AC3E}">
         <p14:creationId xmlns:p14="http://schemas.microsoft.com/office/powerpoint/2010/main" val="3440500440"/>
-      </p:ext>
-    </p:extLst>
-  </p:cSld>
-  <p:clrMapOvr>
-    <a:masterClrMapping/>
-  </p:clrMapOvr>
-  <mc:AlternateContent xmlns:mc="http://schemas.openxmlformats.org/markup-compatibility/2006" xmlns:p14="http://schemas.microsoft.com/office/powerpoint/2010/main">
-    <mc:Choice Requires="p14">
-      <p:transition spd="med" p14:dur="700">
-        <p:fade/>
-      </p:transition>
-    </mc:Choice>
-    <mc:Fallback xmlns="">
-      <p:transition spd="med">
-        <p:fade/>
-      </p:transition>
-    </mc:Fallback>
-  </mc:AlternateContent>
-</p:sld>
-</file>
-
-<file path=ppt/slides/slide9.xml><?xml version="1.0" encoding="utf-8"?>
-<p:sld xmlns:a="http://schemas.openxmlformats.org/drawingml/2006/main" xmlns:r="http://schemas.openxmlformats.org/officeDocument/2006/relationships" xmlns:p="http://schemas.openxmlformats.org/presentationml/2006/main">
-  <p:cSld>
-    <p:spTree>
-      <p:nvGrpSpPr>
-        <p:cNvPr id="1" name=""/>
-        <p:cNvGrpSpPr/>
-        <p:nvPr/>
-      </p:nvGrpSpPr>
-      <p:grpSpPr>
-        <a:xfrm>
-          <a:off x="0" y="0"/>
-          <a:ext cx="0" cy="0"/>
-          <a:chOff x="0" y="0"/>
-          <a:chExt cx="0" cy="0"/>
-        </a:xfrm>
-      </p:grpSpPr>
-      <p:sp>
-        <p:nvSpPr>
-          <p:cNvPr id="2" name="Title 1"/>
-          <p:cNvSpPr>
-            <a:spLocks noGrp="1"/>
-          </p:cNvSpPr>
-          <p:nvPr>
-            <p:ph type="title"/>
-          </p:nvPr>
-        </p:nvSpPr>
-        <p:spPr/>
-        <p:txBody>
-          <a:bodyPr/>
-          <a:lstStyle/>
-          <a:p>
-            <a:r>
-              <a:rPr lang="en-US" dirty="0"/>
-              <a:t>Html/JS</a:t>
-            </a:r>
-          </a:p>
-        </p:txBody>
-      </p:sp>
-      <p:sp>
-        <p:nvSpPr>
-          <p:cNvPr id="3" name="Text Placeholder 2"/>
-          <p:cNvSpPr>
-            <a:spLocks noGrp="1"/>
-          </p:cNvSpPr>
-          <p:nvPr>
-            <p:ph type="body" idx="1"/>
-          </p:nvPr>
-        </p:nvSpPr>
-        <p:spPr/>
-        <p:txBody>
-          <a:bodyPr/>
-          <a:lstStyle/>
-          <a:p>
-            <a:r>
-              <a:rPr lang="en-US" dirty="0"/>
-              <a:t>Like peanut butter and jelly….or chocolate….or....</a:t>
-            </a:r>
-          </a:p>
-        </p:txBody>
-      </p:sp>
-    </p:spTree>
-    <p:extLst>
-      <p:ext uri="{BB962C8B-B14F-4D97-AF65-F5344CB8AC3E}">
-        <p14:creationId xmlns:p14="http://schemas.microsoft.com/office/powerpoint/2010/main" val="1407246764"/>
       </p:ext>
     </p:extLst>
   </p:cSld>

</xml_diff>

<commit_message>
Not final but basically final draft of our pptx.
</commit_message>
<xml_diff>
--- a/YelpForTravelHelp.pptx
+++ b/YelpForTravelHelp.pptx
@@ -25,7 +25,7 @@
     <p:sldId id="269" r:id="rId13"/>
     <p:sldId id="265" r:id="rId14"/>
     <p:sldId id="270" r:id="rId15"/>
-    <p:sldId id="266" r:id="rId16"/>
+    <p:sldId id="272" r:id="rId16"/>
   </p:sldIdLst>
   <p:sldSz cx="12192000" cy="6858000"/>
   <p:notesSz cx="6858000" cy="9144000"/>
@@ -138,9 +138,7 @@
 <file path=ppt/revisionInfo.xml><?xml version="1.0" encoding="utf-8"?>
 <p1510:revInfo xmlns:a="http://schemas.openxmlformats.org/drawingml/2006/main" xmlns:r="http://schemas.openxmlformats.org/officeDocument/2006/relationships" xmlns:p1510="http://schemas.microsoft.com/office/powerpoint/2015/10/main">
   <p1510:revLst>
-    <p1510:client id="{98F166EF-7EB6-4E95-A5E5-94C510AD2A89}" v="5" dt="2023-10-06T00:58:19.725"/>
-    <p1510:client id="{9BD4B7DE-F438-4D69-91FE-30D9F4395912}" v="25" dt="2023-10-05T01:39:33.153"/>
-    <p1510:client id="{BF658A42-85CA-4FCE-9751-D84327CF6E22}" v="6" dt="2023-10-06T00:13:32.326"/>
+    <p1510:client id="{4FB82DCA-6720-4D7D-957D-05A44CC26A80}" v="4" dt="2023-10-08T18:01:39.502"/>
   </p1510:revLst>
 </p1510:revInfo>
 </file>
@@ -651,6 +649,161 @@
             <pc:docMk/>
             <pc:sldMk cId="2176088558" sldId="270"/>
             <ac:spMk id="3" creationId="{00000000-0000-0000-0000-000000000000}"/>
+          </ac:spMkLst>
+        </pc:spChg>
+      </pc:sldChg>
+    </pc:docChg>
+  </pc:docChgLst>
+  <pc:docChgLst>
+    <pc:chgData name="Jeremy Magee" userId="54b62a32ee7be8e2" providerId="LiveId" clId="{4FB82DCA-6720-4D7D-957D-05A44CC26A80}"/>
+    <pc:docChg chg="custSel addSld delSld modSld">
+      <pc:chgData name="Jeremy Magee" userId="54b62a32ee7be8e2" providerId="LiveId" clId="{4FB82DCA-6720-4D7D-957D-05A44CC26A80}" dt="2023-10-08T18:02:05.036" v="452" actId="20577"/>
+      <pc:docMkLst>
+        <pc:docMk/>
+      </pc:docMkLst>
+      <pc:sldChg chg="addSp modSp mod">
+        <pc:chgData name="Jeremy Magee" userId="54b62a32ee7be8e2" providerId="LiveId" clId="{4FB82DCA-6720-4D7D-957D-05A44CC26A80}" dt="2023-10-08T17:53:40.886" v="58" actId="1076"/>
+        <pc:sldMkLst>
+          <pc:docMk/>
+          <pc:sldMk cId="1180589104" sldId="259"/>
+        </pc:sldMkLst>
+        <pc:spChg chg="mod">
+          <ac:chgData name="Jeremy Magee" userId="54b62a32ee7be8e2" providerId="LiveId" clId="{4FB82DCA-6720-4D7D-957D-05A44CC26A80}" dt="2023-10-08T17:51:28.674" v="0" actId="20577"/>
+          <ac:spMkLst>
+            <pc:docMk/>
+            <pc:sldMk cId="1180589104" sldId="259"/>
+            <ac:spMk id="4" creationId="{2DCC61A2-5A79-FABB-178F-1135E82828FF}"/>
+          </ac:spMkLst>
+        </pc:spChg>
+        <pc:spChg chg="add mod">
+          <ac:chgData name="Jeremy Magee" userId="54b62a32ee7be8e2" providerId="LiveId" clId="{4FB82DCA-6720-4D7D-957D-05A44CC26A80}" dt="2023-10-08T17:52:11.790" v="55" actId="1076"/>
+          <ac:spMkLst>
+            <pc:docMk/>
+            <pc:sldMk cId="1180589104" sldId="259"/>
+            <ac:spMk id="6" creationId="{391280F7-9C54-0E6C-58C9-D0B22A1A775A}"/>
+          </ac:spMkLst>
+        </pc:spChg>
+        <pc:picChg chg="add mod">
+          <ac:chgData name="Jeremy Magee" userId="54b62a32ee7be8e2" providerId="LiveId" clId="{4FB82DCA-6720-4D7D-957D-05A44CC26A80}" dt="2023-10-08T17:53:40.886" v="58" actId="1076"/>
+          <ac:picMkLst>
+            <pc:docMk/>
+            <pc:sldMk cId="1180589104" sldId="259"/>
+            <ac:picMk id="8" creationId="{E02CC2BE-CE91-1EF4-03FA-B1A23E0A42D3}"/>
+          </ac:picMkLst>
+        </pc:picChg>
+      </pc:sldChg>
+      <pc:sldChg chg="modSp mod">
+        <pc:chgData name="Jeremy Magee" userId="54b62a32ee7be8e2" providerId="LiveId" clId="{4FB82DCA-6720-4D7D-957D-05A44CC26A80}" dt="2023-10-08T17:54:24.702" v="104" actId="20577"/>
+        <pc:sldMkLst>
+          <pc:docMk/>
+          <pc:sldMk cId="3387061768" sldId="262"/>
+        </pc:sldMkLst>
+        <pc:spChg chg="mod">
+          <ac:chgData name="Jeremy Magee" userId="54b62a32ee7be8e2" providerId="LiveId" clId="{4FB82DCA-6720-4D7D-957D-05A44CC26A80}" dt="2023-10-08T17:54:02.616" v="67" actId="20577"/>
+          <ac:spMkLst>
+            <pc:docMk/>
+            <pc:sldMk cId="3387061768" sldId="262"/>
+            <ac:spMk id="2" creationId="{00000000-0000-0000-0000-000000000000}"/>
+          </ac:spMkLst>
+        </pc:spChg>
+        <pc:spChg chg="mod">
+          <ac:chgData name="Jeremy Magee" userId="54b62a32ee7be8e2" providerId="LiveId" clId="{4FB82DCA-6720-4D7D-957D-05A44CC26A80}" dt="2023-10-08T17:54:24.702" v="104" actId="20577"/>
+          <ac:spMkLst>
+            <pc:docMk/>
+            <pc:sldMk cId="3387061768" sldId="262"/>
+            <ac:spMk id="4" creationId="{00000000-0000-0000-0000-000000000000}"/>
+          </ac:spMkLst>
+        </pc:spChg>
+        <pc:spChg chg="mod">
+          <ac:chgData name="Jeremy Magee" userId="54b62a32ee7be8e2" providerId="LiveId" clId="{4FB82DCA-6720-4D7D-957D-05A44CC26A80}" dt="2023-10-08T17:54:16.531" v="71" actId="27636"/>
+          <ac:spMkLst>
+            <pc:docMk/>
+            <pc:sldMk cId="3387061768" sldId="262"/>
+            <ac:spMk id="6" creationId="{00000000-0000-0000-0000-000000000000}"/>
+          </ac:spMkLst>
+        </pc:spChg>
+      </pc:sldChg>
+      <pc:sldChg chg="addSp modSp mod">
+        <pc:chgData name="Jeremy Magee" userId="54b62a32ee7be8e2" providerId="LiveId" clId="{4FB82DCA-6720-4D7D-957D-05A44CC26A80}" dt="2023-10-08T17:55:34.500" v="144" actId="14100"/>
+        <pc:sldMkLst>
+          <pc:docMk/>
+          <pc:sldMk cId="4129439513" sldId="264"/>
+        </pc:sldMkLst>
+        <pc:spChg chg="mod">
+          <ac:chgData name="Jeremy Magee" userId="54b62a32ee7be8e2" providerId="LiveId" clId="{4FB82DCA-6720-4D7D-957D-05A44CC26A80}" dt="2023-10-08T17:55:07.412" v="141" actId="20577"/>
+          <ac:spMkLst>
+            <pc:docMk/>
+            <pc:sldMk cId="4129439513" sldId="264"/>
+            <ac:spMk id="4" creationId="{AD4FB6AD-FEFE-4C66-E36D-C5D67670F48A}"/>
+          </ac:spMkLst>
+        </pc:spChg>
+        <pc:spChg chg="add mod ord">
+          <ac:chgData name="Jeremy Magee" userId="54b62a32ee7be8e2" providerId="LiveId" clId="{4FB82DCA-6720-4D7D-957D-05A44CC26A80}" dt="2023-10-08T17:55:34.500" v="144" actId="14100"/>
+          <ac:spMkLst>
+            <pc:docMk/>
+            <pc:sldMk cId="4129439513" sldId="264"/>
+            <ac:spMk id="5" creationId="{82AC6DD3-9DCE-1338-27A6-83CDA8706469}"/>
+          </ac:spMkLst>
+        </pc:spChg>
+      </pc:sldChg>
+      <pc:sldChg chg="addSp delSp modSp mod">
+        <pc:chgData name="Jeremy Magee" userId="54b62a32ee7be8e2" providerId="LiveId" clId="{4FB82DCA-6720-4D7D-957D-05A44CC26A80}" dt="2023-10-08T18:02:05.036" v="452" actId="20577"/>
+        <pc:sldMkLst>
+          <pc:docMk/>
+          <pc:sldMk cId="1827431122" sldId="265"/>
+        </pc:sldMkLst>
+        <pc:spChg chg="del">
+          <ac:chgData name="Jeremy Magee" userId="54b62a32ee7be8e2" providerId="LiveId" clId="{4FB82DCA-6720-4D7D-957D-05A44CC26A80}" dt="2023-10-08T17:58:52.917" v="145" actId="931"/>
+          <ac:spMkLst>
+            <pc:docMk/>
+            <pc:sldMk cId="1827431122" sldId="265"/>
+            <ac:spMk id="3" creationId="{00000000-0000-0000-0000-000000000000}"/>
+          </ac:spMkLst>
+        </pc:spChg>
+        <pc:spChg chg="add mod">
+          <ac:chgData name="Jeremy Magee" userId="54b62a32ee7be8e2" providerId="LiveId" clId="{4FB82DCA-6720-4D7D-957D-05A44CC26A80}" dt="2023-10-08T18:02:05.036" v="452" actId="20577"/>
+          <ac:spMkLst>
+            <pc:docMk/>
+            <pc:sldMk cId="1827431122" sldId="265"/>
+            <ac:spMk id="7" creationId="{18DAC283-9830-161C-007F-77EA3DA8A3A8}"/>
+          </ac:spMkLst>
+        </pc:spChg>
+        <pc:picChg chg="add mod">
+          <ac:chgData name="Jeremy Magee" userId="54b62a32ee7be8e2" providerId="LiveId" clId="{4FB82DCA-6720-4D7D-957D-05A44CC26A80}" dt="2023-10-08T17:59:20.582" v="222" actId="962"/>
+          <ac:picMkLst>
+            <pc:docMk/>
+            <pc:sldMk cId="1827431122" sldId="265"/>
+            <ac:picMk id="6" creationId="{6E284BD8-63F6-5858-53B7-7B64A861A207}"/>
+          </ac:picMkLst>
+        </pc:picChg>
+      </pc:sldChg>
+      <pc:sldChg chg="del">
+        <pc:chgData name="Jeremy Magee" userId="54b62a32ee7be8e2" providerId="LiveId" clId="{4FB82DCA-6720-4D7D-957D-05A44CC26A80}" dt="2023-10-08T18:00:36.288" v="223" actId="47"/>
+        <pc:sldMkLst>
+          <pc:docMk/>
+          <pc:sldMk cId="2521986180" sldId="266"/>
+        </pc:sldMkLst>
+      </pc:sldChg>
+      <pc:sldChg chg="modSp new mod">
+        <pc:chgData name="Jeremy Magee" userId="54b62a32ee7be8e2" providerId="LiveId" clId="{4FB82DCA-6720-4D7D-957D-05A44CC26A80}" dt="2023-10-08T18:01:24.498" v="376" actId="20577"/>
+        <pc:sldMkLst>
+          <pc:docMk/>
+          <pc:sldMk cId="2811200149" sldId="272"/>
+        </pc:sldMkLst>
+        <pc:spChg chg="mod">
+          <ac:chgData name="Jeremy Magee" userId="54b62a32ee7be8e2" providerId="LiveId" clId="{4FB82DCA-6720-4D7D-957D-05A44CC26A80}" dt="2023-10-08T18:01:00.400" v="270" actId="20577"/>
+          <ac:spMkLst>
+            <pc:docMk/>
+            <pc:sldMk cId="2811200149" sldId="272"/>
+            <ac:spMk id="2" creationId="{8AC07CA5-8EFF-0E33-5E08-237218DF1590}"/>
+          </ac:spMkLst>
+        </pc:spChg>
+        <pc:spChg chg="mod">
+          <ac:chgData name="Jeremy Magee" userId="54b62a32ee7be8e2" providerId="LiveId" clId="{4FB82DCA-6720-4D7D-957D-05A44CC26A80}" dt="2023-10-08T18:01:24.498" v="376" actId="20577"/>
+          <ac:spMkLst>
+            <pc:docMk/>
+            <pc:sldMk cId="2811200149" sldId="272"/>
+            <ac:spMk id="3" creationId="{D3013508-3112-FF85-31C3-8750CA30B52C}"/>
           </ac:spMkLst>
         </pc:spChg>
       </pc:sldChg>
@@ -3588,7 +3741,7 @@
           <a:p>
             <a:fld id="{061C5132-FFA3-4B02-9F09-22FCF40EFA74}" type="datetimeFigureOut">
               <a:rPr lang="en-US" smtClean="0"/>
-              <a:t>10/5/2023</a:t>
+              <a:t>10/8/2023</a:t>
             </a:fld>
             <a:endParaRPr lang="en-US"/>
           </a:p>
@@ -3753,7 +3906,7 @@
           <a:p>
             <a:fld id="{0B6E42C9-243F-4DC5-AFF6-9D56B5FA9D63}" type="datetimeFigureOut">
               <a:rPr lang="en-US" smtClean="0"/>
-              <a:t>10/5/2023</a:t>
+              <a:t>10/8/2023</a:t>
             </a:fld>
             <a:endParaRPr lang="en-US"/>
           </a:p>
@@ -4441,7 +4594,7 @@
           <a:p>
             <a:fld id="{B0FE2824-C2A0-4931-BB32-60B24BDBB3CC}" type="datetimeFigureOut">
               <a:rPr lang="en-US" smtClean="0"/>
-              <a:t>10/5/2023</a:t>
+              <a:t>10/8/2023</a:t>
             </a:fld>
             <a:endParaRPr lang="en-US"/>
           </a:p>
@@ -4636,7 +4789,7 @@
           <a:p>
             <a:fld id="{B0FE2824-C2A0-4931-BB32-60B24BDBB3CC}" type="datetimeFigureOut">
               <a:rPr lang="en-US" smtClean="0"/>
-              <a:t>10/5/2023</a:t>
+              <a:t>10/8/2023</a:t>
             </a:fld>
             <a:endParaRPr lang="en-US"/>
           </a:p>
@@ -4816,7 +4969,7 @@
           <a:p>
             <a:fld id="{B0FE2824-C2A0-4931-BB32-60B24BDBB3CC}" type="datetimeFigureOut">
               <a:rPr lang="en-US" smtClean="0"/>
-              <a:t>10/5/2023</a:t>
+              <a:t>10/8/2023</a:t>
             </a:fld>
             <a:endParaRPr lang="en-US"/>
           </a:p>
@@ -5336,7 +5489,7 @@
           <a:p>
             <a:fld id="{B0FE2824-C2A0-4931-BB32-60B24BDBB3CC}" type="datetimeFigureOut">
               <a:rPr lang="en-US" smtClean="0"/>
-              <a:t>10/5/2023</a:t>
+              <a:t>10/8/2023</a:t>
             </a:fld>
             <a:endParaRPr lang="en-US"/>
           </a:p>
@@ -5778,7 +5931,7 @@
           <a:p>
             <a:fld id="{B0FE2824-C2A0-4931-BB32-60B24BDBB3CC}" type="datetimeFigureOut">
               <a:rPr lang="en-US" smtClean="0"/>
-              <a:t>10/5/2023</a:t>
+              <a:t>10/8/2023</a:t>
             </a:fld>
             <a:endParaRPr lang="en-US"/>
           </a:p>
@@ -5907,7 +6060,7 @@
           <a:p>
             <a:fld id="{B0FE2824-C2A0-4931-BB32-60B24BDBB3CC}" type="datetimeFigureOut">
               <a:rPr lang="en-US" smtClean="0"/>
-              <a:t>10/5/2023</a:t>
+              <a:t>10/8/2023</a:t>
             </a:fld>
             <a:endParaRPr lang="en-US"/>
           </a:p>
@@ -6014,7 +6167,7 @@
           <a:p>
             <a:fld id="{B0FE2824-C2A0-4931-BB32-60B24BDBB3CC}" type="datetimeFigureOut">
               <a:rPr lang="en-US" smtClean="0"/>
-              <a:t>10/5/2023</a:t>
+              <a:t>10/8/2023</a:t>
             </a:fld>
             <a:endParaRPr lang="en-US"/>
           </a:p>
@@ -6310,7 +6463,7 @@
           <a:p>
             <a:fld id="{B0FE2824-C2A0-4931-BB32-60B24BDBB3CC}" type="datetimeFigureOut">
               <a:rPr lang="en-US" smtClean="0"/>
-              <a:t>10/5/2023</a:t>
+              <a:t>10/8/2023</a:t>
             </a:fld>
             <a:endParaRPr lang="en-US"/>
           </a:p>
@@ -6583,7 +6736,7 @@
           <a:p>
             <a:fld id="{B0FE2824-C2A0-4931-BB32-60B24BDBB3CC}" type="datetimeFigureOut">
               <a:rPr lang="en-US" smtClean="0"/>
-              <a:t>10/5/2023</a:t>
+              <a:t>10/8/2023</a:t>
             </a:fld>
             <a:endParaRPr lang="en-US"/>
           </a:p>
@@ -6877,7 +7030,7 @@
             <a:fld id="{B0FE2824-C2A0-4931-BB32-60B24BDBB3CC}" type="datetimeFigureOut">
               <a:rPr lang="en-US" smtClean="0"/>
               <a:pPr/>
-              <a:t>10/5/2023</a:t>
+              <a:t>10/8/2023</a:t>
             </a:fld>
             <a:endParaRPr lang="en-US"/>
           </a:p>
@@ -7476,6 +7629,52 @@
       </p:grpSpPr>
       <p:sp>
         <p:nvSpPr>
+          <p:cNvPr id="5" name="Rectangle 4">
+            <a:extLst>
+              <a:ext uri="{FF2B5EF4-FFF2-40B4-BE49-F238E27FC236}">
+                <a16:creationId xmlns:a16="http://schemas.microsoft.com/office/drawing/2014/main" id="{82AC6DD3-9DCE-1338-27A6-83CDA8706469}"/>
+              </a:ext>
+            </a:extLst>
+          </p:cNvPr>
+          <p:cNvSpPr/>
+          <p:nvPr/>
+        </p:nvSpPr>
+        <p:spPr>
+          <a:xfrm>
+            <a:off x="381000" y="381000"/>
+            <a:ext cx="7315200" cy="5791200"/>
+          </a:xfrm>
+          <a:prstGeom prst="rect">
+            <a:avLst/>
+          </a:prstGeom>
+        </p:spPr>
+        <p:style>
+          <a:lnRef idx="2">
+            <a:schemeClr val="accent1">
+              <a:shade val="15000"/>
+            </a:schemeClr>
+          </a:lnRef>
+          <a:fillRef idx="1">
+            <a:schemeClr val="accent1"/>
+          </a:fillRef>
+          <a:effectRef idx="0">
+            <a:schemeClr val="accent1"/>
+          </a:effectRef>
+          <a:fontRef idx="minor">
+            <a:schemeClr val="lt1"/>
+          </a:fontRef>
+        </p:style>
+        <p:txBody>
+          <a:bodyPr rtlCol="0" anchor="ctr"/>
+          <a:lstStyle/>
+          <a:p>
+            <a:pPr algn="ctr"/>
+            <a:endParaRPr lang="en-US"/>
+          </a:p>
+        </p:txBody>
+      </p:sp>
+      <p:sp>
+        <p:nvSpPr>
           <p:cNvPr id="2" name="Title 1">
             <a:extLst>
               <a:ext uri="{FF2B5EF4-FFF2-40B4-BE49-F238E27FC236}">
@@ -7562,7 +7761,7 @@
           <a:p>
             <a:r>
               <a:rPr lang="en-US" dirty="0"/>
-              <a:t>We utilized several files to create our web visualizations.</a:t>
+              <a:t>We utilized several files to create our web visualizations. (counter-clockwise, from top-left)</a:t>
             </a:r>
           </a:p>
           <a:p>
@@ -7861,25 +8060,41 @@
           </a:p>
         </p:txBody>
       </p:sp>
-      <p:sp>
-        <p:nvSpPr>
-          <p:cNvPr id="3" name="Content Placeholder 2"/>
-          <p:cNvSpPr>
-            <a:spLocks noGrp="1"/>
-          </p:cNvSpPr>
+      <p:pic>
+        <p:nvPicPr>
+          <p:cNvPr id="6" name="Content Placeholder 5" descr="Leaflet logo. ">
+            <a:extLst>
+              <a:ext uri="{FF2B5EF4-FFF2-40B4-BE49-F238E27FC236}">
+                <a16:creationId xmlns:a16="http://schemas.microsoft.com/office/drawing/2014/main" id="{6E284BD8-63F6-5858-53B7-7B64A861A207}"/>
+              </a:ext>
+            </a:extLst>
+          </p:cNvPr>
+          <p:cNvPicPr>
+            <a:picLocks noGrp="1" noChangeAspect="1"/>
+          </p:cNvPicPr>
           <p:nvPr>
             <p:ph idx="1"/>
           </p:nvPr>
-        </p:nvSpPr>
-        <p:spPr/>
-        <p:txBody>
-          <a:bodyPr/>
-          <a:lstStyle/>
-          <a:p>
-            <a:endParaRPr lang="en-US"/>
-          </a:p>
-        </p:txBody>
-      </p:sp>
+        </p:nvPicPr>
+        <p:blipFill>
+          <a:blip r:embed="rId2">
+            <a:extLst>
+              <a:ext uri="{28A0092B-C50C-407E-A947-70E740481C1C}">
+                <a14:useLocalDpi xmlns:a14="http://schemas.microsoft.com/office/drawing/2010/main" val="0"/>
+              </a:ext>
+            </a:extLst>
+          </a:blip>
+          <a:stretch>
+            <a:fillRect/>
+          </a:stretch>
+        </p:blipFill>
+        <p:spPr>
+          <a:xfrm>
+            <a:off x="838200" y="-1066800"/>
+            <a:ext cx="6400800" cy="4800600"/>
+          </a:xfrm>
+        </p:spPr>
+      </p:pic>
       <p:sp>
         <p:nvSpPr>
           <p:cNvPr id="4" name="Text Placeholder 3"/>
@@ -7898,6 +8113,45 @@
             <a:r>
               <a:rPr lang="en-US" dirty="0"/>
               <a:t>Leaflet gave us the power to create markers for our desired locations and bind pop-up messages to each marker, based on user-directed data.</a:t>
+            </a:r>
+          </a:p>
+        </p:txBody>
+      </p:sp>
+      <p:sp>
+        <p:nvSpPr>
+          <p:cNvPr id="7" name="TextBox 6">
+            <a:extLst>
+              <a:ext uri="{FF2B5EF4-FFF2-40B4-BE49-F238E27FC236}">
+                <a16:creationId xmlns:a16="http://schemas.microsoft.com/office/drawing/2014/main" id="{18DAC283-9830-161C-007F-77EA3DA8A3A8}"/>
+              </a:ext>
+            </a:extLst>
+          </p:cNvPr>
+          <p:cNvSpPr txBox="1"/>
+          <p:nvPr/>
+        </p:nvSpPr>
+        <p:spPr>
+          <a:xfrm>
+            <a:off x="1524000" y="2743200"/>
+            <a:ext cx="5105400" cy="646331"/>
+          </a:xfrm>
+          <a:prstGeom prst="rect">
+            <a:avLst/>
+          </a:prstGeom>
+          <a:noFill/>
+        </p:spPr>
+        <p:txBody>
+          <a:bodyPr wrap="square" rtlCol="0">
+            <a:spAutoFit/>
+          </a:bodyPr>
+          <a:lstStyle/>
+          <a:p>
+            <a:r>
+              <a:rPr lang="en-US" dirty="0"/>
+              <a:t>Hopefully will be putting the map we make here. It will be </a:t>
+            </a:r>
+            <a:r>
+              <a:rPr lang="en-US"/>
+              <a:t>super rad.</a:t>
             </a:r>
           </a:p>
         </p:txBody>
@@ -8029,7 +8283,13 @@
       </p:grpSpPr>
       <p:sp>
         <p:nvSpPr>
-          <p:cNvPr id="2" name="Title 1"/>
+          <p:cNvPr id="2" name="Title 1">
+            <a:extLst>
+              <a:ext uri="{FF2B5EF4-FFF2-40B4-BE49-F238E27FC236}">
+                <a16:creationId xmlns:a16="http://schemas.microsoft.com/office/drawing/2014/main" id="{8AC07CA5-8EFF-0E33-5E08-237218DF1590}"/>
+              </a:ext>
+            </a:extLst>
+          </p:cNvPr>
           <p:cNvSpPr>
             <a:spLocks noGrp="1"/>
           </p:cNvSpPr>
@@ -8037,31 +8297,32 @@
             <p:ph type="title"/>
           </p:nvPr>
         </p:nvSpPr>
-        <p:spPr>
-          <a:xfrm>
-            <a:off x="2514600" y="990600"/>
-            <a:ext cx="3429000" cy="627062"/>
-          </a:xfrm>
-        </p:spPr>
+        <p:spPr/>
         <p:txBody>
           <a:bodyPr/>
           <a:lstStyle/>
           <a:p>
             <a:r>
-              <a:rPr lang="en-US" b="1" dirty="0"/>
-              <a:t>Flask…</a:t>
-            </a:r>
-          </a:p>
-        </p:txBody>
-      </p:sp>
-      <p:sp>
-        <p:nvSpPr>
-          <p:cNvPr id="4" name="Text Placeholder 3"/>
+              <a:rPr lang="en-US" dirty="0"/>
+              <a:t>Let’s take a look at the finished project!</a:t>
+            </a:r>
+          </a:p>
+        </p:txBody>
+      </p:sp>
+      <p:sp>
+        <p:nvSpPr>
+          <p:cNvPr id="3" name="Content Placeholder 2">
+            <a:extLst>
+              <a:ext uri="{FF2B5EF4-FFF2-40B4-BE49-F238E27FC236}">
+                <a16:creationId xmlns:a16="http://schemas.microsoft.com/office/drawing/2014/main" id="{D3013508-3112-FF85-31C3-8750CA30B52C}"/>
+              </a:ext>
+            </a:extLst>
+          </p:cNvPr>
           <p:cNvSpPr>
             <a:spLocks noGrp="1"/>
           </p:cNvSpPr>
           <p:nvPr>
-            <p:ph type="body" sz="half" idx="2"/>
+            <p:ph idx="1"/>
           </p:nvPr>
         </p:nvSpPr>
         <p:spPr/>
@@ -8069,52 +8330,27 @@
           <a:bodyPr/>
           <a:lstStyle/>
           <a:p>
-            <a:endParaRPr lang="en-US" dirty="0"/>
-          </a:p>
-        </p:txBody>
-      </p:sp>
-      <p:pic>
-        <p:nvPicPr>
-          <p:cNvPr id="5" name="jim-carrey">
-            <a:hlinkClick r:id="" action="ppaction://media"/>
-            <a:extLst>
-              <a:ext uri="{FF2B5EF4-FFF2-40B4-BE49-F238E27FC236}">
-                <a16:creationId xmlns:a16="http://schemas.microsoft.com/office/drawing/2014/main" id="{F2544FD6-02F6-1CEA-4415-0E4B6181EEEC}"/>
-              </a:ext>
-            </a:extLst>
-          </p:cNvPr>
-          <p:cNvPicPr>
-            <a:picLocks noChangeAspect="1"/>
-          </p:cNvPicPr>
-          <p:nvPr>
-            <a:videoFile r:link="rId2"/>
-            <p:extLst>
-              <p:ext uri="{DAA4B4D4-6D71-4841-9C94-3DE7FCFB9230}">
-                <p14:media xmlns:p14="http://schemas.microsoft.com/office/powerpoint/2010/main" r:embed="rId1"/>
-              </p:ext>
-            </p:extLst>
-          </p:nvPr>
-        </p:nvPicPr>
-        <p:blipFill>
-          <a:blip r:embed="rId4"/>
-          <a:stretch>
-            <a:fillRect/>
-          </a:stretch>
-        </p:blipFill>
-        <p:spPr>
-          <a:xfrm>
-            <a:off x="1600198" y="2217737"/>
-            <a:ext cx="4876800" cy="2727325"/>
-          </a:xfrm>
-          <a:prstGeom prst="rect">
-            <a:avLst/>
-          </a:prstGeom>
-        </p:spPr>
-      </p:pic>
+            <a:r>
+              <a:rPr lang="en-US" dirty="0"/>
+              <a:t>This is where I will put some dope ass screengrabs or a gif of a screen recording.</a:t>
+            </a:r>
+            <a:br>
+              <a:rPr lang="en-US" dirty="0"/>
+            </a:br>
+            <a:br>
+              <a:rPr lang="en-US" dirty="0"/>
+            </a:br>
+            <a:r>
+              <a:rPr lang="en-US" dirty="0"/>
+              <a:t>It will be sick.</a:t>
+            </a:r>
+          </a:p>
+        </p:txBody>
+      </p:sp>
     </p:spTree>
     <p:extLst>
       <p:ext uri="{BB962C8B-B14F-4D97-AF65-F5344CB8AC3E}">
-        <p14:creationId xmlns:p14="http://schemas.microsoft.com/office/powerpoint/2010/main" val="2521986180"/>
+        <p14:creationId xmlns:p14="http://schemas.microsoft.com/office/powerpoint/2010/main" val="2811200149"/>
       </p:ext>
     </p:extLst>
   </p:cSld>
@@ -8133,144 +8369,6 @@
       </p:transition>
     </mc:Fallback>
   </mc:AlternateContent>
-  <p:timing>
-    <p:tnLst>
-      <p:par>
-        <p:cTn id="1" dur="indefinite" restart="never" nodeType="tmRoot">
-          <p:childTnLst>
-            <p:seq concurrent="1" nextAc="seek">
-              <p:cTn id="2" dur="indefinite" nodeType="mainSeq">
-                <p:childTnLst>
-                  <p:par>
-                    <p:cTn id="3" fill="hold">
-                      <p:stCondLst>
-                        <p:cond delay="indefinite"/>
-                        <p:cond evt="onBegin" delay="0">
-                          <p:tn val="2"/>
-                        </p:cond>
-                      </p:stCondLst>
-                      <p:childTnLst>
-                        <p:par>
-                          <p:cTn id="4" fill="hold">
-                            <p:stCondLst>
-                              <p:cond delay="0"/>
-                            </p:stCondLst>
-                            <p:childTnLst>
-                              <p:par>
-                                <p:cTn id="5" presetID="1" presetClass="mediacall" presetSubtype="0" fill="hold" nodeType="afterEffect">
-                                  <p:stCondLst>
-                                    <p:cond delay="0"/>
-                                  </p:stCondLst>
-                                  <p:childTnLst>
-                                    <p:cmd type="call" cmd="playFrom(0.0)">
-                                      <p:cBhvr>
-                                        <p:cTn id="6" dur="5040" fill="hold"/>
-                                        <p:tgtEl>
-                                          <p:spTgt spid="5"/>
-                                        </p:tgtEl>
-                                      </p:cBhvr>
-                                    </p:cmd>
-                                  </p:childTnLst>
-                                </p:cTn>
-                              </p:par>
-                            </p:childTnLst>
-                          </p:cTn>
-                        </p:par>
-                      </p:childTnLst>
-                    </p:cTn>
-                  </p:par>
-                </p:childTnLst>
-              </p:cTn>
-              <p:prevCondLst>
-                <p:cond evt="onPrev" delay="0">
-                  <p:tgtEl>
-                    <p:sldTgt/>
-                  </p:tgtEl>
-                </p:cond>
-              </p:prevCondLst>
-              <p:nextCondLst>
-                <p:cond evt="onNext" delay="0">
-                  <p:tgtEl>
-                    <p:sldTgt/>
-                  </p:tgtEl>
-                </p:cond>
-              </p:nextCondLst>
-            </p:seq>
-            <p:video>
-              <p:cMediaNode vol="80000">
-                <p:cTn id="7" repeatCount="indefinite" fill="hold" display="0">
-                  <p:stCondLst>
-                    <p:cond delay="indefinite"/>
-                  </p:stCondLst>
-                </p:cTn>
-                <p:tgtEl>
-                  <p:spTgt spid="5"/>
-                </p:tgtEl>
-              </p:cMediaNode>
-            </p:video>
-            <p:seq concurrent="1" nextAc="seek">
-              <p:cTn id="8" restart="whenNotActive" fill="hold" evtFilter="cancelBubble" nodeType="interactiveSeq">
-                <p:stCondLst>
-                  <p:cond evt="onClick" delay="0">
-                    <p:tgtEl>
-                      <p:spTgt spid="5"/>
-                    </p:tgtEl>
-                  </p:cond>
-                </p:stCondLst>
-                <p:endSync evt="end" delay="0">
-                  <p:rtn val="all"/>
-                </p:endSync>
-                <p:childTnLst>
-                  <p:par>
-                    <p:cTn id="9" fill="hold">
-                      <p:stCondLst>
-                        <p:cond delay="0"/>
-                      </p:stCondLst>
-                      <p:childTnLst>
-                        <p:par>
-                          <p:cTn id="10" fill="hold">
-                            <p:stCondLst>
-                              <p:cond delay="0"/>
-                            </p:stCondLst>
-                            <p:childTnLst>
-                              <p:par>
-                                <p:cTn id="11" presetID="2" presetClass="mediacall" presetSubtype="0" fill="hold" nodeType="clickEffect">
-                                  <p:stCondLst>
-                                    <p:cond delay="0"/>
-                                  </p:stCondLst>
-                                  <p:childTnLst>
-                                    <p:cmd type="call" cmd="togglePause">
-                                      <p:cBhvr>
-                                        <p:cTn id="12" dur="1" fill="hold"/>
-                                        <p:tgtEl>
-                                          <p:spTgt spid="5"/>
-                                        </p:tgtEl>
-                                      </p:cBhvr>
-                                    </p:cmd>
-                                  </p:childTnLst>
-                                </p:cTn>
-                              </p:par>
-                            </p:childTnLst>
-                          </p:cTn>
-                        </p:par>
-                      </p:childTnLst>
-                    </p:cTn>
-                  </p:par>
-                </p:childTnLst>
-              </p:cTn>
-              <p:nextCondLst>
-                <p:cond evt="onClick" delay="0">
-                  <p:tgtEl>
-                    <p:spTgt spid="5"/>
-                  </p:tgtEl>
-                </p:cond>
-              </p:nextCondLst>
-            </p:seq>
-          </p:childTnLst>
-        </p:cTn>
-      </p:par>
-    </p:tnLst>
-  </p:timing>
 </p:sld>
 </file>
 
@@ -8795,11 +8893,85 @@
           <a:p>
             <a:r>
               <a:rPr lang="en-US" b="1" dirty="0"/>
-              <a:t>Average Ratings (by Consumer)</a:t>
-            </a:r>
-          </a:p>
-        </p:txBody>
-      </p:sp>
+              <a:t>Average Ratings (by Consumer)*</a:t>
+            </a:r>
+          </a:p>
+        </p:txBody>
+      </p:sp>
+      <p:sp>
+        <p:nvSpPr>
+          <p:cNvPr id="6" name="TextBox 5">
+            <a:extLst>
+              <a:ext uri="{FF2B5EF4-FFF2-40B4-BE49-F238E27FC236}">
+                <a16:creationId xmlns:a16="http://schemas.microsoft.com/office/drawing/2014/main" id="{391280F7-9C54-0E6C-58C9-D0B22A1A775A}"/>
+              </a:ext>
+            </a:extLst>
+          </p:cNvPr>
+          <p:cNvSpPr txBox="1"/>
+          <p:nvPr/>
+        </p:nvSpPr>
+        <p:spPr>
+          <a:xfrm>
+            <a:off x="9144000" y="5835878"/>
+            <a:ext cx="4953000" cy="215444"/>
+          </a:xfrm>
+          <a:prstGeom prst="rect">
+            <a:avLst/>
+          </a:prstGeom>
+          <a:noFill/>
+        </p:spPr>
+        <p:txBody>
+          <a:bodyPr wrap="square" rtlCol="0">
+            <a:spAutoFit/>
+          </a:bodyPr>
+          <a:lstStyle/>
+          <a:p>
+            <a:r>
+              <a:rPr lang="en-US" sz="800" dirty="0"/>
+              <a:t>*this is sample data. Made up. Fake. All lies.</a:t>
+            </a:r>
+          </a:p>
+        </p:txBody>
+      </p:sp>
+      <p:pic>
+        <p:nvPicPr>
+          <p:cNvPr id="8" name="Graphic 7">
+            <a:extLst>
+              <a:ext uri="{FF2B5EF4-FFF2-40B4-BE49-F238E27FC236}">
+                <a16:creationId xmlns:a16="http://schemas.microsoft.com/office/drawing/2014/main" id="{E02CC2BE-CE91-1EF4-03FA-B1A23E0A42D3}"/>
+              </a:ext>
+            </a:extLst>
+          </p:cNvPr>
+          <p:cNvPicPr>
+            <a:picLocks noChangeAspect="1"/>
+          </p:cNvPicPr>
+          <p:nvPr/>
+        </p:nvPicPr>
+        <p:blipFill>
+          <a:blip r:embed="rId2">
+            <a:extLst>
+              <a:ext uri="{28A0092B-C50C-407E-A947-70E740481C1C}">
+                <a14:useLocalDpi xmlns:a14="http://schemas.microsoft.com/office/drawing/2010/main" val="0"/>
+              </a:ext>
+              <a:ext uri="{96DAC541-7B7A-43D3-8B79-37D633B846F1}">
+                <asvg:svgBlip xmlns:asvg="http://schemas.microsoft.com/office/drawing/2016/SVG/main" r:embed="rId3"/>
+              </a:ext>
+            </a:extLst>
+          </a:blip>
+          <a:stretch>
+            <a:fillRect/>
+          </a:stretch>
+        </p:blipFill>
+        <p:spPr>
+          <a:xfrm>
+            <a:off x="7239000" y="3820846"/>
+            <a:ext cx="4838700" cy="1028700"/>
+          </a:xfrm>
+          <a:prstGeom prst="rect">
+            <a:avLst/>
+          </a:prstGeom>
+        </p:spPr>
+      </p:pic>
     </p:spTree>
     <p:extLst>
       <p:ext uri="{BB962C8B-B14F-4D97-AF65-F5344CB8AC3E}">
@@ -9076,7 +9248,7 @@
           <a:p>
             <a:r>
               <a:rPr lang="en-US" dirty="0"/>
-              <a:t>Yelp Fusion API</a:t>
+              <a:t>Yelp Fusion API Features</a:t>
             </a:r>
           </a:p>
         </p:txBody>
@@ -9099,7 +9271,7 @@
         </p:spPr>
         <p:txBody>
           <a:bodyPr>
-            <a:normAutofit/>
+            <a:normAutofit fontScale="85000" lnSpcReduction="20000"/>
           </a:bodyPr>
           <a:lstStyle/>
           <a:p>
@@ -9124,6 +9296,15 @@
             <a:r>
               <a:rPr lang="en-US" sz="2400" dirty="0"/>
               <a:t>Legend for error responses</a:t>
+            </a:r>
+          </a:p>
+          <a:p>
+            <a:endParaRPr lang="en-US" sz="2400" dirty="0"/>
+          </a:p>
+          <a:p>
+            <a:r>
+              <a:rPr lang="en-US" sz="2400" dirty="0"/>
+              <a:t>Access to millions of data points</a:t>
             </a:r>
           </a:p>
         </p:txBody>
@@ -9159,7 +9340,9 @@
         </p:nvSpPr>
         <p:spPr/>
         <p:txBody>
-          <a:bodyPr/>
+          <a:bodyPr>
+            <a:normAutofit fontScale="85000" lnSpcReduction="20000"/>
+          </a:bodyPr>
           <a:lstStyle/>
           <a:p>
             <a:endParaRPr lang="en-US"/>

</xml_diff>

<commit_message>
Powerpoint slide distribution for presentation.
</commit_message>
<xml_diff>
--- a/YelpForTravelHelp.pptx
+++ b/YelpForTravelHelp.pptx
@@ -140,12 +140,112 @@
   <pc:docChgLst>
     <pc:chgData name="Jeremy Magee" userId="54b62a32ee7be8e2" providerId="LiveId" clId="{A4339804-653F-4C41-B2F0-A8437EA73F88}"/>
     <pc:docChg chg="custSel modSld">
-      <pc:chgData name="Jeremy Magee" userId="54b62a32ee7be8e2" providerId="LiveId" clId="{A4339804-653F-4C41-B2F0-A8437EA73F88}" dt="2023-10-10T00:12:10.627" v="74" actId="33524"/>
+      <pc:chgData name="Jeremy Magee" userId="54b62a32ee7be8e2" providerId="LiveId" clId="{A4339804-653F-4C41-B2F0-A8437EA73F88}" dt="2023-10-10T01:55:36.993" v="831" actId="20577"/>
       <pc:docMkLst>
         <pc:docMk/>
       </pc:docMkLst>
-      <pc:sldChg chg="modSp mod">
-        <pc:chgData name="Jeremy Magee" userId="54b62a32ee7be8e2" providerId="LiveId" clId="{A4339804-653F-4C41-B2F0-A8437EA73F88}" dt="2023-10-09T23:58:24.135" v="40" actId="20577"/>
+      <pc:sldChg chg="modNotesTx">
+        <pc:chgData name="Jeremy Magee" userId="54b62a32ee7be8e2" providerId="LiveId" clId="{A4339804-653F-4C41-B2F0-A8437EA73F88}" dt="2023-10-10T01:49:15.316" v="261" actId="20577"/>
+        <pc:sldMkLst>
+          <pc:docMk/>
+          <pc:sldMk cId="2142729111" sldId="256"/>
+        </pc:sldMkLst>
+      </pc:sldChg>
+      <pc:sldChg chg="modNotesTx">
+        <pc:chgData name="Jeremy Magee" userId="54b62a32ee7be8e2" providerId="LiveId" clId="{A4339804-653F-4C41-B2F0-A8437EA73F88}" dt="2023-10-10T01:48:16.584" v="135" actId="20577"/>
+        <pc:sldMkLst>
+          <pc:docMk/>
+          <pc:sldMk cId="682195269" sldId="257"/>
+        </pc:sldMkLst>
+      </pc:sldChg>
+      <pc:sldChg chg="modNotesTx">
+        <pc:chgData name="Jeremy Magee" userId="54b62a32ee7be8e2" providerId="LiveId" clId="{A4339804-653F-4C41-B2F0-A8437EA73F88}" dt="2023-10-10T01:48:47.612" v="185" actId="20577"/>
+        <pc:sldMkLst>
+          <pc:docMk/>
+          <pc:sldMk cId="1180589104" sldId="259"/>
+        </pc:sldMkLst>
+      </pc:sldChg>
+      <pc:sldChg chg="modNotesTx">
+        <pc:chgData name="Jeremy Magee" userId="54b62a32ee7be8e2" providerId="LiveId" clId="{A4339804-653F-4C41-B2F0-A8437EA73F88}" dt="2023-10-10T01:48:58.412" v="217" actId="20577"/>
+        <pc:sldMkLst>
+          <pc:docMk/>
+          <pc:sldMk cId="2426022026" sldId="260"/>
+        </pc:sldMkLst>
+      </pc:sldChg>
+      <pc:sldChg chg="modNotesTx">
+        <pc:chgData name="Jeremy Magee" userId="54b62a32ee7be8e2" providerId="LiveId" clId="{A4339804-653F-4C41-B2F0-A8437EA73F88}" dt="2023-10-10T01:49:31.282" v="306" actId="20577"/>
+        <pc:sldMkLst>
+          <pc:docMk/>
+          <pc:sldMk cId="1783796071" sldId="261"/>
+        </pc:sldMkLst>
+      </pc:sldChg>
+      <pc:sldChg chg="modSp mod modNotesTx">
+        <pc:chgData name="Jeremy Magee" userId="54b62a32ee7be8e2" providerId="LiveId" clId="{A4339804-653F-4C41-B2F0-A8437EA73F88}" dt="2023-10-10T01:51:15.334" v="426" actId="20577"/>
+        <pc:sldMkLst>
+          <pc:docMk/>
+          <pc:sldMk cId="3387061768" sldId="262"/>
+        </pc:sldMkLst>
+        <pc:spChg chg="mod">
+          <ac:chgData name="Jeremy Magee" userId="54b62a32ee7be8e2" providerId="LiveId" clId="{A4339804-653F-4C41-B2F0-A8437EA73F88}" dt="2023-10-10T01:51:15.334" v="426" actId="20577"/>
+          <ac:spMkLst>
+            <pc:docMk/>
+            <pc:sldMk cId="3387061768" sldId="262"/>
+            <ac:spMk id="4" creationId="{00000000-0000-0000-0000-000000000000}"/>
+          </ac:spMkLst>
+        </pc:spChg>
+        <pc:spChg chg="mod">
+          <ac:chgData name="Jeremy Magee" userId="54b62a32ee7be8e2" providerId="LiveId" clId="{A4339804-653F-4C41-B2F0-A8437EA73F88}" dt="2023-10-10T01:51:08.376" v="391" actId="27636"/>
+          <ac:spMkLst>
+            <pc:docMk/>
+            <pc:sldMk cId="3387061768" sldId="262"/>
+            <ac:spMk id="6" creationId="{00000000-0000-0000-0000-000000000000}"/>
+          </ac:spMkLst>
+        </pc:spChg>
+      </pc:sldChg>
+      <pc:sldChg chg="modNotesTx">
+        <pc:chgData name="Jeremy Magee" userId="54b62a32ee7be8e2" providerId="LiveId" clId="{A4339804-653F-4C41-B2F0-A8437EA73F88}" dt="2023-10-10T01:52:19.948" v="633" actId="20577"/>
+        <pc:sldMkLst>
+          <pc:docMk/>
+          <pc:sldMk cId="3440500440" sldId="263"/>
+        </pc:sldMkLst>
+      </pc:sldChg>
+      <pc:sldChg chg="modNotesTx">
+        <pc:chgData name="Jeremy Magee" userId="54b62a32ee7be8e2" providerId="LiveId" clId="{A4339804-653F-4C41-B2F0-A8437EA73F88}" dt="2023-10-10T01:52:56.379" v="717" actId="20577"/>
+        <pc:sldMkLst>
+          <pc:docMk/>
+          <pc:sldMk cId="4129439513" sldId="264"/>
+        </pc:sldMkLst>
+      </pc:sldChg>
+      <pc:sldChg chg="modNotesTx">
+        <pc:chgData name="Jeremy Magee" userId="54b62a32ee7be8e2" providerId="LiveId" clId="{A4339804-653F-4C41-B2F0-A8437EA73F88}" dt="2023-10-10T01:53:25.948" v="762" actId="20577"/>
+        <pc:sldMkLst>
+          <pc:docMk/>
+          <pc:sldMk cId="1827431122" sldId="265"/>
+        </pc:sldMkLst>
+      </pc:sldChg>
+      <pc:sldChg chg="modNotesTx">
+        <pc:chgData name="Jeremy Magee" userId="54b62a32ee7be8e2" providerId="LiveId" clId="{A4339804-653F-4C41-B2F0-A8437EA73F88}" dt="2023-10-10T01:52:32.160" v="651" actId="20577"/>
+        <pc:sldMkLst>
+          <pc:docMk/>
+          <pc:sldMk cId="1407246764" sldId="267"/>
+        </pc:sldMkLst>
+      </pc:sldChg>
+      <pc:sldChg chg="modNotesTx">
+        <pc:chgData name="Jeremy Magee" userId="54b62a32ee7be8e2" providerId="LiveId" clId="{A4339804-653F-4C41-B2F0-A8437EA73F88}" dt="2023-10-10T01:51:32.417" v="477" actId="20577"/>
+        <pc:sldMkLst>
+          <pc:docMk/>
+          <pc:sldMk cId="2038093716" sldId="268"/>
+        </pc:sldMkLst>
+      </pc:sldChg>
+      <pc:sldChg chg="modNotesTx">
+        <pc:chgData name="Jeremy Magee" userId="54b62a32ee7be8e2" providerId="LiveId" clId="{A4339804-653F-4C41-B2F0-A8437EA73F88}" dt="2023-10-10T01:53:14.304" v="743" actId="20577"/>
+        <pc:sldMkLst>
+          <pc:docMk/>
+          <pc:sldMk cId="3863911453" sldId="269"/>
+        </pc:sldMkLst>
+      </pc:sldChg>
+      <pc:sldChg chg="modSp mod modNotesTx">
+        <pc:chgData name="Jeremy Magee" userId="54b62a32ee7be8e2" providerId="LiveId" clId="{A4339804-653F-4C41-B2F0-A8437EA73F88}" dt="2023-10-10T01:55:13.101" v="787" actId="20577"/>
         <pc:sldMkLst>
           <pc:docMk/>
           <pc:sldMk cId="2176088558" sldId="270"/>
@@ -159,8 +259,15 @@
           </ac:spMkLst>
         </pc:spChg>
       </pc:sldChg>
-      <pc:sldChg chg="modSp mod">
-        <pc:chgData name="Jeremy Magee" userId="54b62a32ee7be8e2" providerId="LiveId" clId="{A4339804-653F-4C41-B2F0-A8437EA73F88}" dt="2023-10-10T00:12:10.627" v="74" actId="33524"/>
+      <pc:sldChg chg="modNotesTx">
+        <pc:chgData name="Jeremy Magee" userId="54b62a32ee7be8e2" providerId="LiveId" clId="{A4339804-653F-4C41-B2F0-A8437EA73F88}" dt="2023-10-10T01:52:02.740" v="581" actId="20577"/>
+        <pc:sldMkLst>
+          <pc:docMk/>
+          <pc:sldMk cId="372948772" sldId="271"/>
+        </pc:sldMkLst>
+      </pc:sldChg>
+      <pc:sldChg chg="modSp mod modNotesTx">
+        <pc:chgData name="Jeremy Magee" userId="54b62a32ee7be8e2" providerId="LiveId" clId="{A4339804-653F-4C41-B2F0-A8437EA73F88}" dt="2023-10-10T01:55:36.993" v="831" actId="20577"/>
         <pc:sldMkLst>
           <pc:docMk/>
           <pc:sldMk cId="2811200149" sldId="272"/>
@@ -174,7 +281,7 @@
           </ac:spMkLst>
         </pc:spChg>
         <pc:spChg chg="mod">
-          <ac:chgData name="Jeremy Magee" userId="54b62a32ee7be8e2" providerId="LiveId" clId="{A4339804-653F-4C41-B2F0-A8437EA73F88}" dt="2023-10-09T23:58:40.805" v="73" actId="20577"/>
+          <ac:chgData name="Jeremy Magee" userId="54b62a32ee7be8e2" providerId="LiveId" clId="{A4339804-653F-4C41-B2F0-A8437EA73F88}" dt="2023-10-10T01:55:36.993" v="831" actId="20577"/>
           <ac:spMkLst>
             <pc:docMk/>
             <pc:sldMk cId="2811200149" sldId="272"/>
@@ -1233,7 +1340,7 @@
   <dgm:whole/>
   <dgm:extLst>
     <a:ext uri="http://schemas.microsoft.com/office/drawing/2008/diagram">
-      <dsp:dataModelExt xmlns:dsp="http://schemas.microsoft.com/office/drawing/2008/diagram" relId="rId6" minVer="http://schemas.openxmlformats.org/drawingml/2006/diagram"/>
+      <dsp:dataModelExt xmlns:dsp="http://schemas.microsoft.com/office/drawing/2008/diagram" relId="rId7" minVer="http://schemas.openxmlformats.org/drawingml/2006/diagram"/>
     </a:ext>
   </dgm:extLst>
 </dgm:dataModel>
@@ -3592,7 +3699,10 @@
           <a:bodyPr/>
           <a:lstStyle/>
           <a:p>
-            <a:endParaRPr lang="en-US"/>
+            <a:r>
+              <a:rPr lang="en-US" dirty="0"/>
+              <a:t>Hannah starts us off by reading the title.</a:t>
+            </a:r>
           </a:p>
         </p:txBody>
       </p:sp>
@@ -3623,6 +3733,1232 @@
     <p:extLst>
       <p:ext uri="{BB962C8B-B14F-4D97-AF65-F5344CB8AC3E}">
         <p14:creationId xmlns:p14="http://schemas.microsoft.com/office/powerpoint/2010/main" val="4039154547"/>
+      </p:ext>
+    </p:extLst>
+  </p:cSld>
+  <p:clrMapOvr>
+    <a:masterClrMapping/>
+  </p:clrMapOvr>
+</p:notes>
+</file>
+
+<file path=ppt/notesSlides/notesSlide10.xml><?xml version="1.0" encoding="utf-8"?>
+<p:notes xmlns:a="http://schemas.openxmlformats.org/drawingml/2006/main" xmlns:r="http://schemas.openxmlformats.org/officeDocument/2006/relationships" xmlns:p="http://schemas.openxmlformats.org/presentationml/2006/main">
+  <p:cSld>
+    <p:spTree>
+      <p:nvGrpSpPr>
+        <p:cNvPr id="1" name=""/>
+        <p:cNvGrpSpPr/>
+        <p:nvPr/>
+      </p:nvGrpSpPr>
+      <p:grpSpPr>
+        <a:xfrm>
+          <a:off x="0" y="0"/>
+          <a:ext cx="0" cy="0"/>
+          <a:chOff x="0" y="0"/>
+          <a:chExt cx="0" cy="0"/>
+        </a:xfrm>
+      </p:grpSpPr>
+      <p:sp>
+        <p:nvSpPr>
+          <p:cNvPr id="2" name="Slide Image Placeholder 1"/>
+          <p:cNvSpPr>
+            <a:spLocks noGrp="1" noRot="1" noChangeAspect="1"/>
+          </p:cNvSpPr>
+          <p:nvPr>
+            <p:ph type="sldImg"/>
+          </p:nvPr>
+        </p:nvSpPr>
+        <p:spPr/>
+      </p:sp>
+      <p:sp>
+        <p:nvSpPr>
+          <p:cNvPr id="3" name="Notes Placeholder 2"/>
+          <p:cNvSpPr>
+            <a:spLocks noGrp="1"/>
+          </p:cNvSpPr>
+          <p:nvPr>
+            <p:ph type="body" idx="1"/>
+          </p:nvPr>
+        </p:nvSpPr>
+        <p:spPr/>
+        <p:txBody>
+          <a:bodyPr/>
+          <a:lstStyle/>
+          <a:p>
+            <a:r>
+              <a:rPr lang="en-US" dirty="0"/>
+              <a:t>Elijah jumps in.</a:t>
+            </a:r>
+          </a:p>
+        </p:txBody>
+      </p:sp>
+      <p:sp>
+        <p:nvSpPr>
+          <p:cNvPr id="4" name="Slide Number Placeholder 3"/>
+          <p:cNvSpPr>
+            <a:spLocks noGrp="1"/>
+          </p:cNvSpPr>
+          <p:nvPr>
+            <p:ph type="sldNum" sz="quarter" idx="5"/>
+          </p:nvPr>
+        </p:nvSpPr>
+        <p:spPr/>
+        <p:txBody>
+          <a:bodyPr/>
+          <a:lstStyle/>
+          <a:p>
+            <a:fld id="{8DAEC444-603B-4F09-9A06-5917518DD901}" type="slidenum">
+              <a:rPr lang="en-US" smtClean="0"/>
+              <a:t>10</a:t>
+            </a:fld>
+            <a:endParaRPr lang="en-US"/>
+          </a:p>
+        </p:txBody>
+      </p:sp>
+    </p:spTree>
+    <p:extLst>
+      <p:ext uri="{BB962C8B-B14F-4D97-AF65-F5344CB8AC3E}">
+        <p14:creationId xmlns:p14="http://schemas.microsoft.com/office/powerpoint/2010/main" val="2097590965"/>
+      </p:ext>
+    </p:extLst>
+  </p:cSld>
+  <p:clrMapOvr>
+    <a:masterClrMapping/>
+  </p:clrMapOvr>
+</p:notes>
+</file>
+
+<file path=ppt/notesSlides/notesSlide11.xml><?xml version="1.0" encoding="utf-8"?>
+<p:notes xmlns:a="http://schemas.openxmlformats.org/drawingml/2006/main" xmlns:r="http://schemas.openxmlformats.org/officeDocument/2006/relationships" xmlns:p="http://schemas.openxmlformats.org/presentationml/2006/main">
+  <p:cSld>
+    <p:spTree>
+      <p:nvGrpSpPr>
+        <p:cNvPr id="1" name=""/>
+        <p:cNvGrpSpPr/>
+        <p:nvPr/>
+      </p:nvGrpSpPr>
+      <p:grpSpPr>
+        <a:xfrm>
+          <a:off x="0" y="0"/>
+          <a:ext cx="0" cy="0"/>
+          <a:chOff x="0" y="0"/>
+          <a:chExt cx="0" cy="0"/>
+        </a:xfrm>
+      </p:grpSpPr>
+      <p:sp>
+        <p:nvSpPr>
+          <p:cNvPr id="2" name="Slide Image Placeholder 1"/>
+          <p:cNvSpPr>
+            <a:spLocks noGrp="1" noRot="1" noChangeAspect="1"/>
+          </p:cNvSpPr>
+          <p:nvPr>
+            <p:ph type="sldImg"/>
+          </p:nvPr>
+        </p:nvSpPr>
+        <p:spPr/>
+      </p:sp>
+      <p:sp>
+        <p:nvSpPr>
+          <p:cNvPr id="3" name="Notes Placeholder 2"/>
+          <p:cNvSpPr>
+            <a:spLocks noGrp="1"/>
+          </p:cNvSpPr>
+          <p:nvPr>
+            <p:ph type="body" idx="1"/>
+          </p:nvPr>
+        </p:nvSpPr>
+        <p:spPr/>
+        <p:txBody>
+          <a:bodyPr/>
+          <a:lstStyle/>
+          <a:p>
+            <a:r>
+              <a:rPr lang="en-US" dirty="0"/>
+              <a:t>Elijah continues with the main components of our Project</a:t>
+            </a:r>
+          </a:p>
+        </p:txBody>
+      </p:sp>
+      <p:sp>
+        <p:nvSpPr>
+          <p:cNvPr id="4" name="Slide Number Placeholder 3"/>
+          <p:cNvSpPr>
+            <a:spLocks noGrp="1"/>
+          </p:cNvSpPr>
+          <p:nvPr>
+            <p:ph type="sldNum" sz="quarter" idx="5"/>
+          </p:nvPr>
+        </p:nvSpPr>
+        <p:spPr/>
+        <p:txBody>
+          <a:bodyPr/>
+          <a:lstStyle/>
+          <a:p>
+            <a:fld id="{8DAEC444-603B-4F09-9A06-5917518DD901}" type="slidenum">
+              <a:rPr lang="en-US" smtClean="0"/>
+              <a:t>11</a:t>
+            </a:fld>
+            <a:endParaRPr lang="en-US"/>
+          </a:p>
+        </p:txBody>
+      </p:sp>
+    </p:spTree>
+    <p:extLst>
+      <p:ext uri="{BB962C8B-B14F-4D97-AF65-F5344CB8AC3E}">
+        <p14:creationId xmlns:p14="http://schemas.microsoft.com/office/powerpoint/2010/main" val="315475727"/>
+      </p:ext>
+    </p:extLst>
+  </p:cSld>
+  <p:clrMapOvr>
+    <a:masterClrMapping/>
+  </p:clrMapOvr>
+</p:notes>
+</file>
+
+<file path=ppt/notesSlides/notesSlide12.xml><?xml version="1.0" encoding="utf-8"?>
+<p:notes xmlns:a="http://schemas.openxmlformats.org/drawingml/2006/main" xmlns:r="http://schemas.openxmlformats.org/officeDocument/2006/relationships" xmlns:p="http://schemas.openxmlformats.org/presentationml/2006/main">
+  <p:cSld>
+    <p:spTree>
+      <p:nvGrpSpPr>
+        <p:cNvPr id="1" name=""/>
+        <p:cNvGrpSpPr/>
+        <p:nvPr/>
+      </p:nvGrpSpPr>
+      <p:grpSpPr>
+        <a:xfrm>
+          <a:off x="0" y="0"/>
+          <a:ext cx="0" cy="0"/>
+          <a:chOff x="0" y="0"/>
+          <a:chExt cx="0" cy="0"/>
+        </a:xfrm>
+      </p:grpSpPr>
+      <p:sp>
+        <p:nvSpPr>
+          <p:cNvPr id="2" name="Slide Image Placeholder 1"/>
+          <p:cNvSpPr>
+            <a:spLocks noGrp="1" noRot="1" noChangeAspect="1"/>
+          </p:cNvSpPr>
+          <p:nvPr>
+            <p:ph type="sldImg"/>
+          </p:nvPr>
+        </p:nvSpPr>
+        <p:spPr/>
+      </p:sp>
+      <p:sp>
+        <p:nvSpPr>
+          <p:cNvPr id="3" name="Notes Placeholder 2"/>
+          <p:cNvSpPr>
+            <a:spLocks noGrp="1"/>
+          </p:cNvSpPr>
+          <p:nvPr>
+            <p:ph type="body" idx="1"/>
+          </p:nvPr>
+        </p:nvSpPr>
+        <p:spPr/>
+        <p:txBody>
+          <a:bodyPr/>
+          <a:lstStyle/>
+          <a:p>
+            <a:r>
+              <a:rPr lang="en-US" dirty="0"/>
+              <a:t>Hannah lays down the law</a:t>
+            </a:r>
+          </a:p>
+        </p:txBody>
+      </p:sp>
+      <p:sp>
+        <p:nvSpPr>
+          <p:cNvPr id="4" name="Slide Number Placeholder 3"/>
+          <p:cNvSpPr>
+            <a:spLocks noGrp="1"/>
+          </p:cNvSpPr>
+          <p:nvPr>
+            <p:ph type="sldNum" sz="quarter" idx="5"/>
+          </p:nvPr>
+        </p:nvSpPr>
+        <p:spPr/>
+        <p:txBody>
+          <a:bodyPr/>
+          <a:lstStyle/>
+          <a:p>
+            <a:fld id="{8DAEC444-603B-4F09-9A06-5917518DD901}" type="slidenum">
+              <a:rPr lang="en-US" smtClean="0"/>
+              <a:t>12</a:t>
+            </a:fld>
+            <a:endParaRPr lang="en-US"/>
+          </a:p>
+        </p:txBody>
+      </p:sp>
+    </p:spTree>
+    <p:extLst>
+      <p:ext uri="{BB962C8B-B14F-4D97-AF65-F5344CB8AC3E}">
+        <p14:creationId xmlns:p14="http://schemas.microsoft.com/office/powerpoint/2010/main" val="1058521831"/>
+      </p:ext>
+    </p:extLst>
+  </p:cSld>
+  <p:clrMapOvr>
+    <a:masterClrMapping/>
+  </p:clrMapOvr>
+</p:notes>
+</file>
+
+<file path=ppt/notesSlides/notesSlide13.xml><?xml version="1.0" encoding="utf-8"?>
+<p:notes xmlns:a="http://schemas.openxmlformats.org/drawingml/2006/main" xmlns:r="http://schemas.openxmlformats.org/officeDocument/2006/relationships" xmlns:p="http://schemas.openxmlformats.org/presentationml/2006/main">
+  <p:cSld>
+    <p:spTree>
+      <p:nvGrpSpPr>
+        <p:cNvPr id="1" name=""/>
+        <p:cNvGrpSpPr/>
+        <p:nvPr/>
+      </p:nvGrpSpPr>
+      <p:grpSpPr>
+        <a:xfrm>
+          <a:off x="0" y="0"/>
+          <a:ext cx="0" cy="0"/>
+          <a:chOff x="0" y="0"/>
+          <a:chExt cx="0" cy="0"/>
+        </a:xfrm>
+      </p:grpSpPr>
+      <p:sp>
+        <p:nvSpPr>
+          <p:cNvPr id="2" name="Slide Image Placeholder 1"/>
+          <p:cNvSpPr>
+            <a:spLocks noGrp="1" noRot="1" noChangeAspect="1"/>
+          </p:cNvSpPr>
+          <p:nvPr>
+            <p:ph type="sldImg"/>
+          </p:nvPr>
+        </p:nvSpPr>
+        <p:spPr/>
+      </p:sp>
+      <p:sp>
+        <p:nvSpPr>
+          <p:cNvPr id="3" name="Notes Placeholder 2"/>
+          <p:cNvSpPr>
+            <a:spLocks noGrp="1"/>
+          </p:cNvSpPr>
+          <p:nvPr>
+            <p:ph type="body" idx="1"/>
+          </p:nvPr>
+        </p:nvSpPr>
+        <p:spPr/>
+        <p:txBody>
+          <a:bodyPr/>
+          <a:lstStyle/>
+          <a:p>
+            <a:r>
+              <a:rPr lang="en-US" dirty="0"/>
+              <a:t>Hannah spits truth.</a:t>
+            </a:r>
+          </a:p>
+        </p:txBody>
+      </p:sp>
+      <p:sp>
+        <p:nvSpPr>
+          <p:cNvPr id="4" name="Slide Number Placeholder 3"/>
+          <p:cNvSpPr>
+            <a:spLocks noGrp="1"/>
+          </p:cNvSpPr>
+          <p:nvPr>
+            <p:ph type="sldNum" sz="quarter" idx="5"/>
+          </p:nvPr>
+        </p:nvSpPr>
+        <p:spPr/>
+        <p:txBody>
+          <a:bodyPr/>
+          <a:lstStyle/>
+          <a:p>
+            <a:fld id="{8DAEC444-603B-4F09-9A06-5917518DD901}" type="slidenum">
+              <a:rPr lang="en-US" smtClean="0"/>
+              <a:t>13</a:t>
+            </a:fld>
+            <a:endParaRPr lang="en-US"/>
+          </a:p>
+        </p:txBody>
+      </p:sp>
+    </p:spTree>
+    <p:extLst>
+      <p:ext uri="{BB962C8B-B14F-4D97-AF65-F5344CB8AC3E}">
+        <p14:creationId xmlns:p14="http://schemas.microsoft.com/office/powerpoint/2010/main" val="1017705452"/>
+      </p:ext>
+    </p:extLst>
+  </p:cSld>
+  <p:clrMapOvr>
+    <a:masterClrMapping/>
+  </p:clrMapOvr>
+</p:notes>
+</file>
+
+<file path=ppt/notesSlides/notesSlide14.xml><?xml version="1.0" encoding="utf-8"?>
+<p:notes xmlns:a="http://schemas.openxmlformats.org/drawingml/2006/main" xmlns:r="http://schemas.openxmlformats.org/officeDocument/2006/relationships" xmlns:p="http://schemas.openxmlformats.org/presentationml/2006/main">
+  <p:cSld>
+    <p:spTree>
+      <p:nvGrpSpPr>
+        <p:cNvPr id="1" name=""/>
+        <p:cNvGrpSpPr/>
+        <p:nvPr/>
+      </p:nvGrpSpPr>
+      <p:grpSpPr>
+        <a:xfrm>
+          <a:off x="0" y="0"/>
+          <a:ext cx="0" cy="0"/>
+          <a:chOff x="0" y="0"/>
+          <a:chExt cx="0" cy="0"/>
+        </a:xfrm>
+      </p:grpSpPr>
+      <p:sp>
+        <p:nvSpPr>
+          <p:cNvPr id="2" name="Slide Image Placeholder 1"/>
+          <p:cNvSpPr>
+            <a:spLocks noGrp="1" noRot="1" noChangeAspect="1"/>
+          </p:cNvSpPr>
+          <p:nvPr>
+            <p:ph type="sldImg"/>
+          </p:nvPr>
+        </p:nvSpPr>
+        <p:spPr/>
+      </p:sp>
+      <p:sp>
+        <p:nvSpPr>
+          <p:cNvPr id="3" name="Notes Placeholder 2"/>
+          <p:cNvSpPr>
+            <a:spLocks noGrp="1"/>
+          </p:cNvSpPr>
+          <p:nvPr>
+            <p:ph type="body" idx="1"/>
+          </p:nvPr>
+        </p:nvSpPr>
+        <p:spPr/>
+        <p:txBody>
+          <a:bodyPr/>
+          <a:lstStyle/>
+          <a:p>
+            <a:r>
+              <a:rPr lang="en-US" dirty="0"/>
+              <a:t>Julianne finishes us out</a:t>
+            </a:r>
+          </a:p>
+        </p:txBody>
+      </p:sp>
+      <p:sp>
+        <p:nvSpPr>
+          <p:cNvPr id="4" name="Slide Number Placeholder 3"/>
+          <p:cNvSpPr>
+            <a:spLocks noGrp="1"/>
+          </p:cNvSpPr>
+          <p:nvPr>
+            <p:ph type="sldNum" sz="quarter" idx="5"/>
+          </p:nvPr>
+        </p:nvSpPr>
+        <p:spPr/>
+        <p:txBody>
+          <a:bodyPr/>
+          <a:lstStyle/>
+          <a:p>
+            <a:fld id="{8DAEC444-603B-4F09-9A06-5917518DD901}" type="slidenum">
+              <a:rPr lang="en-US" smtClean="0"/>
+              <a:t>14</a:t>
+            </a:fld>
+            <a:endParaRPr lang="en-US"/>
+          </a:p>
+        </p:txBody>
+      </p:sp>
+    </p:spTree>
+    <p:extLst>
+      <p:ext uri="{BB962C8B-B14F-4D97-AF65-F5344CB8AC3E}">
+        <p14:creationId xmlns:p14="http://schemas.microsoft.com/office/powerpoint/2010/main" val="2602846725"/>
+      </p:ext>
+    </p:extLst>
+  </p:cSld>
+  <p:clrMapOvr>
+    <a:masterClrMapping/>
+  </p:clrMapOvr>
+</p:notes>
+</file>
+
+<file path=ppt/notesSlides/notesSlide15.xml><?xml version="1.0" encoding="utf-8"?>
+<p:notes xmlns:a="http://schemas.openxmlformats.org/drawingml/2006/main" xmlns:r="http://schemas.openxmlformats.org/officeDocument/2006/relationships" xmlns:p="http://schemas.openxmlformats.org/presentationml/2006/main">
+  <p:cSld>
+    <p:spTree>
+      <p:nvGrpSpPr>
+        <p:cNvPr id="1" name=""/>
+        <p:cNvGrpSpPr/>
+        <p:nvPr/>
+      </p:nvGrpSpPr>
+      <p:grpSpPr>
+        <a:xfrm>
+          <a:off x="0" y="0"/>
+          <a:ext cx="0" cy="0"/>
+          <a:chOff x="0" y="0"/>
+          <a:chExt cx="0" cy="0"/>
+        </a:xfrm>
+      </p:grpSpPr>
+      <p:sp>
+        <p:nvSpPr>
+          <p:cNvPr id="2" name="Slide Image Placeholder 1"/>
+          <p:cNvSpPr>
+            <a:spLocks noGrp="1" noRot="1" noChangeAspect="1"/>
+          </p:cNvSpPr>
+          <p:nvPr>
+            <p:ph type="sldImg"/>
+          </p:nvPr>
+        </p:nvSpPr>
+        <p:spPr/>
+      </p:sp>
+      <p:sp>
+        <p:nvSpPr>
+          <p:cNvPr id="3" name="Notes Placeholder 2"/>
+          <p:cNvSpPr>
+            <a:spLocks noGrp="1"/>
+          </p:cNvSpPr>
+          <p:nvPr>
+            <p:ph type="body" idx="1"/>
+          </p:nvPr>
+        </p:nvSpPr>
+        <p:spPr/>
+        <p:txBody>
+          <a:bodyPr/>
+          <a:lstStyle/>
+          <a:p>
+            <a:r>
+              <a:rPr lang="en-US" dirty="0"/>
+              <a:t>Julianne takes it home, woo </a:t>
+            </a:r>
+            <a:r>
+              <a:rPr lang="en-US" dirty="0" err="1"/>
+              <a:t>hoo</a:t>
+            </a:r>
+            <a:r>
+              <a:rPr lang="en-US" dirty="0"/>
+              <a:t>!</a:t>
+            </a:r>
+          </a:p>
+        </p:txBody>
+      </p:sp>
+      <p:sp>
+        <p:nvSpPr>
+          <p:cNvPr id="4" name="Slide Number Placeholder 3"/>
+          <p:cNvSpPr>
+            <a:spLocks noGrp="1"/>
+          </p:cNvSpPr>
+          <p:nvPr>
+            <p:ph type="sldNum" sz="quarter" idx="5"/>
+          </p:nvPr>
+        </p:nvSpPr>
+        <p:spPr/>
+        <p:txBody>
+          <a:bodyPr/>
+          <a:lstStyle/>
+          <a:p>
+            <a:fld id="{8DAEC444-603B-4F09-9A06-5917518DD901}" type="slidenum">
+              <a:rPr lang="en-US" smtClean="0"/>
+              <a:t>15</a:t>
+            </a:fld>
+            <a:endParaRPr lang="en-US"/>
+          </a:p>
+        </p:txBody>
+      </p:sp>
+    </p:spTree>
+    <p:extLst>
+      <p:ext uri="{BB962C8B-B14F-4D97-AF65-F5344CB8AC3E}">
+        <p14:creationId xmlns:p14="http://schemas.microsoft.com/office/powerpoint/2010/main" val="568277880"/>
+      </p:ext>
+    </p:extLst>
+  </p:cSld>
+  <p:clrMapOvr>
+    <a:masterClrMapping/>
+  </p:clrMapOvr>
+</p:notes>
+</file>
+
+<file path=ppt/notesSlides/notesSlide2.xml><?xml version="1.0" encoding="utf-8"?>
+<p:notes xmlns:a="http://schemas.openxmlformats.org/drawingml/2006/main" xmlns:r="http://schemas.openxmlformats.org/officeDocument/2006/relationships" xmlns:p="http://schemas.openxmlformats.org/presentationml/2006/main">
+  <p:cSld>
+    <p:spTree>
+      <p:nvGrpSpPr>
+        <p:cNvPr id="1" name=""/>
+        <p:cNvGrpSpPr/>
+        <p:nvPr/>
+      </p:nvGrpSpPr>
+      <p:grpSpPr>
+        <a:xfrm>
+          <a:off x="0" y="0"/>
+          <a:ext cx="0" cy="0"/>
+          <a:chOff x="0" y="0"/>
+          <a:chExt cx="0" cy="0"/>
+        </a:xfrm>
+      </p:grpSpPr>
+      <p:sp>
+        <p:nvSpPr>
+          <p:cNvPr id="2" name="Slide Image Placeholder 1"/>
+          <p:cNvSpPr>
+            <a:spLocks noGrp="1" noRot="1" noChangeAspect="1"/>
+          </p:cNvSpPr>
+          <p:nvPr>
+            <p:ph type="sldImg"/>
+          </p:nvPr>
+        </p:nvSpPr>
+        <p:spPr/>
+      </p:sp>
+      <p:sp>
+        <p:nvSpPr>
+          <p:cNvPr id="3" name="Notes Placeholder 2"/>
+          <p:cNvSpPr>
+            <a:spLocks noGrp="1"/>
+          </p:cNvSpPr>
+          <p:nvPr>
+            <p:ph type="body" idx="1"/>
+          </p:nvPr>
+        </p:nvSpPr>
+        <p:spPr/>
+        <p:txBody>
+          <a:bodyPr/>
+          <a:lstStyle/>
+          <a:p>
+            <a:r>
+              <a:rPr lang="en-US" dirty="0"/>
+              <a:t>Hannah made the copy, so Hannah reads the copy.</a:t>
+            </a:r>
+          </a:p>
+        </p:txBody>
+      </p:sp>
+      <p:sp>
+        <p:nvSpPr>
+          <p:cNvPr id="4" name="Slide Number Placeholder 3"/>
+          <p:cNvSpPr>
+            <a:spLocks noGrp="1"/>
+          </p:cNvSpPr>
+          <p:nvPr>
+            <p:ph type="sldNum" sz="quarter" idx="5"/>
+          </p:nvPr>
+        </p:nvSpPr>
+        <p:spPr/>
+        <p:txBody>
+          <a:bodyPr/>
+          <a:lstStyle/>
+          <a:p>
+            <a:fld id="{8DAEC444-603B-4F09-9A06-5917518DD901}" type="slidenum">
+              <a:rPr lang="en-US" smtClean="0"/>
+              <a:t>2</a:t>
+            </a:fld>
+            <a:endParaRPr lang="en-US"/>
+          </a:p>
+        </p:txBody>
+      </p:sp>
+    </p:spTree>
+    <p:extLst>
+      <p:ext uri="{BB962C8B-B14F-4D97-AF65-F5344CB8AC3E}">
+        <p14:creationId xmlns:p14="http://schemas.microsoft.com/office/powerpoint/2010/main" val="1294983464"/>
+      </p:ext>
+    </p:extLst>
+  </p:cSld>
+  <p:clrMapOvr>
+    <a:masterClrMapping/>
+  </p:clrMapOvr>
+</p:notes>
+</file>
+
+<file path=ppt/notesSlides/notesSlide3.xml><?xml version="1.0" encoding="utf-8"?>
+<p:notes xmlns:a="http://schemas.openxmlformats.org/drawingml/2006/main" xmlns:r="http://schemas.openxmlformats.org/officeDocument/2006/relationships" xmlns:p="http://schemas.openxmlformats.org/presentationml/2006/main">
+  <p:cSld>
+    <p:spTree>
+      <p:nvGrpSpPr>
+        <p:cNvPr id="1" name=""/>
+        <p:cNvGrpSpPr/>
+        <p:nvPr/>
+      </p:nvGrpSpPr>
+      <p:grpSpPr>
+        <a:xfrm>
+          <a:off x="0" y="0"/>
+          <a:ext cx="0" cy="0"/>
+          <a:chOff x="0" y="0"/>
+          <a:chExt cx="0" cy="0"/>
+        </a:xfrm>
+      </p:grpSpPr>
+      <p:sp>
+        <p:nvSpPr>
+          <p:cNvPr id="2" name="Slide Image Placeholder 1"/>
+          <p:cNvSpPr>
+            <a:spLocks noGrp="1" noRot="1" noChangeAspect="1"/>
+          </p:cNvSpPr>
+          <p:nvPr>
+            <p:ph type="sldImg"/>
+          </p:nvPr>
+        </p:nvSpPr>
+        <p:spPr/>
+      </p:sp>
+      <p:sp>
+        <p:nvSpPr>
+          <p:cNvPr id="3" name="Notes Placeholder 2"/>
+          <p:cNvSpPr>
+            <a:spLocks noGrp="1"/>
+          </p:cNvSpPr>
+          <p:nvPr>
+            <p:ph type="body" idx="1"/>
+          </p:nvPr>
+        </p:nvSpPr>
+        <p:spPr/>
+        <p:txBody>
+          <a:bodyPr/>
+          <a:lstStyle/>
+          <a:p>
+            <a:r>
+              <a:rPr lang="en-US" dirty="0"/>
+              <a:t>Jeremy takes over here, says some awesome stuff.</a:t>
+            </a:r>
+          </a:p>
+        </p:txBody>
+      </p:sp>
+      <p:sp>
+        <p:nvSpPr>
+          <p:cNvPr id="4" name="Slide Number Placeholder 3"/>
+          <p:cNvSpPr>
+            <a:spLocks noGrp="1"/>
+          </p:cNvSpPr>
+          <p:nvPr>
+            <p:ph type="sldNum" sz="quarter" idx="5"/>
+          </p:nvPr>
+        </p:nvSpPr>
+        <p:spPr/>
+        <p:txBody>
+          <a:bodyPr/>
+          <a:lstStyle/>
+          <a:p>
+            <a:fld id="{8DAEC444-603B-4F09-9A06-5917518DD901}" type="slidenum">
+              <a:rPr lang="en-US" smtClean="0"/>
+              <a:t>3</a:t>
+            </a:fld>
+            <a:endParaRPr lang="en-US"/>
+          </a:p>
+        </p:txBody>
+      </p:sp>
+    </p:spTree>
+    <p:extLst>
+      <p:ext uri="{BB962C8B-B14F-4D97-AF65-F5344CB8AC3E}">
+        <p14:creationId xmlns:p14="http://schemas.microsoft.com/office/powerpoint/2010/main" val="3310315357"/>
+      </p:ext>
+    </p:extLst>
+  </p:cSld>
+  <p:clrMapOvr>
+    <a:masterClrMapping/>
+  </p:clrMapOvr>
+</p:notes>
+</file>
+
+<file path=ppt/notesSlides/notesSlide4.xml><?xml version="1.0" encoding="utf-8"?>
+<p:notes xmlns:a="http://schemas.openxmlformats.org/drawingml/2006/main" xmlns:r="http://schemas.openxmlformats.org/officeDocument/2006/relationships" xmlns:p="http://schemas.openxmlformats.org/presentationml/2006/main">
+  <p:cSld>
+    <p:spTree>
+      <p:nvGrpSpPr>
+        <p:cNvPr id="1" name=""/>
+        <p:cNvGrpSpPr/>
+        <p:nvPr/>
+      </p:nvGrpSpPr>
+      <p:grpSpPr>
+        <a:xfrm>
+          <a:off x="0" y="0"/>
+          <a:ext cx="0" cy="0"/>
+          <a:chOff x="0" y="0"/>
+          <a:chExt cx="0" cy="0"/>
+        </a:xfrm>
+      </p:grpSpPr>
+      <p:sp>
+        <p:nvSpPr>
+          <p:cNvPr id="2" name="Slide Image Placeholder 1"/>
+          <p:cNvSpPr>
+            <a:spLocks noGrp="1" noRot="1" noChangeAspect="1"/>
+          </p:cNvSpPr>
+          <p:nvPr>
+            <p:ph type="sldImg"/>
+          </p:nvPr>
+        </p:nvSpPr>
+        <p:spPr/>
+      </p:sp>
+      <p:sp>
+        <p:nvSpPr>
+          <p:cNvPr id="3" name="Notes Placeholder 2"/>
+          <p:cNvSpPr>
+            <a:spLocks noGrp="1"/>
+          </p:cNvSpPr>
+          <p:nvPr>
+            <p:ph type="body" idx="1"/>
+          </p:nvPr>
+        </p:nvSpPr>
+        <p:spPr/>
+        <p:txBody>
+          <a:bodyPr/>
+          <a:lstStyle/>
+          <a:p>
+            <a:r>
+              <a:rPr lang="en-US" dirty="0"/>
+              <a:t>Elijah comes in with his 16 bars</a:t>
+            </a:r>
+          </a:p>
+        </p:txBody>
+      </p:sp>
+      <p:sp>
+        <p:nvSpPr>
+          <p:cNvPr id="4" name="Slide Number Placeholder 3"/>
+          <p:cNvSpPr>
+            <a:spLocks noGrp="1"/>
+          </p:cNvSpPr>
+          <p:nvPr>
+            <p:ph type="sldNum" sz="quarter" idx="5"/>
+          </p:nvPr>
+        </p:nvSpPr>
+        <p:spPr/>
+        <p:txBody>
+          <a:bodyPr/>
+          <a:lstStyle/>
+          <a:p>
+            <a:fld id="{8DAEC444-603B-4F09-9A06-5917518DD901}" type="slidenum">
+              <a:rPr lang="en-US" smtClean="0"/>
+              <a:t>4</a:t>
+            </a:fld>
+            <a:endParaRPr lang="en-US"/>
+          </a:p>
+        </p:txBody>
+      </p:sp>
+    </p:spTree>
+    <p:extLst>
+      <p:ext uri="{BB962C8B-B14F-4D97-AF65-F5344CB8AC3E}">
+        <p14:creationId xmlns:p14="http://schemas.microsoft.com/office/powerpoint/2010/main" val="3972696863"/>
+      </p:ext>
+    </p:extLst>
+  </p:cSld>
+  <p:clrMapOvr>
+    <a:masterClrMapping/>
+  </p:clrMapOvr>
+</p:notes>
+</file>
+
+<file path=ppt/notesSlides/notesSlide5.xml><?xml version="1.0" encoding="utf-8"?>
+<p:notes xmlns:a="http://schemas.openxmlformats.org/drawingml/2006/main" xmlns:r="http://schemas.openxmlformats.org/officeDocument/2006/relationships" xmlns:p="http://schemas.openxmlformats.org/presentationml/2006/main">
+  <p:cSld>
+    <p:spTree>
+      <p:nvGrpSpPr>
+        <p:cNvPr id="1" name=""/>
+        <p:cNvGrpSpPr/>
+        <p:nvPr/>
+      </p:nvGrpSpPr>
+      <p:grpSpPr>
+        <a:xfrm>
+          <a:off x="0" y="0"/>
+          <a:ext cx="0" cy="0"/>
+          <a:chOff x="0" y="0"/>
+          <a:chExt cx="0" cy="0"/>
+        </a:xfrm>
+      </p:grpSpPr>
+      <p:sp>
+        <p:nvSpPr>
+          <p:cNvPr id="2" name="Slide Image Placeholder 1"/>
+          <p:cNvSpPr>
+            <a:spLocks noGrp="1" noRot="1" noChangeAspect="1"/>
+          </p:cNvSpPr>
+          <p:nvPr>
+            <p:ph type="sldImg"/>
+          </p:nvPr>
+        </p:nvSpPr>
+        <p:spPr/>
+      </p:sp>
+      <p:sp>
+        <p:nvSpPr>
+          <p:cNvPr id="3" name="Notes Placeholder 2"/>
+          <p:cNvSpPr>
+            <a:spLocks noGrp="1"/>
+          </p:cNvSpPr>
+          <p:nvPr>
+            <p:ph type="body" idx="1"/>
+          </p:nvPr>
+        </p:nvSpPr>
+        <p:spPr/>
+        <p:txBody>
+          <a:bodyPr/>
+          <a:lstStyle/>
+          <a:p>
+            <a:r>
+              <a:rPr lang="en-US" dirty="0"/>
+              <a:t>Julianne comes in, reading every single word.</a:t>
+            </a:r>
+          </a:p>
+        </p:txBody>
+      </p:sp>
+      <p:sp>
+        <p:nvSpPr>
+          <p:cNvPr id="4" name="Slide Number Placeholder 3"/>
+          <p:cNvSpPr>
+            <a:spLocks noGrp="1"/>
+          </p:cNvSpPr>
+          <p:nvPr>
+            <p:ph type="sldNum" sz="quarter" idx="5"/>
+          </p:nvPr>
+        </p:nvSpPr>
+        <p:spPr/>
+        <p:txBody>
+          <a:bodyPr/>
+          <a:lstStyle/>
+          <a:p>
+            <a:fld id="{8DAEC444-603B-4F09-9A06-5917518DD901}" type="slidenum">
+              <a:rPr lang="en-US" smtClean="0"/>
+              <a:t>5</a:t>
+            </a:fld>
+            <a:endParaRPr lang="en-US"/>
+          </a:p>
+        </p:txBody>
+      </p:sp>
+    </p:spTree>
+    <p:extLst>
+      <p:ext uri="{BB962C8B-B14F-4D97-AF65-F5344CB8AC3E}">
+        <p14:creationId xmlns:p14="http://schemas.microsoft.com/office/powerpoint/2010/main" val="3176936415"/>
+      </p:ext>
+    </p:extLst>
+  </p:cSld>
+  <p:clrMapOvr>
+    <a:masterClrMapping/>
+  </p:clrMapOvr>
+</p:notes>
+</file>
+
+<file path=ppt/notesSlides/notesSlide6.xml><?xml version="1.0" encoding="utf-8"?>
+<p:notes xmlns:a="http://schemas.openxmlformats.org/drawingml/2006/main" xmlns:r="http://schemas.openxmlformats.org/officeDocument/2006/relationships" xmlns:p="http://schemas.openxmlformats.org/presentationml/2006/main">
+  <p:cSld>
+    <p:spTree>
+      <p:nvGrpSpPr>
+        <p:cNvPr id="1" name=""/>
+        <p:cNvGrpSpPr/>
+        <p:nvPr/>
+      </p:nvGrpSpPr>
+      <p:grpSpPr>
+        <a:xfrm>
+          <a:off x="0" y="0"/>
+          <a:ext cx="0" cy="0"/>
+          <a:chOff x="0" y="0"/>
+          <a:chExt cx="0" cy="0"/>
+        </a:xfrm>
+      </p:grpSpPr>
+      <p:sp>
+        <p:nvSpPr>
+          <p:cNvPr id="2" name="Slide Image Placeholder 1"/>
+          <p:cNvSpPr>
+            <a:spLocks noGrp="1" noRot="1" noChangeAspect="1"/>
+          </p:cNvSpPr>
+          <p:nvPr>
+            <p:ph type="sldImg"/>
+          </p:nvPr>
+        </p:nvSpPr>
+        <p:spPr/>
+      </p:sp>
+      <p:sp>
+        <p:nvSpPr>
+          <p:cNvPr id="3" name="Notes Placeholder 2"/>
+          <p:cNvSpPr>
+            <a:spLocks noGrp="1"/>
+          </p:cNvSpPr>
+          <p:nvPr>
+            <p:ph type="body" idx="1"/>
+          </p:nvPr>
+        </p:nvSpPr>
+        <p:spPr/>
+        <p:txBody>
+          <a:bodyPr/>
+          <a:lstStyle/>
+          <a:p>
+            <a:r>
+              <a:rPr lang="en-US" dirty="0"/>
+              <a:t>Julianne continues.</a:t>
+            </a:r>
+          </a:p>
+        </p:txBody>
+      </p:sp>
+      <p:sp>
+        <p:nvSpPr>
+          <p:cNvPr id="4" name="Slide Number Placeholder 3"/>
+          <p:cNvSpPr>
+            <a:spLocks noGrp="1"/>
+          </p:cNvSpPr>
+          <p:nvPr>
+            <p:ph type="sldNum" sz="quarter" idx="5"/>
+          </p:nvPr>
+        </p:nvSpPr>
+        <p:spPr/>
+        <p:txBody>
+          <a:bodyPr/>
+          <a:lstStyle/>
+          <a:p>
+            <a:fld id="{8DAEC444-603B-4F09-9A06-5917518DD901}" type="slidenum">
+              <a:rPr lang="en-US" smtClean="0"/>
+              <a:t>6</a:t>
+            </a:fld>
+            <a:endParaRPr lang="en-US"/>
+          </a:p>
+        </p:txBody>
+      </p:sp>
+    </p:spTree>
+    <p:extLst>
+      <p:ext uri="{BB962C8B-B14F-4D97-AF65-F5344CB8AC3E}">
+        <p14:creationId xmlns:p14="http://schemas.microsoft.com/office/powerpoint/2010/main" val="2306375228"/>
+      </p:ext>
+    </p:extLst>
+  </p:cSld>
+  <p:clrMapOvr>
+    <a:masterClrMapping/>
+  </p:clrMapOvr>
+</p:notes>
+</file>
+
+<file path=ppt/notesSlides/notesSlide7.xml><?xml version="1.0" encoding="utf-8"?>
+<p:notes xmlns:a="http://schemas.openxmlformats.org/drawingml/2006/main" xmlns:r="http://schemas.openxmlformats.org/officeDocument/2006/relationships" xmlns:p="http://schemas.openxmlformats.org/presentationml/2006/main">
+  <p:cSld>
+    <p:spTree>
+      <p:nvGrpSpPr>
+        <p:cNvPr id="1" name=""/>
+        <p:cNvGrpSpPr/>
+        <p:nvPr/>
+      </p:nvGrpSpPr>
+      <p:grpSpPr>
+        <a:xfrm>
+          <a:off x="0" y="0"/>
+          <a:ext cx="0" cy="0"/>
+          <a:chOff x="0" y="0"/>
+          <a:chExt cx="0" cy="0"/>
+        </a:xfrm>
+      </p:grpSpPr>
+      <p:sp>
+        <p:nvSpPr>
+          <p:cNvPr id="2" name="Slide Image Placeholder 1"/>
+          <p:cNvSpPr>
+            <a:spLocks noGrp="1" noRot="1" noChangeAspect="1"/>
+          </p:cNvSpPr>
+          <p:nvPr>
+            <p:ph type="sldImg"/>
+          </p:nvPr>
+        </p:nvSpPr>
+        <p:spPr/>
+      </p:sp>
+      <p:sp>
+        <p:nvSpPr>
+          <p:cNvPr id="3" name="Notes Placeholder 2"/>
+          <p:cNvSpPr>
+            <a:spLocks noGrp="1"/>
+          </p:cNvSpPr>
+          <p:nvPr>
+            <p:ph type="body" idx="1"/>
+          </p:nvPr>
+        </p:nvSpPr>
+        <p:spPr/>
+        <p:txBody>
+          <a:bodyPr/>
+          <a:lstStyle/>
+          <a:p>
+            <a:r>
+              <a:rPr lang="en-US" dirty="0"/>
+              <a:t>I love Flask SO MUCH. Jeremy takes over here.</a:t>
+            </a:r>
+          </a:p>
+        </p:txBody>
+      </p:sp>
+      <p:sp>
+        <p:nvSpPr>
+          <p:cNvPr id="4" name="Slide Number Placeholder 3"/>
+          <p:cNvSpPr>
+            <a:spLocks noGrp="1"/>
+          </p:cNvSpPr>
+          <p:nvPr>
+            <p:ph type="sldNum" sz="quarter" idx="5"/>
+          </p:nvPr>
+        </p:nvSpPr>
+        <p:spPr/>
+        <p:txBody>
+          <a:bodyPr/>
+          <a:lstStyle/>
+          <a:p>
+            <a:fld id="{8DAEC444-603B-4F09-9A06-5917518DD901}" type="slidenum">
+              <a:rPr lang="en-US" smtClean="0"/>
+              <a:t>7</a:t>
+            </a:fld>
+            <a:endParaRPr lang="en-US"/>
+          </a:p>
+        </p:txBody>
+      </p:sp>
+    </p:spTree>
+    <p:extLst>
+      <p:ext uri="{BB962C8B-B14F-4D97-AF65-F5344CB8AC3E}">
+        <p14:creationId xmlns:p14="http://schemas.microsoft.com/office/powerpoint/2010/main" val="422300236"/>
+      </p:ext>
+    </p:extLst>
+  </p:cSld>
+  <p:clrMapOvr>
+    <a:masterClrMapping/>
+  </p:clrMapOvr>
+</p:notes>
+</file>
+
+<file path=ppt/notesSlides/notesSlide8.xml><?xml version="1.0" encoding="utf-8"?>
+<p:notes xmlns:a="http://schemas.openxmlformats.org/drawingml/2006/main" xmlns:r="http://schemas.openxmlformats.org/officeDocument/2006/relationships" xmlns:p="http://schemas.openxmlformats.org/presentationml/2006/main">
+  <p:cSld>
+    <p:spTree>
+      <p:nvGrpSpPr>
+        <p:cNvPr id="1" name=""/>
+        <p:cNvGrpSpPr/>
+        <p:nvPr/>
+      </p:nvGrpSpPr>
+      <p:grpSpPr>
+        <a:xfrm>
+          <a:off x="0" y="0"/>
+          <a:ext cx="0" cy="0"/>
+          <a:chOff x="0" y="0"/>
+          <a:chExt cx="0" cy="0"/>
+        </a:xfrm>
+      </p:grpSpPr>
+      <p:sp>
+        <p:nvSpPr>
+          <p:cNvPr id="2" name="Slide Image Placeholder 1"/>
+          <p:cNvSpPr>
+            <a:spLocks noGrp="1" noRot="1" noChangeAspect="1"/>
+          </p:cNvSpPr>
+          <p:nvPr>
+            <p:ph type="sldImg"/>
+          </p:nvPr>
+        </p:nvSpPr>
+        <p:spPr/>
+      </p:sp>
+      <p:sp>
+        <p:nvSpPr>
+          <p:cNvPr id="3" name="Notes Placeholder 2"/>
+          <p:cNvSpPr>
+            <a:spLocks noGrp="1"/>
+          </p:cNvSpPr>
+          <p:nvPr>
+            <p:ph type="body" idx="1"/>
+          </p:nvPr>
+        </p:nvSpPr>
+        <p:spPr/>
+        <p:txBody>
+          <a:bodyPr/>
+          <a:lstStyle/>
+          <a:p>
+            <a:r>
+              <a:rPr lang="en-US" dirty="0"/>
+              <a:t>Jeremy gets a good laugh out of the class, tears are shed, applause is heard for miles around.</a:t>
+            </a:r>
+          </a:p>
+        </p:txBody>
+      </p:sp>
+      <p:sp>
+        <p:nvSpPr>
+          <p:cNvPr id="4" name="Slide Number Placeholder 3"/>
+          <p:cNvSpPr>
+            <a:spLocks noGrp="1"/>
+          </p:cNvSpPr>
+          <p:nvPr>
+            <p:ph type="sldNum" sz="quarter" idx="5"/>
+          </p:nvPr>
+        </p:nvSpPr>
+        <p:spPr/>
+        <p:txBody>
+          <a:bodyPr/>
+          <a:lstStyle/>
+          <a:p>
+            <a:fld id="{8DAEC444-603B-4F09-9A06-5917518DD901}" type="slidenum">
+              <a:rPr lang="en-US" smtClean="0"/>
+              <a:t>8</a:t>
+            </a:fld>
+            <a:endParaRPr lang="en-US"/>
+          </a:p>
+        </p:txBody>
+      </p:sp>
+    </p:spTree>
+    <p:extLst>
+      <p:ext uri="{BB962C8B-B14F-4D97-AF65-F5344CB8AC3E}">
+        <p14:creationId xmlns:p14="http://schemas.microsoft.com/office/powerpoint/2010/main" val="2038612093"/>
+      </p:ext>
+    </p:extLst>
+  </p:cSld>
+  <p:clrMapOvr>
+    <a:masterClrMapping/>
+  </p:clrMapOvr>
+</p:notes>
+</file>
+
+<file path=ppt/notesSlides/notesSlide9.xml><?xml version="1.0" encoding="utf-8"?>
+<p:notes xmlns:a="http://schemas.openxmlformats.org/drawingml/2006/main" xmlns:r="http://schemas.openxmlformats.org/officeDocument/2006/relationships" xmlns:p="http://schemas.openxmlformats.org/presentationml/2006/main">
+  <p:cSld>
+    <p:spTree>
+      <p:nvGrpSpPr>
+        <p:cNvPr id="1" name=""/>
+        <p:cNvGrpSpPr/>
+        <p:nvPr/>
+      </p:nvGrpSpPr>
+      <p:grpSpPr>
+        <a:xfrm>
+          <a:off x="0" y="0"/>
+          <a:ext cx="0" cy="0"/>
+          <a:chOff x="0" y="0"/>
+          <a:chExt cx="0" cy="0"/>
+        </a:xfrm>
+      </p:grpSpPr>
+      <p:sp>
+        <p:nvSpPr>
+          <p:cNvPr id="2" name="Slide Image Placeholder 1"/>
+          <p:cNvSpPr>
+            <a:spLocks noGrp="1" noRot="1" noChangeAspect="1"/>
+          </p:cNvSpPr>
+          <p:nvPr>
+            <p:ph type="sldImg"/>
+          </p:nvPr>
+        </p:nvSpPr>
+        <p:spPr/>
+      </p:sp>
+      <p:sp>
+        <p:nvSpPr>
+          <p:cNvPr id="3" name="Notes Placeholder 2"/>
+          <p:cNvSpPr>
+            <a:spLocks noGrp="1"/>
+          </p:cNvSpPr>
+          <p:nvPr>
+            <p:ph type="body" idx="1"/>
+          </p:nvPr>
+        </p:nvSpPr>
+        <p:spPr/>
+        <p:txBody>
+          <a:bodyPr/>
+          <a:lstStyle/>
+          <a:p>
+            <a:r>
+              <a:rPr lang="en-US" dirty="0"/>
+              <a:t>Jeremy finishes his faked love of Flask.</a:t>
+            </a:r>
+          </a:p>
+        </p:txBody>
+      </p:sp>
+      <p:sp>
+        <p:nvSpPr>
+          <p:cNvPr id="4" name="Slide Number Placeholder 3"/>
+          <p:cNvSpPr>
+            <a:spLocks noGrp="1"/>
+          </p:cNvSpPr>
+          <p:nvPr>
+            <p:ph type="sldNum" sz="quarter" idx="5"/>
+          </p:nvPr>
+        </p:nvSpPr>
+        <p:spPr/>
+        <p:txBody>
+          <a:bodyPr/>
+          <a:lstStyle/>
+          <a:p>
+            <a:fld id="{8DAEC444-603B-4F09-9A06-5917518DD901}" type="slidenum">
+              <a:rPr lang="en-US" smtClean="0"/>
+              <a:t>9</a:t>
+            </a:fld>
+            <a:endParaRPr lang="en-US"/>
+          </a:p>
+        </p:txBody>
+      </p:sp>
+    </p:spTree>
+    <p:extLst>
+      <p:ext uri="{BB962C8B-B14F-4D97-AF65-F5344CB8AC3E}">
+        <p14:creationId xmlns:p14="http://schemas.microsoft.com/office/powerpoint/2010/main" val="3671104982"/>
       </p:ext>
     </p:extLst>
   </p:cSld>
@@ -7180,7 +8516,7 @@
           <p:nvPr/>
         </p:nvPicPr>
         <p:blipFill>
-          <a:blip r:embed="rId2"/>
+          <a:blip r:embed="rId3"/>
           <a:stretch>
             <a:fillRect/>
           </a:stretch>
@@ -7210,7 +8546,7 @@
           <p:nvPr/>
         </p:nvPicPr>
         <p:blipFill>
-          <a:blip r:embed="rId3"/>
+          <a:blip r:embed="rId4"/>
           <a:stretch>
             <a:fillRect/>
           </a:stretch>
@@ -7240,7 +8576,7 @@
           <p:nvPr/>
         </p:nvPicPr>
         <p:blipFill>
-          <a:blip r:embed="rId4"/>
+          <a:blip r:embed="rId5"/>
           <a:stretch>
             <a:fillRect/>
           </a:stretch>
@@ -7270,7 +8606,7 @@
           <p:nvPr/>
         </p:nvPicPr>
         <p:blipFill>
-          <a:blip r:embed="rId5"/>
+          <a:blip r:embed="rId6"/>
           <a:stretch>
             <a:fillRect/>
           </a:stretch>
@@ -7452,7 +8788,7 @@
           </p:nvPr>
         </p:nvPicPr>
         <p:blipFill>
-          <a:blip r:embed="rId2">
+          <a:blip r:embed="rId3">
             <a:extLst>
               <a:ext uri="{28A0092B-C50C-407E-A947-70E740481C1C}">
                 <a14:useLocalDpi xmlns:a14="http://schemas.microsoft.com/office/drawing/2010/main" val="0"/>
@@ -7720,8 +9056,17 @@
             </a:br>
             <a:r>
               <a:rPr lang="en-US" dirty="0"/>
-              <a:t>It will be sick. No cap. Deadass.</a:t>
-            </a:r>
+              <a:t>It will be sick. No cap. Deadass. </a:t>
+            </a:r>
+            <a:r>
+              <a:rPr lang="en-US" dirty="0" err="1"/>
+              <a:t>Forreal</a:t>
+            </a:r>
+            <a:r>
+              <a:rPr lang="en-US"/>
+              <a:t>. </a:t>
+            </a:r>
+            <a:endParaRPr lang="en-US" dirty="0"/>
           </a:p>
         </p:txBody>
       </p:sp>
@@ -8326,13 +9671,13 @@
           <p:nvPr/>
         </p:nvPicPr>
         <p:blipFill>
-          <a:blip r:embed="rId2">
+          <a:blip r:embed="rId3">
             <a:extLst>
               <a:ext uri="{28A0092B-C50C-407E-A947-70E740481C1C}">
                 <a14:useLocalDpi xmlns:a14="http://schemas.microsoft.com/office/drawing/2010/main" val="0"/>
               </a:ext>
               <a:ext uri="{96DAC541-7B7A-43D3-8B79-37D633B846F1}">
-                <asvg:svgBlip xmlns:asvg="http://schemas.microsoft.com/office/drawing/2016/SVG/main" r:embed="rId3"/>
+                <asvg:svgBlip xmlns:asvg="http://schemas.microsoft.com/office/drawing/2016/SVG/main" r:embed="rId4"/>
               </a:ext>
             </a:extLst>
           </a:blip>
@@ -8477,7 +9822,7 @@
         </p:xfrm>
         <a:graphic>
           <a:graphicData uri="http://schemas.openxmlformats.org/drawingml/2006/diagram">
-            <dgm:relIds xmlns:dgm="http://schemas.openxmlformats.org/drawingml/2006/diagram" xmlns:r="http://schemas.openxmlformats.org/officeDocument/2006/relationships" r:dm="rId2" r:lo="rId3" r:qs="rId4" r:cs="rId5"/>
+            <dgm:relIds xmlns:dgm="http://schemas.openxmlformats.org/drawingml/2006/diagram" xmlns:r="http://schemas.openxmlformats.org/officeDocument/2006/relationships" r:dm="rId3" r:lo="rId4" r:qs="rId5" r:cs="rId6"/>
           </a:graphicData>
         </a:graphic>
       </p:graphicFrame>
@@ -8644,18 +9989,18 @@
         <p:spPr>
           <a:xfrm>
             <a:off x="0" y="2167035"/>
-            <a:ext cx="4191000" cy="3090765"/>
+            <a:ext cx="4191000" cy="3547965"/>
           </a:xfrm>
         </p:spPr>
         <p:txBody>
           <a:bodyPr>
-            <a:normAutofit fontScale="85000" lnSpcReduction="20000"/>
+            <a:normAutofit fontScale="77500" lnSpcReduction="20000"/>
           </a:bodyPr>
           <a:lstStyle/>
           <a:p>
             <a:r>
               <a:rPr lang="en-US" sz="2400" dirty="0"/>
-              <a:t>Sample code for a quick start</a:t>
+              <a:t>Sample code for a quick start to coding</a:t>
             </a:r>
           </a:p>
           <a:p>
@@ -8664,7 +10009,7 @@
           <a:p>
             <a:r>
               <a:rPr lang="en-US" sz="2400" dirty="0"/>
-              <a:t>API request history</a:t>
+              <a:t>API request history to keep track of query limits</a:t>
             </a:r>
           </a:p>
           <a:p>
@@ -8682,7 +10027,7 @@
           <a:p>
             <a:r>
               <a:rPr lang="en-US" sz="2400" dirty="0"/>
-              <a:t>Access to millions of data points</a:t>
+              <a:t>Access to millions of data points in hundreds of categories</a:t>
             </a:r>
           </a:p>
         </p:txBody>
@@ -8719,7 +10064,7 @@
         <p:spPr/>
         <p:txBody>
           <a:bodyPr>
-            <a:normAutofit fontScale="85000" lnSpcReduction="20000"/>
+            <a:normAutofit fontScale="77500" lnSpcReduction="20000"/>
           </a:bodyPr>
           <a:lstStyle/>
           <a:p>
@@ -8742,7 +10087,7 @@
           <p:nvPr/>
         </p:nvPicPr>
         <p:blipFill>
-          <a:blip r:embed="rId2"/>
+          <a:blip r:embed="rId3"/>
           <a:stretch>
             <a:fillRect/>
           </a:stretch>
@@ -8954,7 +10299,7 @@
           </p:nvPr>
         </p:nvPicPr>
         <p:blipFill>
-          <a:blip r:embed="rId4"/>
+          <a:blip r:embed="rId5"/>
           <a:stretch>
             <a:fillRect/>
           </a:stretch>
@@ -9164,7 +10509,7 @@
           <p:nvPr/>
         </p:nvPicPr>
         <p:blipFill>
-          <a:blip r:embed="rId2"/>
+          <a:blip r:embed="rId3"/>
           <a:stretch>
             <a:fillRect/>
           </a:stretch>

</xml_diff>